<commit_message>
commit ppt and unit test
</commit_message>
<xml_diff>
--- a/OOAD_Midterm.pptx
+++ b/OOAD_Midterm.pptx
@@ -35,11 +35,11 @@
       <p:bold r:id="rId21"/>
     </p:embeddedFont>
     <p:embeddedFont>
-      <p:font typeface="Nixie One" panose="02020500000000000000" charset="0"/>
+      <p:font typeface="標楷體" panose="03000509000000000000" pitchFamily="65" charset="-120"/>
       <p:regular r:id="rId22"/>
     </p:embeddedFont>
     <p:embeddedFont>
-      <p:font typeface="標楷體" panose="03000509000000000000" pitchFamily="65" charset="-120"/>
+      <p:font typeface="Nixie One" panose="02020500000000000000" charset="0"/>
       <p:regular r:id="rId23"/>
     </p:embeddedFont>
   </p:embeddedFontLst>
@@ -7583,7 +7583,7 @@
       </p:grpSpPr>
       <p:pic>
         <p:nvPicPr>
-          <p:cNvPr id="3" name="圖片 2"/>
+          <p:cNvPr id="2" name="圖片 1"/>
           <p:cNvPicPr>
             <a:picLocks noChangeAspect="1"/>
           </p:cNvPicPr>
@@ -7603,8 +7603,8 @@
         </p:blipFill>
         <p:spPr>
           <a:xfrm>
-            <a:off x="631763" y="54184"/>
-            <a:ext cx="7897632" cy="5004000"/>
+            <a:off x="1378094" y="0"/>
+            <a:ext cx="6473820" cy="5143500"/>
           </a:xfrm>
           <a:prstGeom prst="rect">
             <a:avLst/>
@@ -10617,7 +10617,7 @@
           <p:nvPr>
             <p:extLst>
               <p:ext uri="{D42A27DB-BD31-4B8C-83A1-F6EECF244321}">
-                <p14:modId xmlns:p14="http://schemas.microsoft.com/office/powerpoint/2010/main" val="2924743967"/>
+                <p14:modId xmlns:p14="http://schemas.microsoft.com/office/powerpoint/2010/main" val="1835896213"/>
               </p:ext>
             </p:extLst>
           </p:nvPr>
@@ -10694,7 +10694,7 @@
                       <a:endParaRPr lang="zh-TW" altLang="en-US" dirty="0"/>
                     </a:p>
                   </a:txBody>
-                  <a:tcPr/>
+                  <a:tcPr anchor="ctr"/>
                 </a:tc>
                 <a:tc>
                   <a:txBody>
@@ -10705,7 +10705,7 @@
                       <a:endParaRPr lang="zh-TW" altLang="en-US" dirty="0"/>
                     </a:p>
                   </a:txBody>
-                  <a:tcPr/>
+                  <a:tcPr anchor="ctr"/>
                 </a:tc>
                 <a:extLst>
                   <a:ext uri="{0D108BD9-81ED-4DB2-BD59-A6C34878D82A}">
@@ -10731,7 +10731,7 @@
                       <a:endParaRPr lang="zh-TW" altLang="en-US" dirty="0"/>
                     </a:p>
                   </a:txBody>
-                  <a:tcPr/>
+                  <a:tcPr anchor="ctr"/>
                 </a:tc>
                 <a:tc>
                   <a:txBody>
@@ -10742,7 +10742,7 @@
                       <a:endParaRPr lang="zh-TW" altLang="en-US" dirty="0"/>
                     </a:p>
                   </a:txBody>
-                  <a:tcPr/>
+                  <a:tcPr anchor="ctr"/>
                 </a:tc>
                 <a:extLst>
                   <a:ext uri="{0D108BD9-81ED-4DB2-BD59-A6C34878D82A}">
@@ -10768,7 +10768,7 @@
                       <a:endParaRPr lang="zh-TW" altLang="en-US" dirty="0"/>
                     </a:p>
                   </a:txBody>
-                  <a:tcPr/>
+                  <a:tcPr anchor="ctr"/>
                 </a:tc>
                 <a:tc>
                   <a:txBody>
@@ -10776,10 +10776,10 @@
                     <a:lstStyle/>
                     <a:p>
                       <a:pPr algn="ctr"/>
-                      <a:endParaRPr lang="zh-TW" altLang="en-US"/>
+                      <a:endParaRPr lang="zh-TW" altLang="en-US" dirty="0"/>
                     </a:p>
                   </a:txBody>
-                  <a:tcPr/>
+                  <a:tcPr anchor="ctr"/>
                 </a:tc>
                 <a:extLst>
                   <a:ext uri="{0D108BD9-81ED-4DB2-BD59-A6C34878D82A}">
@@ -10805,7 +10805,7 @@
                       <a:endParaRPr lang="zh-TW" altLang="en-US" dirty="0"/>
                     </a:p>
                   </a:txBody>
-                  <a:tcPr/>
+                  <a:tcPr anchor="ctr"/>
                 </a:tc>
                 <a:tc>
                   <a:txBody>
@@ -10813,10 +10813,10 @@
                     <a:lstStyle/>
                     <a:p>
                       <a:pPr algn="ctr"/>
-                      <a:endParaRPr lang="zh-TW" altLang="en-US"/>
+                      <a:endParaRPr lang="zh-TW" altLang="en-US" dirty="0"/>
                     </a:p>
                   </a:txBody>
-                  <a:tcPr/>
+                  <a:tcPr anchor="ctr"/>
                 </a:tc>
                 <a:extLst>
                   <a:ext uri="{0D108BD9-81ED-4DB2-BD59-A6C34878D82A}">
@@ -10838,7 +10838,7 @@
                       <a:endParaRPr lang="zh-TW" altLang="en-US" dirty="0"/>
                     </a:p>
                   </a:txBody>
-                  <a:tcPr/>
+                  <a:tcPr anchor="ctr"/>
                 </a:tc>
                 <a:tc>
                   <a:txBody>
@@ -10849,7 +10849,7 @@
                       <a:endParaRPr lang="zh-TW" altLang="en-US" dirty="0"/>
                     </a:p>
                   </a:txBody>
-                  <a:tcPr/>
+                  <a:tcPr anchor="ctr"/>
                 </a:tc>
                 <a:extLst>
                   <a:ext uri="{0D108BD9-81ED-4DB2-BD59-A6C34878D82A}">
@@ -10875,7 +10875,7 @@
                       <a:endParaRPr lang="zh-TW" altLang="en-US" dirty="0"/>
                     </a:p>
                   </a:txBody>
-                  <a:tcPr/>
+                  <a:tcPr anchor="ctr"/>
                 </a:tc>
                 <a:tc>
                   <a:txBody>
@@ -10890,7 +10890,7 @@
                       <a:endParaRPr lang="zh-TW" altLang="en-US" dirty="0"/>
                     </a:p>
                   </a:txBody>
-                  <a:tcPr/>
+                  <a:tcPr anchor="ctr"/>
                 </a:tc>
                 <a:extLst>
                   <a:ext uri="{0D108BD9-81ED-4DB2-BD59-A6C34878D82A}">
@@ -10934,7 +10934,7 @@
                       <a:endParaRPr lang="zh-TW" altLang="en-US" dirty="0" smtClean="0"/>
                     </a:p>
                   </a:txBody>
-                  <a:tcPr/>
+                  <a:tcPr anchor="ctr"/>
                 </a:tc>
                 <a:tc>
                   <a:txBody>
@@ -10949,7 +10949,7 @@
                       <a:endParaRPr lang="zh-TW" altLang="en-US" dirty="0"/>
                     </a:p>
                   </a:txBody>
-                  <a:tcPr/>
+                  <a:tcPr anchor="ctr"/>
                 </a:tc>
                 <a:extLst>
                   <a:ext uri="{0D108BD9-81ED-4DB2-BD59-A6C34878D82A}">
@@ -10975,7 +10975,7 @@
                       <a:endParaRPr lang="zh-TW" altLang="en-US" dirty="0"/>
                     </a:p>
                   </a:txBody>
-                  <a:tcPr/>
+                  <a:tcPr anchor="ctr"/>
                 </a:tc>
                 <a:tc>
                   <a:txBody>
@@ -10990,7 +10990,7 @@
                       <a:endParaRPr lang="zh-TW" altLang="en-US" dirty="0"/>
                     </a:p>
                   </a:txBody>
-                  <a:tcPr/>
+                  <a:tcPr anchor="ctr"/>
                 </a:tc>
                 <a:extLst>
                   <a:ext uri="{0D108BD9-81ED-4DB2-BD59-A6C34878D82A}">
@@ -11016,7 +11016,7 @@
                       <a:endParaRPr lang="zh-TW" altLang="en-US" dirty="0"/>
                     </a:p>
                   </a:txBody>
-                  <a:tcPr/>
+                  <a:tcPr anchor="ctr"/>
                 </a:tc>
                 <a:tc>
                   <a:txBody>
@@ -11031,7 +11031,7 @@
                       <a:endParaRPr lang="zh-TW" altLang="en-US" dirty="0"/>
                     </a:p>
                   </a:txBody>
-                  <a:tcPr/>
+                  <a:tcPr anchor="ctr"/>
                 </a:tc>
                 <a:extLst>
                   <a:ext uri="{0D108BD9-81ED-4DB2-BD59-A6C34878D82A}">
@@ -12449,18 +12449,25 @@
               <a:t>    </a:t>
             </a:r>
             <a:r>
+              <a:rPr lang="zh-TW" altLang="en-US" sz="1800" dirty="0" smtClean="0">
+                <a:latin typeface="標楷體" panose="03000509000000000000" pitchFamily="65" charset="-120"/>
+                <a:ea typeface="標楷體" panose="03000509000000000000" pitchFamily="65" charset="-120"/>
+              </a:rPr>
+              <a:t>在人生中</a:t>
+            </a:r>
+            <a:r>
               <a:rPr lang="zh-TW" altLang="zh-TW" sz="1800" dirty="0" smtClean="0">
                 <a:latin typeface="標楷體" panose="03000509000000000000" pitchFamily="65" charset="-120"/>
                 <a:ea typeface="標楷體" panose="03000509000000000000" pitchFamily="65" charset="-120"/>
               </a:rPr>
-              <a:t>在</a:t>
+              <a:t>，</a:t>
             </a:r>
             <a:r>
               <a:rPr lang="zh-TW" altLang="zh-TW" sz="1800" dirty="0">
                 <a:latin typeface="標楷體" panose="03000509000000000000" pitchFamily="65" charset="-120"/>
                 <a:ea typeface="標楷體" panose="03000509000000000000" pitchFamily="65" charset="-120"/>
               </a:rPr>
-              <a:t>求學過程中，我們往往不知道該如何有效運用時間，而最根本的原因就是不確定將時間花在哪裡，而渾渾噩噩地過著日復一日的生活。因此我們需要有一個軟體能夠幫我們</a:t>
+              <a:t>我們往往不知道該如何有效運用時間，而最根本的原因就是不確定將時間花在哪裡，而渾渾噩噩地過著日復一日的生活。因此我們需要有一個軟體能夠幫我們</a:t>
             </a:r>
             <a:r>
               <a:rPr lang="zh-TW" altLang="zh-TW" sz="1800" dirty="0" smtClean="0">
@@ -12484,11 +12491,25 @@
               <a:t>除了</a:t>
             </a:r>
             <a:r>
-              <a:rPr lang="zh-TW" altLang="zh-TW" sz="1800" dirty="0">
+              <a:rPr lang="zh-TW" altLang="en-US" sz="1800" dirty="0" smtClean="0">
                 <a:latin typeface="標楷體" panose="03000509000000000000" pitchFamily="65" charset="-120"/>
                 <a:ea typeface="標楷體" panose="03000509000000000000" pitchFamily="65" charset="-120"/>
               </a:rPr>
-              <a:t>上課時間</a:t>
+              <a:t>上</a:t>
+            </a:r>
+            <a:r>
+              <a:rPr lang="zh-TW" altLang="en-US" sz="1800" dirty="0">
+                <a:latin typeface="標楷體" panose="03000509000000000000" pitchFamily="65" charset="-120"/>
+                <a:ea typeface="標楷體" panose="03000509000000000000" pitchFamily="65" charset="-120"/>
+              </a:rPr>
+              <a:t>工</a:t>
+            </a:r>
+            <a:r>
+              <a:rPr lang="zh-TW" altLang="zh-TW" sz="1800" dirty="0" smtClean="0">
+                <a:latin typeface="標楷體" panose="03000509000000000000" pitchFamily="65" charset="-120"/>
+                <a:ea typeface="標楷體" panose="03000509000000000000" pitchFamily="65" charset="-120"/>
+              </a:rPr>
+              <a:t>時間</a:t>
             </a:r>
             <a:r>
               <a:rPr lang="zh-TW" altLang="zh-TW" sz="1800" dirty="0" smtClean="0">
@@ -12563,18 +12584,25 @@
               <a:t>對於</a:t>
             </a:r>
             <a:r>
-              <a:rPr lang="zh-TW" altLang="en-US" sz="1800" dirty="0">
+              <a:rPr lang="zh-TW" altLang="en-US" sz="1800" dirty="0" smtClean="0">
                 <a:latin typeface="標楷體" panose="03000509000000000000" pitchFamily="65" charset="-120"/>
                 <a:ea typeface="標楷體" panose="03000509000000000000" pitchFamily="65" charset="-120"/>
               </a:rPr>
-              <a:t>學生</a:t>
+              <a:t>使用者</a:t>
+            </a:r>
+            <a:r>
+              <a:rPr lang="zh-TW" altLang="zh-TW" sz="1800" dirty="0" smtClean="0">
+                <a:latin typeface="標楷體" panose="03000509000000000000" pitchFamily="65" charset="-120"/>
+                <a:ea typeface="標楷體" panose="03000509000000000000" pitchFamily="65" charset="-120"/>
+              </a:rPr>
+              <a:t>來</a:t>
             </a:r>
             <a:r>
               <a:rPr lang="zh-TW" altLang="zh-TW" sz="1800" dirty="0">
                 <a:latin typeface="標楷體" panose="03000509000000000000" pitchFamily="65" charset="-120"/>
                 <a:ea typeface="標楷體" panose="03000509000000000000" pitchFamily="65" charset="-120"/>
               </a:rPr>
-              <a:t>們來說，可以藉由此軟體記錄下自己做的事情及時間。</a:t>
+              <a:t>說，可以藉由此軟體記錄下自己做的事情及時間。</a:t>
             </a:r>
             <a:r>
               <a:rPr lang="zh-TW" altLang="zh-TW" sz="1800" dirty="0" smtClean="0">
@@ -13219,7 +13247,7 @@
       </p:grpSp>
       <p:pic>
         <p:nvPicPr>
-          <p:cNvPr id="3" name="圖片 2"/>
+          <p:cNvPr id="2" name="圖片 1"/>
           <p:cNvPicPr>
             <a:picLocks noChangeAspect="1"/>
           </p:cNvPicPr>
@@ -13239,8 +13267,8 @@
         </p:blipFill>
         <p:spPr>
           <a:xfrm>
-            <a:off x="700081" y="1934817"/>
-            <a:ext cx="7999172" cy="2365514"/>
+            <a:off x="436521" y="1858247"/>
+            <a:ext cx="8302913" cy="2455336"/>
           </a:xfrm>
           <a:prstGeom prst="rect">
             <a:avLst/>
@@ -15677,6 +15705,36 @@
           </p:txBody>
         </p:sp>
       </p:grpSp>
+      <p:pic>
+        <p:nvPicPr>
+          <p:cNvPr id="2" name="圖片 1"/>
+          <p:cNvPicPr>
+            <a:picLocks noChangeAspect="1"/>
+          </p:cNvPicPr>
+          <p:nvPr/>
+        </p:nvPicPr>
+        <p:blipFill>
+          <a:blip r:embed="rId3">
+            <a:extLst>
+              <a:ext uri="{28A0092B-C50C-407E-A947-70E740481C1C}">
+                <a14:useLocalDpi xmlns:a14="http://schemas.microsoft.com/office/drawing/2010/main" val="0"/>
+              </a:ext>
+            </a:extLst>
+          </a:blip>
+          <a:stretch>
+            <a:fillRect/>
+          </a:stretch>
+        </p:blipFill>
+        <p:spPr>
+          <a:xfrm>
+            <a:off x="5175394" y="19878"/>
+            <a:ext cx="3471229" cy="5143500"/>
+          </a:xfrm>
+          <a:prstGeom prst="rect">
+            <a:avLst/>
+          </a:prstGeom>
+        </p:spPr>
+      </p:pic>
     </p:spTree>
     <p:extLst>
       <p:ext uri="{BB962C8B-B14F-4D97-AF65-F5344CB8AC3E}">
@@ -15750,7 +15808,19 @@
             </a:pPr>
             <a:r>
               <a:rPr lang="en-US" dirty="0" smtClean="0"/>
-              <a:t>Use Case realizations </a:t>
+              <a:t>Use Case </a:t>
+            </a:r>
+            <a:r>
+              <a:rPr lang="en-US" altLang="zh-TW" dirty="0" smtClean="0"/>
+              <a:t>R</a:t>
+            </a:r>
+            <a:r>
+              <a:rPr lang="en-US" dirty="0" smtClean="0"/>
+              <a:t>ealizations </a:t>
+            </a:r>
+            <a:r>
+              <a:rPr lang="en-US" dirty="0" smtClean="0"/>
+              <a:t/>
             </a:r>
             <a:br>
               <a:rPr lang="en-US" dirty="0" smtClean="0"/>

</xml_diff>

<commit_message>
commit doc and diagram and server unit test
</commit_message>
<xml_diff>
--- a/OOAD_Midterm.pptx
+++ b/OOAD_Midterm.pptx
@@ -25,8 +25,8 @@
     <p:sldId id="275" r:id="rId13"/>
     <p:sldId id="291" r:id="rId14"/>
     <p:sldId id="290" r:id="rId15"/>
-    <p:sldId id="294" r:id="rId16"/>
-    <p:sldId id="292" r:id="rId17"/>
+    <p:sldId id="292" r:id="rId16"/>
+    <p:sldId id="300" r:id="rId17"/>
     <p:sldId id="296" r:id="rId18"/>
     <p:sldId id="293" r:id="rId19"/>
     <p:sldId id="295" r:id="rId20"/>
@@ -37,12 +37,12 @@
     <p:sldId id="299" r:id="rId25"/>
     <p:sldId id="278" r:id="rId26"/>
     <p:sldId id="279" r:id="rId27"/>
-    <p:sldId id="280" r:id="rId28"/>
+    <p:sldId id="301" r:id="rId28"/>
     <p:sldId id="281" r:id="rId29"/>
-    <p:sldId id="268" r:id="rId30"/>
+    <p:sldId id="302" r:id="rId30"/>
   </p:sldIdLst>
   <p:sldSz cx="9144000" cy="5143500" type="screen16x9"/>
-  <p:notesSz cx="6858000" cy="9144000"/>
+  <p:notesSz cx="9144000" cy="6858000"/>
   <p:embeddedFontLst>
     <p:embeddedFont>
       <p:font typeface="Roboto Slab" panose="02020500000000000000" charset="0"/>
@@ -337,7 +337,7 @@
         <p:spPr>
           <a:xfrm>
             <a:off x="0" y="0"/>
-            <a:ext cx="2971800" cy="458788"/>
+            <a:ext cx="3962400" cy="344091"/>
           </a:xfrm>
           <a:prstGeom prst="rect">
             <a:avLst/>
@@ -367,8 +367,8 @@
         </p:nvSpPr>
         <p:spPr>
           <a:xfrm>
-            <a:off x="3884613" y="0"/>
-            <a:ext cx="2971800" cy="458788"/>
+            <a:off x="5179484" y="0"/>
+            <a:ext cx="3962400" cy="344091"/>
           </a:xfrm>
           <a:prstGeom prst="rect">
             <a:avLst/>
@@ -402,8 +402,8 @@
         </p:nvSpPr>
         <p:spPr>
           <a:xfrm>
-            <a:off x="0" y="8685213"/>
-            <a:ext cx="2971800" cy="458787"/>
+            <a:off x="0" y="6513910"/>
+            <a:ext cx="3962400" cy="344090"/>
           </a:xfrm>
           <a:prstGeom prst="rect">
             <a:avLst/>
@@ -433,8 +433,8 @@
         </p:nvSpPr>
         <p:spPr>
           <a:xfrm>
-            <a:off x="3884613" y="8685213"/>
-            <a:ext cx="2971800" cy="458787"/>
+            <a:off x="5179484" y="6513910"/>
+            <a:ext cx="3962400" cy="344090"/>
           </a:xfrm>
           <a:prstGeom prst="rect">
             <a:avLst/>
@@ -502,8 +502,8 @@
         </p:nvSpPr>
         <p:spPr>
           <a:xfrm>
-            <a:off x="381175" y="685800"/>
-            <a:ext cx="6096300" cy="3429000"/>
+            <a:off x="2286000" y="514350"/>
+            <a:ext cx="4572000" cy="2571750"/>
           </a:xfrm>
           <a:custGeom>
             <a:avLst/>
@@ -553,8 +553,8 @@
         </p:nvSpPr>
         <p:spPr>
           <a:xfrm>
-            <a:off x="685800" y="4343400"/>
-            <a:ext cx="5486400" cy="4114800"/>
+            <a:off x="914400" y="3257550"/>
+            <a:ext cx="7315200" cy="3086100"/>
           </a:xfrm>
           <a:prstGeom prst="rect">
             <a:avLst/>
@@ -937,8 +937,8 @@
         </p:nvSpPr>
         <p:spPr>
           <a:xfrm>
-            <a:off x="381000" y="685800"/>
-            <a:ext cx="6096000" cy="3429000"/>
+            <a:off x="2286000" y="514350"/>
+            <a:ext cx="4572000" cy="2571750"/>
           </a:xfrm>
           <a:custGeom>
             <a:avLst/>
@@ -978,8 +978,8 @@
         </p:nvSpPr>
         <p:spPr>
           <a:xfrm>
-            <a:off x="685800" y="4343400"/>
-            <a:ext cx="5486400" cy="4114800"/>
+            <a:off x="914400" y="3257550"/>
+            <a:ext cx="7315200" cy="3086100"/>
           </a:xfrm>
           <a:prstGeom prst="rect">
             <a:avLst/>
@@ -1041,8 +1041,8 @@
         </p:nvSpPr>
         <p:spPr>
           <a:xfrm>
-            <a:off x="381000" y="685800"/>
-            <a:ext cx="6096000" cy="3429000"/>
+            <a:off x="2286000" y="514350"/>
+            <a:ext cx="4572000" cy="2571750"/>
           </a:xfrm>
           <a:custGeom>
             <a:avLst/>
@@ -1082,8 +1082,8 @@
         </p:nvSpPr>
         <p:spPr>
           <a:xfrm>
-            <a:off x="685800" y="4343400"/>
-            <a:ext cx="5486400" cy="4114800"/>
+            <a:off x="914400" y="3257550"/>
+            <a:ext cx="7315200" cy="3086100"/>
           </a:xfrm>
           <a:prstGeom prst="rect">
             <a:avLst/>
@@ -1150,8 +1150,8 @@
         </p:nvSpPr>
         <p:spPr>
           <a:xfrm>
-            <a:off x="381000" y="685800"/>
-            <a:ext cx="6096000" cy="3429000"/>
+            <a:off x="2286000" y="514350"/>
+            <a:ext cx="4572000" cy="2571750"/>
           </a:xfrm>
           <a:custGeom>
             <a:avLst/>
@@ -1191,8 +1191,8 @@
         </p:nvSpPr>
         <p:spPr>
           <a:xfrm>
-            <a:off x="685800" y="4343400"/>
-            <a:ext cx="5486400" cy="4114800"/>
+            <a:off x="914400" y="3257550"/>
+            <a:ext cx="7315200" cy="3086100"/>
           </a:xfrm>
           <a:prstGeom prst="rect">
             <a:avLst/>
@@ -1259,8 +1259,8 @@
         </p:nvSpPr>
         <p:spPr>
           <a:xfrm>
-            <a:off x="381000" y="685800"/>
-            <a:ext cx="6096000" cy="3429000"/>
+            <a:off x="2286000" y="514350"/>
+            <a:ext cx="4572000" cy="2571750"/>
           </a:xfrm>
           <a:custGeom>
             <a:avLst/>
@@ -1300,8 +1300,8 @@
         </p:nvSpPr>
         <p:spPr>
           <a:xfrm>
-            <a:off x="685800" y="4343400"/>
-            <a:ext cx="5486400" cy="4114800"/>
+            <a:off x="914400" y="3257550"/>
+            <a:ext cx="7315200" cy="3086100"/>
           </a:xfrm>
           <a:prstGeom prst="rect">
             <a:avLst/>
@@ -1368,8 +1368,8 @@
         </p:nvSpPr>
         <p:spPr>
           <a:xfrm>
-            <a:off x="381000" y="685800"/>
-            <a:ext cx="6096000" cy="3429000"/>
+            <a:off x="2286000" y="514350"/>
+            <a:ext cx="4572000" cy="2571750"/>
           </a:xfrm>
           <a:custGeom>
             <a:avLst/>
@@ -1409,8 +1409,8 @@
         </p:nvSpPr>
         <p:spPr>
           <a:xfrm>
-            <a:off x="685800" y="4343400"/>
-            <a:ext cx="5486400" cy="4114800"/>
+            <a:off x="914400" y="3257550"/>
+            <a:ext cx="7315200" cy="3086100"/>
           </a:xfrm>
           <a:prstGeom prst="rect">
             <a:avLst/>
@@ -1477,8 +1477,8 @@
         </p:nvSpPr>
         <p:spPr>
           <a:xfrm>
-            <a:off x="381000" y="685800"/>
-            <a:ext cx="6096000" cy="3429000"/>
+            <a:off x="2286000" y="514350"/>
+            <a:ext cx="4572000" cy="2571750"/>
           </a:xfrm>
           <a:custGeom>
             <a:avLst/>
@@ -1518,8 +1518,8 @@
         </p:nvSpPr>
         <p:spPr>
           <a:xfrm>
-            <a:off x="685800" y="4343400"/>
-            <a:ext cx="5486400" cy="4114800"/>
+            <a:off x="914400" y="3257550"/>
+            <a:ext cx="7315200" cy="3086100"/>
           </a:xfrm>
           <a:prstGeom prst="rect">
             <a:avLst/>
@@ -1586,8 +1586,8 @@
         </p:nvSpPr>
         <p:spPr>
           <a:xfrm>
-            <a:off x="381000" y="685800"/>
-            <a:ext cx="6096000" cy="3429000"/>
+            <a:off x="2286000" y="514350"/>
+            <a:ext cx="4572000" cy="2571750"/>
           </a:xfrm>
           <a:custGeom>
             <a:avLst/>
@@ -1627,8 +1627,8 @@
         </p:nvSpPr>
         <p:spPr>
           <a:xfrm>
-            <a:off x="685800" y="4343400"/>
-            <a:ext cx="5486400" cy="4114800"/>
+            <a:off x="914400" y="3257550"/>
+            <a:ext cx="7315200" cy="3086100"/>
           </a:xfrm>
           <a:prstGeom prst="rect">
             <a:avLst/>
@@ -1656,7 +1656,7 @@
     </p:spTree>
     <p:extLst>
       <p:ext uri="{BB962C8B-B14F-4D97-AF65-F5344CB8AC3E}">
-        <p14:creationId xmlns:p14="http://schemas.microsoft.com/office/powerpoint/2010/main" val="405957904"/>
+        <p14:creationId xmlns:p14="http://schemas.microsoft.com/office/powerpoint/2010/main" val="2769621835"/>
       </p:ext>
     </p:extLst>
   </p:cSld>
@@ -1695,8 +1695,8 @@
         </p:nvSpPr>
         <p:spPr>
           <a:xfrm>
-            <a:off x="381000" y="685800"/>
-            <a:ext cx="6096000" cy="3429000"/>
+            <a:off x="2286000" y="514350"/>
+            <a:ext cx="4572000" cy="2571750"/>
           </a:xfrm>
           <a:custGeom>
             <a:avLst/>
@@ -1736,8 +1736,8 @@
         </p:nvSpPr>
         <p:spPr>
           <a:xfrm>
-            <a:off x="685800" y="4343400"/>
-            <a:ext cx="5486400" cy="4114800"/>
+            <a:off x="914400" y="3257550"/>
+            <a:ext cx="7315200" cy="3086100"/>
           </a:xfrm>
           <a:prstGeom prst="rect">
             <a:avLst/>
@@ -1765,7 +1765,7 @@
     </p:spTree>
     <p:extLst>
       <p:ext uri="{BB962C8B-B14F-4D97-AF65-F5344CB8AC3E}">
-        <p14:creationId xmlns:p14="http://schemas.microsoft.com/office/powerpoint/2010/main" val="2769621835"/>
+        <p14:creationId xmlns:p14="http://schemas.microsoft.com/office/powerpoint/2010/main" val="2892188042"/>
       </p:ext>
     </p:extLst>
   </p:cSld>
@@ -1804,8 +1804,8 @@
         </p:nvSpPr>
         <p:spPr>
           <a:xfrm>
-            <a:off x="381000" y="685800"/>
-            <a:ext cx="6096000" cy="3429000"/>
+            <a:off x="2286000" y="514350"/>
+            <a:ext cx="4572000" cy="2571750"/>
           </a:xfrm>
           <a:custGeom>
             <a:avLst/>
@@ -1845,8 +1845,8 @@
         </p:nvSpPr>
         <p:spPr>
           <a:xfrm>
-            <a:off x="685800" y="4343400"/>
-            <a:ext cx="5486400" cy="4114800"/>
+            <a:off x="914400" y="3257550"/>
+            <a:ext cx="7315200" cy="3086100"/>
           </a:xfrm>
           <a:prstGeom prst="rect">
             <a:avLst/>
@@ -1913,8 +1913,8 @@
         </p:nvSpPr>
         <p:spPr>
           <a:xfrm>
-            <a:off x="381000" y="685800"/>
-            <a:ext cx="6096000" cy="3429000"/>
+            <a:off x="2286000" y="514350"/>
+            <a:ext cx="4572000" cy="2571750"/>
           </a:xfrm>
           <a:custGeom>
             <a:avLst/>
@@ -1954,8 +1954,8 @@
         </p:nvSpPr>
         <p:spPr>
           <a:xfrm>
-            <a:off x="685800" y="4343400"/>
-            <a:ext cx="5486400" cy="4114800"/>
+            <a:off x="914400" y="3257550"/>
+            <a:ext cx="7315200" cy="3086100"/>
           </a:xfrm>
           <a:prstGeom prst="rect">
             <a:avLst/>
@@ -2022,8 +2022,8 @@
         </p:nvSpPr>
         <p:spPr>
           <a:xfrm>
-            <a:off x="381000" y="685800"/>
-            <a:ext cx="6096000" cy="3429000"/>
+            <a:off x="2286000" y="514350"/>
+            <a:ext cx="4572000" cy="2571750"/>
           </a:xfrm>
           <a:custGeom>
             <a:avLst/>
@@ -2063,8 +2063,8 @@
         </p:nvSpPr>
         <p:spPr>
           <a:xfrm>
-            <a:off x="685800" y="4343400"/>
-            <a:ext cx="5486400" cy="4114800"/>
+            <a:off x="914400" y="3257550"/>
+            <a:ext cx="7315200" cy="3086100"/>
           </a:xfrm>
           <a:prstGeom prst="rect">
             <a:avLst/>
@@ -2131,8 +2131,8 @@
         </p:nvSpPr>
         <p:spPr>
           <a:xfrm>
-            <a:off x="381000" y="685800"/>
-            <a:ext cx="6096000" cy="3429000"/>
+            <a:off x="2286000" y="514350"/>
+            <a:ext cx="4572000" cy="2571750"/>
           </a:xfrm>
           <a:custGeom>
             <a:avLst/>
@@ -2172,8 +2172,8 @@
         </p:nvSpPr>
         <p:spPr>
           <a:xfrm>
-            <a:off x="685800" y="4343400"/>
-            <a:ext cx="5486400" cy="4114800"/>
+            <a:off x="914400" y="3257550"/>
+            <a:ext cx="7315200" cy="3086100"/>
           </a:xfrm>
           <a:prstGeom prst="rect">
             <a:avLst/>
@@ -2235,8 +2235,8 @@
         </p:nvSpPr>
         <p:spPr>
           <a:xfrm>
-            <a:off x="381000" y="685800"/>
-            <a:ext cx="6096000" cy="3429000"/>
+            <a:off x="2286000" y="514350"/>
+            <a:ext cx="4572000" cy="2571750"/>
           </a:xfrm>
           <a:custGeom>
             <a:avLst/>
@@ -2276,8 +2276,8 @@
         </p:nvSpPr>
         <p:spPr>
           <a:xfrm>
-            <a:off x="685800" y="4343400"/>
-            <a:ext cx="5486400" cy="4114800"/>
+            <a:off x="914400" y="3257550"/>
+            <a:ext cx="7315200" cy="3086100"/>
           </a:xfrm>
           <a:prstGeom prst="rect">
             <a:avLst/>
@@ -2344,8 +2344,8 @@
         </p:nvSpPr>
         <p:spPr>
           <a:xfrm>
-            <a:off x="381000" y="685800"/>
-            <a:ext cx="6096000" cy="3429000"/>
+            <a:off x="2286000" y="514350"/>
+            <a:ext cx="4572000" cy="2571750"/>
           </a:xfrm>
           <a:custGeom>
             <a:avLst/>
@@ -2385,8 +2385,8 @@
         </p:nvSpPr>
         <p:spPr>
           <a:xfrm>
-            <a:off x="685800" y="4343400"/>
-            <a:ext cx="5486400" cy="4114800"/>
+            <a:off x="914400" y="3257550"/>
+            <a:ext cx="7315200" cy="3086100"/>
           </a:xfrm>
           <a:prstGeom prst="rect">
             <a:avLst/>
@@ -2453,8 +2453,8 @@
         </p:nvSpPr>
         <p:spPr>
           <a:xfrm>
-            <a:off x="381000" y="685800"/>
-            <a:ext cx="6096000" cy="3429000"/>
+            <a:off x="2286000" y="514350"/>
+            <a:ext cx="4572000" cy="2571750"/>
           </a:xfrm>
           <a:custGeom>
             <a:avLst/>
@@ -2494,8 +2494,8 @@
         </p:nvSpPr>
         <p:spPr>
           <a:xfrm>
-            <a:off x="685800" y="4343400"/>
-            <a:ext cx="5486400" cy="4114800"/>
+            <a:off x="914400" y="3257550"/>
+            <a:ext cx="7315200" cy="3086100"/>
           </a:xfrm>
           <a:prstGeom prst="rect">
             <a:avLst/>
@@ -2562,8 +2562,8 @@
         </p:nvSpPr>
         <p:spPr>
           <a:xfrm>
-            <a:off x="381000" y="685800"/>
-            <a:ext cx="6096000" cy="3429000"/>
+            <a:off x="2286000" y="514350"/>
+            <a:ext cx="4572000" cy="2571750"/>
           </a:xfrm>
           <a:custGeom>
             <a:avLst/>
@@ -2603,8 +2603,8 @@
         </p:nvSpPr>
         <p:spPr>
           <a:xfrm>
-            <a:off x="685800" y="4343400"/>
-            <a:ext cx="5486400" cy="4114800"/>
+            <a:off x="914400" y="3257550"/>
+            <a:ext cx="7315200" cy="3086100"/>
           </a:xfrm>
           <a:prstGeom prst="rect">
             <a:avLst/>
@@ -2671,8 +2671,8 @@
         </p:nvSpPr>
         <p:spPr>
           <a:xfrm>
-            <a:off x="381000" y="685800"/>
-            <a:ext cx="6096000" cy="3429000"/>
+            <a:off x="2286000" y="514350"/>
+            <a:ext cx="4572000" cy="2571750"/>
           </a:xfrm>
           <a:custGeom>
             <a:avLst/>
@@ -2712,8 +2712,8 @@
         </p:nvSpPr>
         <p:spPr>
           <a:xfrm>
-            <a:off x="685800" y="4343400"/>
-            <a:ext cx="5486400" cy="4114800"/>
+            <a:off x="914400" y="3257550"/>
+            <a:ext cx="7315200" cy="3086100"/>
           </a:xfrm>
           <a:prstGeom prst="rect">
             <a:avLst/>
@@ -2780,8 +2780,8 @@
         </p:nvSpPr>
         <p:spPr>
           <a:xfrm>
-            <a:off x="381000" y="685800"/>
-            <a:ext cx="6096000" cy="3429000"/>
+            <a:off x="2286000" y="514350"/>
+            <a:ext cx="4572000" cy="2571750"/>
           </a:xfrm>
           <a:custGeom>
             <a:avLst/>
@@ -2821,8 +2821,8 @@
         </p:nvSpPr>
         <p:spPr>
           <a:xfrm>
-            <a:off x="685800" y="4343400"/>
-            <a:ext cx="5486400" cy="4114800"/>
+            <a:off x="914400" y="3257550"/>
+            <a:ext cx="7315200" cy="3086100"/>
           </a:xfrm>
           <a:prstGeom prst="rect">
             <a:avLst/>
@@ -2889,8 +2889,8 @@
         </p:nvSpPr>
         <p:spPr>
           <a:xfrm>
-            <a:off x="381000" y="685800"/>
-            <a:ext cx="6096000" cy="3429000"/>
+            <a:off x="2286000" y="514350"/>
+            <a:ext cx="4572000" cy="2571750"/>
           </a:xfrm>
           <a:custGeom>
             <a:avLst/>
@@ -2930,8 +2930,8 @@
         </p:nvSpPr>
         <p:spPr>
           <a:xfrm>
-            <a:off x="685800" y="4343400"/>
-            <a:ext cx="5486400" cy="4114800"/>
+            <a:off x="914400" y="3257550"/>
+            <a:ext cx="7315200" cy="3086100"/>
           </a:xfrm>
           <a:prstGeom prst="rect">
             <a:avLst/>
@@ -2998,8 +2998,8 @@
         </p:nvSpPr>
         <p:spPr>
           <a:xfrm>
-            <a:off x="381000" y="685800"/>
-            <a:ext cx="6096000" cy="3429000"/>
+            <a:off x="2286000" y="514350"/>
+            <a:ext cx="4572000" cy="2571750"/>
           </a:xfrm>
           <a:custGeom>
             <a:avLst/>
@@ -3039,8 +3039,8 @@
         </p:nvSpPr>
         <p:spPr>
           <a:xfrm>
-            <a:off x="685800" y="4343400"/>
-            <a:ext cx="5486400" cy="4114800"/>
+            <a:off x="914400" y="3257550"/>
+            <a:ext cx="7315200" cy="3086100"/>
           </a:xfrm>
           <a:prstGeom prst="rect">
             <a:avLst/>
@@ -3068,7 +3068,7 @@
     </p:spTree>
     <p:extLst>
       <p:ext uri="{BB962C8B-B14F-4D97-AF65-F5344CB8AC3E}">
-        <p14:creationId xmlns:p14="http://schemas.microsoft.com/office/powerpoint/2010/main" val="1667879884"/>
+        <p14:creationId xmlns:p14="http://schemas.microsoft.com/office/powerpoint/2010/main" val="3428755685"/>
       </p:ext>
     </p:extLst>
   </p:cSld>
@@ -3107,8 +3107,8 @@
         </p:nvSpPr>
         <p:spPr>
           <a:xfrm>
-            <a:off x="381000" y="685800"/>
-            <a:ext cx="6096000" cy="3429000"/>
+            <a:off x="2286000" y="514350"/>
+            <a:ext cx="4572000" cy="2571750"/>
           </a:xfrm>
           <a:custGeom>
             <a:avLst/>
@@ -3148,8 +3148,8 @@
         </p:nvSpPr>
         <p:spPr>
           <a:xfrm>
-            <a:off x="685800" y="4343400"/>
-            <a:ext cx="5486400" cy="4114800"/>
+            <a:off x="914400" y="3257550"/>
+            <a:ext cx="7315200" cy="3086100"/>
           </a:xfrm>
           <a:prstGeom prst="rect">
             <a:avLst/>
@@ -3188,110 +3188,6 @@
 </file>
 
 <file path=ppt/notesSlides/notesSlide29.xml><?xml version="1.0" encoding="utf-8"?>
-<p:notes xmlns:a="http://schemas.openxmlformats.org/drawingml/2006/main" xmlns:r="http://schemas.openxmlformats.org/officeDocument/2006/relationships" xmlns:p="http://schemas.openxmlformats.org/presentationml/2006/main" showMasterSp="0" showMasterPhAnim="0">
-  <p:cSld>
-    <p:spTree>
-      <p:nvGrpSpPr>
-        <p:cNvPr id="1" name="Shape 239"/>
-        <p:cNvGrpSpPr/>
-        <p:nvPr/>
-      </p:nvGrpSpPr>
-      <p:grpSpPr>
-        <a:xfrm>
-          <a:off x="0" y="0"/>
-          <a:ext cx="0" cy="0"/>
-          <a:chOff x="0" y="0"/>
-          <a:chExt cx="0" cy="0"/>
-        </a:xfrm>
-      </p:grpSpPr>
-      <p:sp>
-        <p:nvSpPr>
-          <p:cNvPr id="240" name="Shape 240"/>
-          <p:cNvSpPr>
-            <a:spLocks noGrp="1" noRot="1" noChangeAspect="1"/>
-          </p:cNvSpPr>
-          <p:nvPr>
-            <p:ph type="sldImg" idx="2"/>
-          </p:nvPr>
-        </p:nvSpPr>
-        <p:spPr>
-          <a:xfrm>
-            <a:off x="381000" y="685800"/>
-            <a:ext cx="6096000" cy="3429000"/>
-          </a:xfrm>
-          <a:custGeom>
-            <a:avLst/>
-            <a:gdLst/>
-            <a:ahLst/>
-            <a:cxnLst/>
-            <a:rect l="0" t="0" r="0" b="0"/>
-            <a:pathLst>
-              <a:path w="120000" h="120000" extrusionOk="0">
-                <a:moveTo>
-                  <a:pt x="0" y="0"/>
-                </a:moveTo>
-                <a:lnTo>
-                  <a:pt x="120000" y="0"/>
-                </a:lnTo>
-                <a:lnTo>
-                  <a:pt x="120000" y="120000"/>
-                </a:lnTo>
-                <a:lnTo>
-                  <a:pt x="0" y="120000"/>
-                </a:lnTo>
-                <a:close/>
-              </a:path>
-            </a:pathLst>
-          </a:custGeom>
-        </p:spPr>
-      </p:sp>
-      <p:sp>
-        <p:nvSpPr>
-          <p:cNvPr id="241" name="Shape 241"/>
-          <p:cNvSpPr txBox="1">
-            <a:spLocks noGrp="1"/>
-          </p:cNvSpPr>
-          <p:nvPr>
-            <p:ph type="body" idx="1"/>
-          </p:nvPr>
-        </p:nvSpPr>
-        <p:spPr>
-          <a:xfrm>
-            <a:off x="685800" y="4343400"/>
-            <a:ext cx="5486400" cy="4114800"/>
-          </a:xfrm>
-          <a:prstGeom prst="rect">
-            <a:avLst/>
-          </a:prstGeom>
-        </p:spPr>
-        <p:txBody>
-          <a:bodyPr spcFirstLastPara="1" wrap="square" lIns="91425" tIns="91425" rIns="91425" bIns="91425" anchor="t" anchorCtr="0">
-            <a:noAutofit/>
-          </a:bodyPr>
-          <a:lstStyle/>
-          <a:p>
-            <a:pPr marL="0" lvl="0" indent="0" rtl="0">
-              <a:spcBef>
-                <a:spcPts val="0"/>
-              </a:spcBef>
-              <a:spcAft>
-                <a:spcPts val="0"/>
-              </a:spcAft>
-              <a:buNone/>
-            </a:pPr>
-            <a:endParaRPr/>
-          </a:p>
-        </p:txBody>
-      </p:sp>
-    </p:spTree>
-  </p:cSld>
-  <p:clrMapOvr>
-    <a:masterClrMapping/>
-  </p:clrMapOvr>
-</p:notes>
-</file>
-
-<file path=ppt/notesSlides/notesSlide3.xml><?xml version="1.0" encoding="utf-8"?>
 <p:notes xmlns:a="http://schemas.openxmlformats.org/drawingml/2006/main" xmlns:r="http://schemas.openxmlformats.org/officeDocument/2006/relationships" xmlns:p="http://schemas.openxmlformats.org/presentationml/2006/main" showMasterSp="0" showMasterPhAnim="0">
   <p:cSld>
     <p:spTree>
@@ -3320,8 +3216,8 @@
         </p:nvSpPr>
         <p:spPr>
           <a:xfrm>
-            <a:off x="381000" y="685800"/>
-            <a:ext cx="6096000" cy="3429000"/>
+            <a:off x="2286000" y="514350"/>
+            <a:ext cx="4572000" cy="2571750"/>
           </a:xfrm>
           <a:custGeom>
             <a:avLst/>
@@ -3361,8 +3257,117 @@
         </p:nvSpPr>
         <p:spPr>
           <a:xfrm>
-            <a:off x="685800" y="4343400"/>
-            <a:ext cx="5486400" cy="4114800"/>
+            <a:off x="914400" y="3257550"/>
+            <a:ext cx="7315200" cy="3086100"/>
+          </a:xfrm>
+          <a:prstGeom prst="rect">
+            <a:avLst/>
+          </a:prstGeom>
+        </p:spPr>
+        <p:txBody>
+          <a:bodyPr spcFirstLastPara="1" wrap="square" lIns="91425" tIns="91425" rIns="91425" bIns="91425" anchor="t" anchorCtr="0">
+            <a:noAutofit/>
+          </a:bodyPr>
+          <a:lstStyle/>
+          <a:p>
+            <a:pPr marL="0" lvl="0" indent="0">
+              <a:spcBef>
+                <a:spcPts val="0"/>
+              </a:spcBef>
+              <a:spcAft>
+                <a:spcPts val="0"/>
+              </a:spcAft>
+              <a:buNone/>
+            </a:pPr>
+            <a:endParaRPr/>
+          </a:p>
+        </p:txBody>
+      </p:sp>
+    </p:spTree>
+    <p:extLst>
+      <p:ext uri="{BB962C8B-B14F-4D97-AF65-F5344CB8AC3E}">
+        <p14:creationId xmlns:p14="http://schemas.microsoft.com/office/powerpoint/2010/main" val="1640545350"/>
+      </p:ext>
+    </p:extLst>
+  </p:cSld>
+  <p:clrMapOvr>
+    <a:masterClrMapping/>
+  </p:clrMapOvr>
+</p:notes>
+</file>
+
+<file path=ppt/notesSlides/notesSlide3.xml><?xml version="1.0" encoding="utf-8"?>
+<p:notes xmlns:a="http://schemas.openxmlformats.org/drawingml/2006/main" xmlns:r="http://schemas.openxmlformats.org/officeDocument/2006/relationships" xmlns:p="http://schemas.openxmlformats.org/presentationml/2006/main" showMasterSp="0" showMasterPhAnim="0">
+  <p:cSld>
+    <p:spTree>
+      <p:nvGrpSpPr>
+        <p:cNvPr id="1" name="Shape 107"/>
+        <p:cNvGrpSpPr/>
+        <p:nvPr/>
+      </p:nvGrpSpPr>
+      <p:grpSpPr>
+        <a:xfrm>
+          <a:off x="0" y="0"/>
+          <a:ext cx="0" cy="0"/>
+          <a:chOff x="0" y="0"/>
+          <a:chExt cx="0" cy="0"/>
+        </a:xfrm>
+      </p:grpSpPr>
+      <p:sp>
+        <p:nvSpPr>
+          <p:cNvPr id="108" name="Shape 108"/>
+          <p:cNvSpPr>
+            <a:spLocks noGrp="1" noRot="1" noChangeAspect="1"/>
+          </p:cNvSpPr>
+          <p:nvPr>
+            <p:ph type="sldImg" idx="2"/>
+          </p:nvPr>
+        </p:nvSpPr>
+        <p:spPr>
+          <a:xfrm>
+            <a:off x="2286000" y="514350"/>
+            <a:ext cx="4572000" cy="2571750"/>
+          </a:xfrm>
+          <a:custGeom>
+            <a:avLst/>
+            <a:gdLst/>
+            <a:ahLst/>
+            <a:cxnLst/>
+            <a:rect l="0" t="0" r="0" b="0"/>
+            <a:pathLst>
+              <a:path w="120000" h="120000" extrusionOk="0">
+                <a:moveTo>
+                  <a:pt x="0" y="0"/>
+                </a:moveTo>
+                <a:lnTo>
+                  <a:pt x="120000" y="0"/>
+                </a:lnTo>
+                <a:lnTo>
+                  <a:pt x="120000" y="120000"/>
+                </a:lnTo>
+                <a:lnTo>
+                  <a:pt x="0" y="120000"/>
+                </a:lnTo>
+                <a:close/>
+              </a:path>
+            </a:pathLst>
+          </a:custGeom>
+        </p:spPr>
+      </p:sp>
+      <p:sp>
+        <p:nvSpPr>
+          <p:cNvPr id="109" name="Shape 109"/>
+          <p:cNvSpPr txBox="1">
+            <a:spLocks noGrp="1"/>
+          </p:cNvSpPr>
+          <p:nvPr>
+            <p:ph type="body" idx="1"/>
+          </p:nvPr>
+        </p:nvSpPr>
+        <p:spPr>
+          <a:xfrm>
+            <a:off x="914400" y="3257550"/>
+            <a:ext cx="7315200" cy="3086100"/>
           </a:xfrm>
           <a:prstGeom prst="rect">
             <a:avLst/>
@@ -3429,8 +3434,8 @@
         </p:nvSpPr>
         <p:spPr>
           <a:xfrm>
-            <a:off x="381000" y="685800"/>
-            <a:ext cx="6096000" cy="3429000"/>
+            <a:off x="2286000" y="514350"/>
+            <a:ext cx="4572000" cy="2571750"/>
           </a:xfrm>
           <a:custGeom>
             <a:avLst/>
@@ -3470,8 +3475,8 @@
         </p:nvSpPr>
         <p:spPr>
           <a:xfrm>
-            <a:off x="685800" y="4343400"/>
-            <a:ext cx="5486400" cy="4114800"/>
+            <a:off x="914400" y="3257550"/>
+            <a:ext cx="7315200" cy="3086100"/>
           </a:xfrm>
           <a:prstGeom prst="rect">
             <a:avLst/>
@@ -3538,8 +3543,8 @@
         </p:nvSpPr>
         <p:spPr>
           <a:xfrm>
-            <a:off x="381000" y="685800"/>
-            <a:ext cx="6096000" cy="3429000"/>
+            <a:off x="2286000" y="514350"/>
+            <a:ext cx="4572000" cy="2571750"/>
           </a:xfrm>
           <a:custGeom>
             <a:avLst/>
@@ -3579,8 +3584,8 @@
         </p:nvSpPr>
         <p:spPr>
           <a:xfrm>
-            <a:off x="685800" y="4343400"/>
-            <a:ext cx="5486400" cy="4114800"/>
+            <a:off x="914400" y="3257550"/>
+            <a:ext cx="7315200" cy="3086100"/>
           </a:xfrm>
           <a:prstGeom prst="rect">
             <a:avLst/>
@@ -3647,8 +3652,8 @@
         </p:nvSpPr>
         <p:spPr>
           <a:xfrm>
-            <a:off x="381000" y="685800"/>
-            <a:ext cx="6096000" cy="3429000"/>
+            <a:off x="2286000" y="514350"/>
+            <a:ext cx="4572000" cy="2571750"/>
           </a:xfrm>
           <a:custGeom>
             <a:avLst/>
@@ -3688,8 +3693,8 @@
         </p:nvSpPr>
         <p:spPr>
           <a:xfrm>
-            <a:off x="685800" y="4343400"/>
-            <a:ext cx="5486400" cy="4114800"/>
+            <a:off x="914400" y="3257550"/>
+            <a:ext cx="7315200" cy="3086100"/>
           </a:xfrm>
           <a:prstGeom prst="rect">
             <a:avLst/>
@@ -3756,8 +3761,8 @@
         </p:nvSpPr>
         <p:spPr>
           <a:xfrm>
-            <a:off x="381000" y="685800"/>
-            <a:ext cx="6096000" cy="3429000"/>
+            <a:off x="2286000" y="514350"/>
+            <a:ext cx="4572000" cy="2571750"/>
           </a:xfrm>
           <a:custGeom>
             <a:avLst/>
@@ -3797,8 +3802,8 @@
         </p:nvSpPr>
         <p:spPr>
           <a:xfrm>
-            <a:off x="685800" y="4343400"/>
-            <a:ext cx="5486400" cy="4114800"/>
+            <a:off x="914400" y="3257550"/>
+            <a:ext cx="7315200" cy="3086100"/>
           </a:xfrm>
           <a:prstGeom prst="rect">
             <a:avLst/>
@@ -3865,8 +3870,8 @@
         </p:nvSpPr>
         <p:spPr>
           <a:xfrm>
-            <a:off x="381000" y="685800"/>
-            <a:ext cx="6096000" cy="3429000"/>
+            <a:off x="2286000" y="514350"/>
+            <a:ext cx="4572000" cy="2571750"/>
           </a:xfrm>
           <a:custGeom>
             <a:avLst/>
@@ -3906,8 +3911,8 @@
         </p:nvSpPr>
         <p:spPr>
           <a:xfrm>
-            <a:off x="685800" y="4343400"/>
-            <a:ext cx="5486400" cy="4114800"/>
+            <a:off x="914400" y="3257550"/>
+            <a:ext cx="7315200" cy="3086100"/>
           </a:xfrm>
           <a:prstGeom prst="rect">
             <a:avLst/>
@@ -3974,8 +3979,8 @@
         </p:nvSpPr>
         <p:spPr>
           <a:xfrm>
-            <a:off x="381000" y="685800"/>
-            <a:ext cx="6096000" cy="3429000"/>
+            <a:off x="2286000" y="514350"/>
+            <a:ext cx="4572000" cy="2571750"/>
           </a:xfrm>
           <a:custGeom>
             <a:avLst/>
@@ -4015,8 +4020,8 @@
         </p:nvSpPr>
         <p:spPr>
           <a:xfrm>
-            <a:off x="685800" y="4343400"/>
-            <a:ext cx="5486400" cy="4114800"/>
+            <a:off x="914400" y="3257550"/>
+            <a:ext cx="7315200" cy="3086100"/>
           </a:xfrm>
           <a:prstGeom prst="rect">
             <a:avLst/>
@@ -9875,8 +9880,8 @@
         </p:blipFill>
         <p:spPr>
           <a:xfrm>
-            <a:off x="3894200" y="768548"/>
-            <a:ext cx="5013580" cy="4157427"/>
+            <a:off x="3855720" y="746571"/>
+            <a:ext cx="5219700" cy="4328349"/>
           </a:xfrm>
           <a:prstGeom prst="rect">
             <a:avLst/>
@@ -10550,8 +10555,8 @@
         </p:blipFill>
         <p:spPr>
           <a:xfrm>
-            <a:off x="2327370" y="1482749"/>
-            <a:ext cx="5018371" cy="3584551"/>
+            <a:off x="1562100" y="1404213"/>
+            <a:ext cx="5235001" cy="3739287"/>
           </a:xfrm>
           <a:prstGeom prst="rect">
             <a:avLst/>
@@ -11514,8 +11519,8 @@
         </p:blipFill>
         <p:spPr>
           <a:xfrm>
-            <a:off x="2327370" y="1482749"/>
-            <a:ext cx="5018371" cy="3584550"/>
+            <a:off x="1106268" y="1228289"/>
+            <a:ext cx="6331162" cy="3915211"/>
           </a:xfrm>
           <a:prstGeom prst="rect">
             <a:avLst/>
@@ -12478,8 +12483,8 @@
         </p:blipFill>
         <p:spPr>
           <a:xfrm>
-            <a:off x="2327370" y="1775633"/>
-            <a:ext cx="5018371" cy="2998782"/>
+            <a:off x="1363980" y="1365188"/>
+            <a:ext cx="6322891" cy="3778312"/>
           </a:xfrm>
           <a:prstGeom prst="rect">
             <a:avLst/>
@@ -12814,6 +12819,54 @@
       </p:grpSpPr>
       <p:sp>
         <p:nvSpPr>
+          <p:cNvPr id="2" name="矩形 1"/>
+          <p:cNvSpPr/>
+          <p:nvPr/>
+        </p:nvSpPr>
+        <p:spPr>
+          <a:xfrm>
+            <a:off x="251878" y="0"/>
+            <a:ext cx="4595349" cy="1562646"/>
+          </a:xfrm>
+          <a:prstGeom prst="rect">
+            <a:avLst/>
+          </a:prstGeom>
+          <a:solidFill>
+            <a:schemeClr val="bg1"/>
+          </a:solidFill>
+          <a:ln>
+            <a:solidFill>
+              <a:schemeClr val="bg1"/>
+            </a:solidFill>
+          </a:ln>
+        </p:spPr>
+        <p:style>
+          <a:lnRef idx="2">
+            <a:schemeClr val="accent1">
+              <a:shade val="50000"/>
+            </a:schemeClr>
+          </a:lnRef>
+          <a:fillRef idx="1">
+            <a:schemeClr val="accent1"/>
+          </a:fillRef>
+          <a:effectRef idx="0">
+            <a:schemeClr val="accent1"/>
+          </a:effectRef>
+          <a:fontRef idx="minor">
+            <a:schemeClr val="lt1"/>
+          </a:fontRef>
+        </p:style>
+        <p:txBody>
+          <a:bodyPr rtlCol="0" anchor="ctr"/>
+          <a:lstStyle/>
+          <a:p>
+            <a:pPr algn="ctr"/>
+            <a:endParaRPr lang="zh-TW" altLang="en-US"/>
+          </a:p>
+        </p:txBody>
+      </p:sp>
+      <p:sp>
+        <p:nvSpPr>
           <p:cNvPr id="111" name="Shape 111"/>
           <p:cNvSpPr txBox="1">
             <a:spLocks noGrp="1"/>
@@ -13420,36 +13473,6 @@
           </a:p>
         </p:txBody>
       </p:sp>
-      <p:pic>
-        <p:nvPicPr>
-          <p:cNvPr id="11" name="圖片 10"/>
-          <p:cNvPicPr>
-            <a:picLocks noChangeAspect="1"/>
-          </p:cNvPicPr>
-          <p:nvPr/>
-        </p:nvPicPr>
-        <p:blipFill>
-          <a:blip r:embed="rId3">
-            <a:extLst>
-              <a:ext uri="{28A0092B-C50C-407E-A947-70E740481C1C}">
-                <a14:useLocalDpi xmlns:a14="http://schemas.microsoft.com/office/drawing/2010/main" val="0"/>
-              </a:ext>
-            </a:extLst>
-          </a:blip>
-          <a:stretch>
-            <a:fillRect/>
-          </a:stretch>
-        </p:blipFill>
-        <p:spPr>
-          <a:xfrm>
-            <a:off x="861060" y="1597815"/>
-            <a:ext cx="8221980" cy="3539511"/>
-          </a:xfrm>
-          <a:prstGeom prst="rect">
-            <a:avLst/>
-          </a:prstGeom>
-        </p:spPr>
-      </p:pic>
       <p:sp>
         <p:nvSpPr>
           <p:cNvPr id="12" name="Shape 111"/>
@@ -13460,8 +13483,8 @@
         </p:nvSpPr>
         <p:spPr>
           <a:xfrm>
-            <a:off x="4939128" y="530725"/>
-            <a:ext cx="4472897" cy="1028700"/>
+            <a:off x="7678053" y="0"/>
+            <a:ext cx="1641207" cy="1028700"/>
           </a:xfrm>
           <a:prstGeom prst="rect">
             <a:avLst/>
@@ -13724,12 +13747,22 @@
           </a:lstStyle>
           <a:p>
             <a:r>
-              <a:rPr lang="en-US" dirty="0" smtClean="0">
+              <a:rPr lang="en-US" altLang="zh-TW" dirty="0" smtClean="0">
                 <a:solidFill>
                   <a:schemeClr val="tx1"/>
                 </a:solidFill>
               </a:rPr>
-              <a:t>S</a:t>
+              <a:t>   SD-Delete </a:t>
+            </a:r>
+          </a:p>
+          <a:p>
+            <a:r>
+              <a:rPr lang="en-US" altLang="zh-TW" dirty="0">
+                <a:solidFill>
+                  <a:schemeClr val="tx1"/>
+                </a:solidFill>
+              </a:rPr>
+              <a:t> </a:t>
             </a:r>
             <a:r>
               <a:rPr lang="en-US" altLang="zh-TW" dirty="0" smtClean="0">
@@ -13737,9 +13770,9 @@
                   <a:schemeClr val="tx1"/>
                 </a:solidFill>
               </a:rPr>
-              <a:t>D-Delete Event</a:t>
+              <a:t>            Event</a:t>
             </a:r>
-            <a:endParaRPr lang="en-US" dirty="0">
+            <a:endParaRPr lang="en-US" altLang="zh-TW" dirty="0">
               <a:solidFill>
                 <a:schemeClr val="tx1"/>
               </a:solidFill>
@@ -13747,10 +13780,40 @@
           </a:p>
         </p:txBody>
       </p:sp>
+      <p:pic>
+        <p:nvPicPr>
+          <p:cNvPr id="14" name="圖片 13"/>
+          <p:cNvPicPr>
+            <a:picLocks noChangeAspect="1"/>
+          </p:cNvPicPr>
+          <p:nvPr/>
+        </p:nvPicPr>
+        <p:blipFill>
+          <a:blip r:embed="rId3">
+            <a:extLst>
+              <a:ext uri="{28A0092B-C50C-407E-A947-70E740481C1C}">
+                <a14:useLocalDpi xmlns:a14="http://schemas.microsoft.com/office/drawing/2010/main" val="0"/>
+              </a:ext>
+            </a:extLst>
+          </a:blip>
+          <a:stretch>
+            <a:fillRect/>
+          </a:stretch>
+        </p:blipFill>
+        <p:spPr>
+          <a:xfrm>
+            <a:off x="-144362" y="0"/>
+            <a:ext cx="9067382" cy="5067300"/>
+          </a:xfrm>
+          <a:prstGeom prst="rect">
+            <a:avLst/>
+          </a:prstGeom>
+        </p:spPr>
+      </p:pic>
     </p:spTree>
     <p:extLst>
       <p:ext uri="{BB962C8B-B14F-4D97-AF65-F5344CB8AC3E}">
-        <p14:creationId xmlns:p14="http://schemas.microsoft.com/office/powerpoint/2010/main" val="1410955460"/>
+        <p14:creationId xmlns:p14="http://schemas.microsoft.com/office/powerpoint/2010/main" val="1038781209"/>
       </p:ext>
     </p:extLst>
   </p:cSld>
@@ -13784,6 +13847,54 @@
           <a:chExt cx="0" cy="0"/>
         </a:xfrm>
       </p:grpSpPr>
+      <p:sp>
+        <p:nvSpPr>
+          <p:cNvPr id="2" name="矩形 1"/>
+          <p:cNvSpPr/>
+          <p:nvPr/>
+        </p:nvSpPr>
+        <p:spPr>
+          <a:xfrm>
+            <a:off x="251878" y="0"/>
+            <a:ext cx="4595349" cy="1562646"/>
+          </a:xfrm>
+          <a:prstGeom prst="rect">
+            <a:avLst/>
+          </a:prstGeom>
+          <a:solidFill>
+            <a:schemeClr val="bg1"/>
+          </a:solidFill>
+          <a:ln>
+            <a:solidFill>
+              <a:schemeClr val="bg1"/>
+            </a:solidFill>
+          </a:ln>
+        </p:spPr>
+        <p:style>
+          <a:lnRef idx="2">
+            <a:schemeClr val="accent1">
+              <a:shade val="50000"/>
+            </a:schemeClr>
+          </a:lnRef>
+          <a:fillRef idx="1">
+            <a:schemeClr val="accent1"/>
+          </a:fillRef>
+          <a:effectRef idx="0">
+            <a:schemeClr val="accent1"/>
+          </a:effectRef>
+          <a:fontRef idx="minor">
+            <a:schemeClr val="lt1"/>
+          </a:fontRef>
+        </p:style>
+        <p:txBody>
+          <a:bodyPr rtlCol="0" anchor="ctr"/>
+          <a:lstStyle/>
+          <a:p>
+            <a:pPr algn="ctr"/>
+            <a:endParaRPr lang="zh-TW" altLang="en-US"/>
+          </a:p>
+        </p:txBody>
+      </p:sp>
       <p:sp>
         <p:nvSpPr>
           <p:cNvPr id="111" name="Shape 111"/>
@@ -14414,8 +14525,8 @@
         </p:blipFill>
         <p:spPr>
           <a:xfrm>
-            <a:off x="524532" y="1657329"/>
-            <a:ext cx="8136346" cy="3268646"/>
+            <a:off x="0" y="0"/>
+            <a:ext cx="9143999" cy="5314187"/>
           </a:xfrm>
           <a:prstGeom prst="rect">
             <a:avLst/>
@@ -14432,7 +14543,7 @@
         </p:nvSpPr>
         <p:spPr>
           <a:xfrm>
-            <a:off x="4939128" y="530725"/>
+            <a:off x="7110645" y="-24400"/>
             <a:ext cx="4472897" cy="1028700"/>
           </a:xfrm>
           <a:prstGeom prst="rect">
@@ -14722,7 +14833,7 @@
     </p:spTree>
     <p:extLst>
       <p:ext uri="{BB962C8B-B14F-4D97-AF65-F5344CB8AC3E}">
-        <p14:creationId xmlns:p14="http://schemas.microsoft.com/office/powerpoint/2010/main" val="1038781209"/>
+        <p14:creationId xmlns:p14="http://schemas.microsoft.com/office/powerpoint/2010/main" val="1530335907"/>
       </p:ext>
     </p:extLst>
   </p:cSld>
@@ -15386,8 +15497,8 @@
         </p:blipFill>
         <p:spPr>
           <a:xfrm>
-            <a:off x="1374423" y="1657329"/>
-            <a:ext cx="6436563" cy="3268645"/>
+            <a:off x="723900" y="1304833"/>
+            <a:ext cx="8420100" cy="3838667"/>
           </a:xfrm>
           <a:prstGeom prst="rect">
             <a:avLst/>
@@ -16366,8 +16477,8 @@
         </p:blipFill>
         <p:spPr>
           <a:xfrm>
-            <a:off x="780124" y="1657329"/>
-            <a:ext cx="7625161" cy="3268646"/>
+            <a:off x="213360" y="1386840"/>
+            <a:ext cx="8943765" cy="3756660"/>
           </a:xfrm>
           <a:prstGeom prst="rect">
             <a:avLst/>
@@ -17338,8 +17449,8 @@
         </p:blipFill>
         <p:spPr>
           <a:xfrm>
-            <a:off x="1374423" y="1657329"/>
-            <a:ext cx="6436563" cy="3268646"/>
+            <a:off x="361537" y="1200394"/>
+            <a:ext cx="8810378" cy="4105458"/>
           </a:xfrm>
           <a:prstGeom prst="rect">
             <a:avLst/>
@@ -19122,8 +19233,8 @@
         </p:blipFill>
         <p:spPr>
           <a:xfrm>
-            <a:off x="1374424" y="1657329"/>
-            <a:ext cx="6436561" cy="3268645"/>
+            <a:off x="333623" y="1262560"/>
+            <a:ext cx="8785859" cy="4012571"/>
           </a:xfrm>
           <a:prstGeom prst="rect">
             <a:avLst/>
@@ -20054,6 +20165,295 @@
               <a:t>21</a:t>
             </a:fld>
             <a:endParaRPr lang="zh-TW" altLang="en-US"/>
+          </a:p>
+        </p:txBody>
+      </p:sp>
+      <p:sp>
+        <p:nvSpPr>
+          <p:cNvPr id="13" name="Shape 111"/>
+          <p:cNvSpPr txBox="1">
+            <a:spLocks/>
+          </p:cNvSpPr>
+          <p:nvPr/>
+        </p:nvSpPr>
+        <p:spPr>
+          <a:xfrm>
+            <a:off x="3620868" y="2043151"/>
+            <a:ext cx="5363112" cy="1770515"/>
+          </a:xfrm>
+          <a:prstGeom prst="rect">
+            <a:avLst/>
+          </a:prstGeom>
+          <a:noFill/>
+          <a:ln>
+            <a:noFill/>
+          </a:ln>
+        </p:spPr>
+        <p:txBody>
+          <a:bodyPr spcFirstLastPara="1" wrap="square" lIns="91425" tIns="91425" rIns="91425" bIns="91425" anchor="ctr" anchorCtr="0">
+            <a:noAutofit/>
+          </a:bodyPr>
+          <a:lstStyle>
+            <a:defPPr marR="0" lvl="0" algn="l" rtl="0">
+              <a:lnSpc>
+                <a:spcPct val="100000"/>
+              </a:lnSpc>
+              <a:spcBef>
+                <a:spcPts val="0"/>
+              </a:spcBef>
+              <a:spcAft>
+                <a:spcPts val="0"/>
+              </a:spcAft>
+            </a:defPPr>
+            <a:lvl1pPr marR="0" lvl="0" algn="l" rtl="0">
+              <a:lnSpc>
+                <a:spcPct val="100000"/>
+              </a:lnSpc>
+              <a:spcBef>
+                <a:spcPts val="0"/>
+              </a:spcBef>
+              <a:spcAft>
+                <a:spcPts val="0"/>
+              </a:spcAft>
+              <a:buClr>
+                <a:srgbClr val="FFFFFF"/>
+              </a:buClr>
+              <a:buSzPts val="1800"/>
+              <a:buFont typeface="Roboto Slab"/>
+              <a:buNone/>
+              <a:defRPr sz="1800" b="1" i="0" u="none" strike="noStrike" cap="none" baseline="0">
+                <a:solidFill>
+                  <a:srgbClr val="FFFFFF"/>
+                </a:solidFill>
+                <a:latin typeface="Times New Roman" panose="02020603050405020304" pitchFamily="18" charset="0"/>
+                <a:ea typeface="標楷體" panose="03000509000000000000" pitchFamily="65" charset="-120"/>
+                <a:cs typeface="Roboto Slab"/>
+                <a:sym typeface="Roboto Slab"/>
+              </a:defRPr>
+            </a:lvl1pPr>
+            <a:lvl2pPr marR="0" lvl="1" algn="l" rtl="0">
+              <a:lnSpc>
+                <a:spcPct val="100000"/>
+              </a:lnSpc>
+              <a:spcBef>
+                <a:spcPts val="0"/>
+              </a:spcBef>
+              <a:spcAft>
+                <a:spcPts val="0"/>
+              </a:spcAft>
+              <a:buClr>
+                <a:srgbClr val="FFFFFF"/>
+              </a:buClr>
+              <a:buSzPts val="1800"/>
+              <a:buFont typeface="Roboto Slab"/>
+              <a:buNone/>
+              <a:defRPr sz="1800" b="1" i="0" u="none" strike="noStrike" cap="none">
+                <a:solidFill>
+                  <a:srgbClr val="FFFFFF"/>
+                </a:solidFill>
+                <a:latin typeface="Roboto Slab"/>
+                <a:ea typeface="Roboto Slab"/>
+                <a:cs typeface="Roboto Slab"/>
+                <a:sym typeface="Roboto Slab"/>
+              </a:defRPr>
+            </a:lvl2pPr>
+            <a:lvl3pPr marR="0" lvl="2" algn="l" rtl="0">
+              <a:lnSpc>
+                <a:spcPct val="100000"/>
+              </a:lnSpc>
+              <a:spcBef>
+                <a:spcPts val="0"/>
+              </a:spcBef>
+              <a:spcAft>
+                <a:spcPts val="0"/>
+              </a:spcAft>
+              <a:buClr>
+                <a:srgbClr val="FFFFFF"/>
+              </a:buClr>
+              <a:buSzPts val="1800"/>
+              <a:buFont typeface="Roboto Slab"/>
+              <a:buNone/>
+              <a:defRPr sz="1800" b="1" i="0" u="none" strike="noStrike" cap="none">
+                <a:solidFill>
+                  <a:srgbClr val="FFFFFF"/>
+                </a:solidFill>
+                <a:latin typeface="Roboto Slab"/>
+                <a:ea typeface="Roboto Slab"/>
+                <a:cs typeface="Roboto Slab"/>
+                <a:sym typeface="Roboto Slab"/>
+              </a:defRPr>
+            </a:lvl3pPr>
+            <a:lvl4pPr marR="0" lvl="3" algn="l" rtl="0">
+              <a:lnSpc>
+                <a:spcPct val="100000"/>
+              </a:lnSpc>
+              <a:spcBef>
+                <a:spcPts val="0"/>
+              </a:spcBef>
+              <a:spcAft>
+                <a:spcPts val="0"/>
+              </a:spcAft>
+              <a:buClr>
+                <a:srgbClr val="FFFFFF"/>
+              </a:buClr>
+              <a:buSzPts val="1800"/>
+              <a:buFont typeface="Roboto Slab"/>
+              <a:buNone/>
+              <a:defRPr sz="1800" b="1" i="0" u="none" strike="noStrike" cap="none">
+                <a:solidFill>
+                  <a:srgbClr val="FFFFFF"/>
+                </a:solidFill>
+                <a:latin typeface="Roboto Slab"/>
+                <a:ea typeface="Roboto Slab"/>
+                <a:cs typeface="Roboto Slab"/>
+                <a:sym typeface="Roboto Slab"/>
+              </a:defRPr>
+            </a:lvl4pPr>
+            <a:lvl5pPr marR="0" lvl="4" algn="l" rtl="0">
+              <a:lnSpc>
+                <a:spcPct val="100000"/>
+              </a:lnSpc>
+              <a:spcBef>
+                <a:spcPts val="0"/>
+              </a:spcBef>
+              <a:spcAft>
+                <a:spcPts val="0"/>
+              </a:spcAft>
+              <a:buClr>
+                <a:srgbClr val="FFFFFF"/>
+              </a:buClr>
+              <a:buSzPts val="1800"/>
+              <a:buFont typeface="Roboto Slab"/>
+              <a:buNone/>
+              <a:defRPr sz="1800" b="1" i="0" u="none" strike="noStrike" cap="none">
+                <a:solidFill>
+                  <a:srgbClr val="FFFFFF"/>
+                </a:solidFill>
+                <a:latin typeface="Roboto Slab"/>
+                <a:ea typeface="Roboto Slab"/>
+                <a:cs typeface="Roboto Slab"/>
+                <a:sym typeface="Roboto Slab"/>
+              </a:defRPr>
+            </a:lvl5pPr>
+            <a:lvl6pPr marR="0" lvl="5" algn="l" rtl="0">
+              <a:lnSpc>
+                <a:spcPct val="100000"/>
+              </a:lnSpc>
+              <a:spcBef>
+                <a:spcPts val="0"/>
+              </a:spcBef>
+              <a:spcAft>
+                <a:spcPts val="0"/>
+              </a:spcAft>
+              <a:buClr>
+                <a:srgbClr val="FFFFFF"/>
+              </a:buClr>
+              <a:buSzPts val="1800"/>
+              <a:buFont typeface="Roboto Slab"/>
+              <a:buNone/>
+              <a:defRPr sz="1800" b="1" i="0" u="none" strike="noStrike" cap="none">
+                <a:solidFill>
+                  <a:srgbClr val="FFFFFF"/>
+                </a:solidFill>
+                <a:latin typeface="Roboto Slab"/>
+                <a:ea typeface="Roboto Slab"/>
+                <a:cs typeface="Roboto Slab"/>
+                <a:sym typeface="Roboto Slab"/>
+              </a:defRPr>
+            </a:lvl6pPr>
+            <a:lvl7pPr marR="0" lvl="6" algn="l" rtl="0">
+              <a:lnSpc>
+                <a:spcPct val="100000"/>
+              </a:lnSpc>
+              <a:spcBef>
+                <a:spcPts val="0"/>
+              </a:spcBef>
+              <a:spcAft>
+                <a:spcPts val="0"/>
+              </a:spcAft>
+              <a:buClr>
+                <a:srgbClr val="FFFFFF"/>
+              </a:buClr>
+              <a:buSzPts val="1800"/>
+              <a:buFont typeface="Roboto Slab"/>
+              <a:buNone/>
+              <a:defRPr sz="1800" b="1" i="0" u="none" strike="noStrike" cap="none">
+                <a:solidFill>
+                  <a:srgbClr val="FFFFFF"/>
+                </a:solidFill>
+                <a:latin typeface="Roboto Slab"/>
+                <a:ea typeface="Roboto Slab"/>
+                <a:cs typeface="Roboto Slab"/>
+                <a:sym typeface="Roboto Slab"/>
+              </a:defRPr>
+            </a:lvl7pPr>
+            <a:lvl8pPr marR="0" lvl="7" algn="l" rtl="0">
+              <a:lnSpc>
+                <a:spcPct val="100000"/>
+              </a:lnSpc>
+              <a:spcBef>
+                <a:spcPts val="0"/>
+              </a:spcBef>
+              <a:spcAft>
+                <a:spcPts val="0"/>
+              </a:spcAft>
+              <a:buClr>
+                <a:srgbClr val="FFFFFF"/>
+              </a:buClr>
+              <a:buSzPts val="1800"/>
+              <a:buFont typeface="Roboto Slab"/>
+              <a:buNone/>
+              <a:defRPr sz="1800" b="1" i="0" u="none" strike="noStrike" cap="none">
+                <a:solidFill>
+                  <a:srgbClr val="FFFFFF"/>
+                </a:solidFill>
+                <a:latin typeface="Roboto Slab"/>
+                <a:ea typeface="Roboto Slab"/>
+                <a:cs typeface="Roboto Slab"/>
+                <a:sym typeface="Roboto Slab"/>
+              </a:defRPr>
+            </a:lvl8pPr>
+            <a:lvl9pPr marR="0" lvl="8" algn="l" rtl="0">
+              <a:lnSpc>
+                <a:spcPct val="100000"/>
+              </a:lnSpc>
+              <a:spcBef>
+                <a:spcPts val="0"/>
+              </a:spcBef>
+              <a:spcAft>
+                <a:spcPts val="0"/>
+              </a:spcAft>
+              <a:buClr>
+                <a:srgbClr val="FFFFFF"/>
+              </a:buClr>
+              <a:buSzPts val="1800"/>
+              <a:buFont typeface="Roboto Slab"/>
+              <a:buNone/>
+              <a:defRPr sz="1800" b="1" i="0" u="none" strike="noStrike" cap="none">
+                <a:solidFill>
+                  <a:srgbClr val="FFFFFF"/>
+                </a:solidFill>
+                <a:latin typeface="Roboto Slab"/>
+                <a:ea typeface="Roboto Slab"/>
+                <a:cs typeface="Roboto Slab"/>
+                <a:sym typeface="Roboto Slab"/>
+              </a:defRPr>
+            </a:lvl9pPr>
+          </a:lstStyle>
+          <a:p>
+            <a:r>
+              <a:rPr lang="en-US" altLang="zh-TW" sz="6000" dirty="0">
+                <a:solidFill>
+                  <a:schemeClr val="tx1"/>
+                </a:solidFill>
+              </a:rPr>
+              <a:t>Next</a:t>
+            </a:r>
+            <a:endParaRPr lang="en-US" altLang="zh-TW" sz="2800" dirty="0">
+              <a:solidFill>
+                <a:schemeClr val="tx1"/>
+              </a:solidFill>
+            </a:endParaRPr>
           </a:p>
         </p:txBody>
       </p:sp>
@@ -20771,6 +21171,295 @@
               <a:t>23</a:t>
             </a:fld>
             <a:endParaRPr lang="zh-TW" altLang="en-US"/>
+          </a:p>
+        </p:txBody>
+      </p:sp>
+      <p:sp>
+        <p:nvSpPr>
+          <p:cNvPr id="12" name="Shape 111"/>
+          <p:cNvSpPr txBox="1">
+            <a:spLocks/>
+          </p:cNvSpPr>
+          <p:nvPr/>
+        </p:nvSpPr>
+        <p:spPr>
+          <a:xfrm>
+            <a:off x="3651348" y="2136533"/>
+            <a:ext cx="5363112" cy="1770515"/>
+          </a:xfrm>
+          <a:prstGeom prst="rect">
+            <a:avLst/>
+          </a:prstGeom>
+          <a:noFill/>
+          <a:ln>
+            <a:noFill/>
+          </a:ln>
+        </p:spPr>
+        <p:txBody>
+          <a:bodyPr spcFirstLastPara="1" wrap="square" lIns="91425" tIns="91425" rIns="91425" bIns="91425" anchor="ctr" anchorCtr="0">
+            <a:noAutofit/>
+          </a:bodyPr>
+          <a:lstStyle>
+            <a:defPPr marR="0" lvl="0" algn="l" rtl="0">
+              <a:lnSpc>
+                <a:spcPct val="100000"/>
+              </a:lnSpc>
+              <a:spcBef>
+                <a:spcPts val="0"/>
+              </a:spcBef>
+              <a:spcAft>
+                <a:spcPts val="0"/>
+              </a:spcAft>
+            </a:defPPr>
+            <a:lvl1pPr marR="0" lvl="0" algn="l" rtl="0">
+              <a:lnSpc>
+                <a:spcPct val="100000"/>
+              </a:lnSpc>
+              <a:spcBef>
+                <a:spcPts val="0"/>
+              </a:spcBef>
+              <a:spcAft>
+                <a:spcPts val="0"/>
+              </a:spcAft>
+              <a:buClr>
+                <a:srgbClr val="FFFFFF"/>
+              </a:buClr>
+              <a:buSzPts val="1800"/>
+              <a:buFont typeface="Roboto Slab"/>
+              <a:buNone/>
+              <a:defRPr sz="1800" b="1" i="0" u="none" strike="noStrike" cap="none" baseline="0">
+                <a:solidFill>
+                  <a:srgbClr val="FFFFFF"/>
+                </a:solidFill>
+                <a:latin typeface="Times New Roman" panose="02020603050405020304" pitchFamily="18" charset="0"/>
+                <a:ea typeface="標楷體" panose="03000509000000000000" pitchFamily="65" charset="-120"/>
+                <a:cs typeface="Roboto Slab"/>
+                <a:sym typeface="Roboto Slab"/>
+              </a:defRPr>
+            </a:lvl1pPr>
+            <a:lvl2pPr marR="0" lvl="1" algn="l" rtl="0">
+              <a:lnSpc>
+                <a:spcPct val="100000"/>
+              </a:lnSpc>
+              <a:spcBef>
+                <a:spcPts val="0"/>
+              </a:spcBef>
+              <a:spcAft>
+                <a:spcPts val="0"/>
+              </a:spcAft>
+              <a:buClr>
+                <a:srgbClr val="FFFFFF"/>
+              </a:buClr>
+              <a:buSzPts val="1800"/>
+              <a:buFont typeface="Roboto Slab"/>
+              <a:buNone/>
+              <a:defRPr sz="1800" b="1" i="0" u="none" strike="noStrike" cap="none">
+                <a:solidFill>
+                  <a:srgbClr val="FFFFFF"/>
+                </a:solidFill>
+                <a:latin typeface="Roboto Slab"/>
+                <a:ea typeface="Roboto Slab"/>
+                <a:cs typeface="Roboto Slab"/>
+                <a:sym typeface="Roboto Slab"/>
+              </a:defRPr>
+            </a:lvl2pPr>
+            <a:lvl3pPr marR="0" lvl="2" algn="l" rtl="0">
+              <a:lnSpc>
+                <a:spcPct val="100000"/>
+              </a:lnSpc>
+              <a:spcBef>
+                <a:spcPts val="0"/>
+              </a:spcBef>
+              <a:spcAft>
+                <a:spcPts val="0"/>
+              </a:spcAft>
+              <a:buClr>
+                <a:srgbClr val="FFFFFF"/>
+              </a:buClr>
+              <a:buSzPts val="1800"/>
+              <a:buFont typeface="Roboto Slab"/>
+              <a:buNone/>
+              <a:defRPr sz="1800" b="1" i="0" u="none" strike="noStrike" cap="none">
+                <a:solidFill>
+                  <a:srgbClr val="FFFFFF"/>
+                </a:solidFill>
+                <a:latin typeface="Roboto Slab"/>
+                <a:ea typeface="Roboto Slab"/>
+                <a:cs typeface="Roboto Slab"/>
+                <a:sym typeface="Roboto Slab"/>
+              </a:defRPr>
+            </a:lvl3pPr>
+            <a:lvl4pPr marR="0" lvl="3" algn="l" rtl="0">
+              <a:lnSpc>
+                <a:spcPct val="100000"/>
+              </a:lnSpc>
+              <a:spcBef>
+                <a:spcPts val="0"/>
+              </a:spcBef>
+              <a:spcAft>
+                <a:spcPts val="0"/>
+              </a:spcAft>
+              <a:buClr>
+                <a:srgbClr val="FFFFFF"/>
+              </a:buClr>
+              <a:buSzPts val="1800"/>
+              <a:buFont typeface="Roboto Slab"/>
+              <a:buNone/>
+              <a:defRPr sz="1800" b="1" i="0" u="none" strike="noStrike" cap="none">
+                <a:solidFill>
+                  <a:srgbClr val="FFFFFF"/>
+                </a:solidFill>
+                <a:latin typeface="Roboto Slab"/>
+                <a:ea typeface="Roboto Slab"/>
+                <a:cs typeface="Roboto Slab"/>
+                <a:sym typeface="Roboto Slab"/>
+              </a:defRPr>
+            </a:lvl4pPr>
+            <a:lvl5pPr marR="0" lvl="4" algn="l" rtl="0">
+              <a:lnSpc>
+                <a:spcPct val="100000"/>
+              </a:lnSpc>
+              <a:spcBef>
+                <a:spcPts val="0"/>
+              </a:spcBef>
+              <a:spcAft>
+                <a:spcPts val="0"/>
+              </a:spcAft>
+              <a:buClr>
+                <a:srgbClr val="FFFFFF"/>
+              </a:buClr>
+              <a:buSzPts val="1800"/>
+              <a:buFont typeface="Roboto Slab"/>
+              <a:buNone/>
+              <a:defRPr sz="1800" b="1" i="0" u="none" strike="noStrike" cap="none">
+                <a:solidFill>
+                  <a:srgbClr val="FFFFFF"/>
+                </a:solidFill>
+                <a:latin typeface="Roboto Slab"/>
+                <a:ea typeface="Roboto Slab"/>
+                <a:cs typeface="Roboto Slab"/>
+                <a:sym typeface="Roboto Slab"/>
+              </a:defRPr>
+            </a:lvl5pPr>
+            <a:lvl6pPr marR="0" lvl="5" algn="l" rtl="0">
+              <a:lnSpc>
+                <a:spcPct val="100000"/>
+              </a:lnSpc>
+              <a:spcBef>
+                <a:spcPts val="0"/>
+              </a:spcBef>
+              <a:spcAft>
+                <a:spcPts val="0"/>
+              </a:spcAft>
+              <a:buClr>
+                <a:srgbClr val="FFFFFF"/>
+              </a:buClr>
+              <a:buSzPts val="1800"/>
+              <a:buFont typeface="Roboto Slab"/>
+              <a:buNone/>
+              <a:defRPr sz="1800" b="1" i="0" u="none" strike="noStrike" cap="none">
+                <a:solidFill>
+                  <a:srgbClr val="FFFFFF"/>
+                </a:solidFill>
+                <a:latin typeface="Roboto Slab"/>
+                <a:ea typeface="Roboto Slab"/>
+                <a:cs typeface="Roboto Slab"/>
+                <a:sym typeface="Roboto Slab"/>
+              </a:defRPr>
+            </a:lvl6pPr>
+            <a:lvl7pPr marR="0" lvl="6" algn="l" rtl="0">
+              <a:lnSpc>
+                <a:spcPct val="100000"/>
+              </a:lnSpc>
+              <a:spcBef>
+                <a:spcPts val="0"/>
+              </a:spcBef>
+              <a:spcAft>
+                <a:spcPts val="0"/>
+              </a:spcAft>
+              <a:buClr>
+                <a:srgbClr val="FFFFFF"/>
+              </a:buClr>
+              <a:buSzPts val="1800"/>
+              <a:buFont typeface="Roboto Slab"/>
+              <a:buNone/>
+              <a:defRPr sz="1800" b="1" i="0" u="none" strike="noStrike" cap="none">
+                <a:solidFill>
+                  <a:srgbClr val="FFFFFF"/>
+                </a:solidFill>
+                <a:latin typeface="Roboto Slab"/>
+                <a:ea typeface="Roboto Slab"/>
+                <a:cs typeface="Roboto Slab"/>
+                <a:sym typeface="Roboto Slab"/>
+              </a:defRPr>
+            </a:lvl7pPr>
+            <a:lvl8pPr marR="0" lvl="7" algn="l" rtl="0">
+              <a:lnSpc>
+                <a:spcPct val="100000"/>
+              </a:lnSpc>
+              <a:spcBef>
+                <a:spcPts val="0"/>
+              </a:spcBef>
+              <a:spcAft>
+                <a:spcPts val="0"/>
+              </a:spcAft>
+              <a:buClr>
+                <a:srgbClr val="FFFFFF"/>
+              </a:buClr>
+              <a:buSzPts val="1800"/>
+              <a:buFont typeface="Roboto Slab"/>
+              <a:buNone/>
+              <a:defRPr sz="1800" b="1" i="0" u="none" strike="noStrike" cap="none">
+                <a:solidFill>
+                  <a:srgbClr val="FFFFFF"/>
+                </a:solidFill>
+                <a:latin typeface="Roboto Slab"/>
+                <a:ea typeface="Roboto Slab"/>
+                <a:cs typeface="Roboto Slab"/>
+                <a:sym typeface="Roboto Slab"/>
+              </a:defRPr>
+            </a:lvl8pPr>
+            <a:lvl9pPr marR="0" lvl="8" algn="l" rtl="0">
+              <a:lnSpc>
+                <a:spcPct val="100000"/>
+              </a:lnSpc>
+              <a:spcBef>
+                <a:spcPts val="0"/>
+              </a:spcBef>
+              <a:spcAft>
+                <a:spcPts val="0"/>
+              </a:spcAft>
+              <a:buClr>
+                <a:srgbClr val="FFFFFF"/>
+              </a:buClr>
+              <a:buSzPts val="1800"/>
+              <a:buFont typeface="Roboto Slab"/>
+              <a:buNone/>
+              <a:defRPr sz="1800" b="1" i="0" u="none" strike="noStrike" cap="none">
+                <a:solidFill>
+                  <a:srgbClr val="FFFFFF"/>
+                </a:solidFill>
+                <a:latin typeface="Roboto Slab"/>
+                <a:ea typeface="Roboto Slab"/>
+                <a:cs typeface="Roboto Slab"/>
+                <a:sym typeface="Roboto Slab"/>
+              </a:defRPr>
+            </a:lvl9pPr>
+          </a:lstStyle>
+          <a:p>
+            <a:r>
+              <a:rPr lang="en-US" altLang="zh-TW" sz="6000" dirty="0" smtClean="0">
+                <a:solidFill>
+                  <a:schemeClr val="tx1"/>
+                </a:solidFill>
+              </a:rPr>
+              <a:t>Next</a:t>
+            </a:r>
+            <a:endParaRPr lang="en-US" sz="3600" dirty="0">
+              <a:solidFill>
+                <a:schemeClr val="tx1"/>
+              </a:solidFill>
+            </a:endParaRPr>
           </a:p>
         </p:txBody>
       </p:sp>
@@ -21651,6 +22340,36 @@
           </a:p>
         </p:txBody>
       </p:sp>
+      <p:pic>
+        <p:nvPicPr>
+          <p:cNvPr id="9" name="圖片 8" descr="畫面剪輯"/>
+          <p:cNvPicPr>
+            <a:picLocks noChangeAspect="1"/>
+          </p:cNvPicPr>
+          <p:nvPr/>
+        </p:nvPicPr>
+        <p:blipFill>
+          <a:blip r:embed="rId3">
+            <a:extLst>
+              <a:ext uri="{28A0092B-C50C-407E-A947-70E740481C1C}">
+                <a14:useLocalDpi xmlns:a14="http://schemas.microsoft.com/office/drawing/2010/main" val="0"/>
+              </a:ext>
+            </a:extLst>
+          </a:blip>
+          <a:stretch>
+            <a:fillRect/>
+          </a:stretch>
+        </p:blipFill>
+        <p:spPr>
+          <a:xfrm>
+            <a:off x="1106268" y="1559425"/>
+            <a:ext cx="7984636" cy="3497695"/>
+          </a:xfrm>
+          <a:prstGeom prst="rect">
+            <a:avLst/>
+          </a:prstGeom>
+        </p:spPr>
+      </p:pic>
     </p:spTree>
     <p:extLst>
       <p:ext uri="{BB962C8B-B14F-4D97-AF65-F5344CB8AC3E}">
@@ -22270,6 +22989,295 @@
               <a:t>26</a:t>
             </a:fld>
             <a:endParaRPr lang="zh-TW" altLang="en-US"/>
+          </a:p>
+        </p:txBody>
+      </p:sp>
+      <p:sp>
+        <p:nvSpPr>
+          <p:cNvPr id="12" name="Shape 111"/>
+          <p:cNvSpPr txBox="1">
+            <a:spLocks/>
+          </p:cNvSpPr>
+          <p:nvPr/>
+        </p:nvSpPr>
+        <p:spPr>
+          <a:xfrm>
+            <a:off x="900528" y="1864224"/>
+            <a:ext cx="5363112" cy="1770515"/>
+          </a:xfrm>
+          <a:prstGeom prst="rect">
+            <a:avLst/>
+          </a:prstGeom>
+          <a:noFill/>
+          <a:ln>
+            <a:noFill/>
+          </a:ln>
+        </p:spPr>
+        <p:txBody>
+          <a:bodyPr spcFirstLastPara="1" wrap="square" lIns="91425" tIns="91425" rIns="91425" bIns="91425" anchor="ctr" anchorCtr="0">
+            <a:noAutofit/>
+          </a:bodyPr>
+          <a:lstStyle>
+            <a:defPPr marR="0" lvl="0" algn="l" rtl="0">
+              <a:lnSpc>
+                <a:spcPct val="100000"/>
+              </a:lnSpc>
+              <a:spcBef>
+                <a:spcPts val="0"/>
+              </a:spcBef>
+              <a:spcAft>
+                <a:spcPts val="0"/>
+              </a:spcAft>
+            </a:defPPr>
+            <a:lvl1pPr marR="0" lvl="0" algn="l" rtl="0">
+              <a:lnSpc>
+                <a:spcPct val="100000"/>
+              </a:lnSpc>
+              <a:spcBef>
+                <a:spcPts val="0"/>
+              </a:spcBef>
+              <a:spcAft>
+                <a:spcPts val="0"/>
+              </a:spcAft>
+              <a:buClr>
+                <a:srgbClr val="FFFFFF"/>
+              </a:buClr>
+              <a:buSzPts val="1800"/>
+              <a:buFont typeface="Roboto Slab"/>
+              <a:buNone/>
+              <a:defRPr sz="1800" b="1" i="0" u="none" strike="noStrike" cap="none" baseline="0">
+                <a:solidFill>
+                  <a:srgbClr val="FFFFFF"/>
+                </a:solidFill>
+                <a:latin typeface="Times New Roman" panose="02020603050405020304" pitchFamily="18" charset="0"/>
+                <a:ea typeface="標楷體" panose="03000509000000000000" pitchFamily="65" charset="-120"/>
+                <a:cs typeface="Roboto Slab"/>
+                <a:sym typeface="Roboto Slab"/>
+              </a:defRPr>
+            </a:lvl1pPr>
+            <a:lvl2pPr marR="0" lvl="1" algn="l" rtl="0">
+              <a:lnSpc>
+                <a:spcPct val="100000"/>
+              </a:lnSpc>
+              <a:spcBef>
+                <a:spcPts val="0"/>
+              </a:spcBef>
+              <a:spcAft>
+                <a:spcPts val="0"/>
+              </a:spcAft>
+              <a:buClr>
+                <a:srgbClr val="FFFFFF"/>
+              </a:buClr>
+              <a:buSzPts val="1800"/>
+              <a:buFont typeface="Roboto Slab"/>
+              <a:buNone/>
+              <a:defRPr sz="1800" b="1" i="0" u="none" strike="noStrike" cap="none">
+                <a:solidFill>
+                  <a:srgbClr val="FFFFFF"/>
+                </a:solidFill>
+                <a:latin typeface="Roboto Slab"/>
+                <a:ea typeface="Roboto Slab"/>
+                <a:cs typeface="Roboto Slab"/>
+                <a:sym typeface="Roboto Slab"/>
+              </a:defRPr>
+            </a:lvl2pPr>
+            <a:lvl3pPr marR="0" lvl="2" algn="l" rtl="0">
+              <a:lnSpc>
+                <a:spcPct val="100000"/>
+              </a:lnSpc>
+              <a:spcBef>
+                <a:spcPts val="0"/>
+              </a:spcBef>
+              <a:spcAft>
+                <a:spcPts val="0"/>
+              </a:spcAft>
+              <a:buClr>
+                <a:srgbClr val="FFFFFF"/>
+              </a:buClr>
+              <a:buSzPts val="1800"/>
+              <a:buFont typeface="Roboto Slab"/>
+              <a:buNone/>
+              <a:defRPr sz="1800" b="1" i="0" u="none" strike="noStrike" cap="none">
+                <a:solidFill>
+                  <a:srgbClr val="FFFFFF"/>
+                </a:solidFill>
+                <a:latin typeface="Roboto Slab"/>
+                <a:ea typeface="Roboto Slab"/>
+                <a:cs typeface="Roboto Slab"/>
+                <a:sym typeface="Roboto Slab"/>
+              </a:defRPr>
+            </a:lvl3pPr>
+            <a:lvl4pPr marR="0" lvl="3" algn="l" rtl="0">
+              <a:lnSpc>
+                <a:spcPct val="100000"/>
+              </a:lnSpc>
+              <a:spcBef>
+                <a:spcPts val="0"/>
+              </a:spcBef>
+              <a:spcAft>
+                <a:spcPts val="0"/>
+              </a:spcAft>
+              <a:buClr>
+                <a:srgbClr val="FFFFFF"/>
+              </a:buClr>
+              <a:buSzPts val="1800"/>
+              <a:buFont typeface="Roboto Slab"/>
+              <a:buNone/>
+              <a:defRPr sz="1800" b="1" i="0" u="none" strike="noStrike" cap="none">
+                <a:solidFill>
+                  <a:srgbClr val="FFFFFF"/>
+                </a:solidFill>
+                <a:latin typeface="Roboto Slab"/>
+                <a:ea typeface="Roboto Slab"/>
+                <a:cs typeface="Roboto Slab"/>
+                <a:sym typeface="Roboto Slab"/>
+              </a:defRPr>
+            </a:lvl4pPr>
+            <a:lvl5pPr marR="0" lvl="4" algn="l" rtl="0">
+              <a:lnSpc>
+                <a:spcPct val="100000"/>
+              </a:lnSpc>
+              <a:spcBef>
+                <a:spcPts val="0"/>
+              </a:spcBef>
+              <a:spcAft>
+                <a:spcPts val="0"/>
+              </a:spcAft>
+              <a:buClr>
+                <a:srgbClr val="FFFFFF"/>
+              </a:buClr>
+              <a:buSzPts val="1800"/>
+              <a:buFont typeface="Roboto Slab"/>
+              <a:buNone/>
+              <a:defRPr sz="1800" b="1" i="0" u="none" strike="noStrike" cap="none">
+                <a:solidFill>
+                  <a:srgbClr val="FFFFFF"/>
+                </a:solidFill>
+                <a:latin typeface="Roboto Slab"/>
+                <a:ea typeface="Roboto Slab"/>
+                <a:cs typeface="Roboto Slab"/>
+                <a:sym typeface="Roboto Slab"/>
+              </a:defRPr>
+            </a:lvl5pPr>
+            <a:lvl6pPr marR="0" lvl="5" algn="l" rtl="0">
+              <a:lnSpc>
+                <a:spcPct val="100000"/>
+              </a:lnSpc>
+              <a:spcBef>
+                <a:spcPts val="0"/>
+              </a:spcBef>
+              <a:spcAft>
+                <a:spcPts val="0"/>
+              </a:spcAft>
+              <a:buClr>
+                <a:srgbClr val="FFFFFF"/>
+              </a:buClr>
+              <a:buSzPts val="1800"/>
+              <a:buFont typeface="Roboto Slab"/>
+              <a:buNone/>
+              <a:defRPr sz="1800" b="1" i="0" u="none" strike="noStrike" cap="none">
+                <a:solidFill>
+                  <a:srgbClr val="FFFFFF"/>
+                </a:solidFill>
+                <a:latin typeface="Roboto Slab"/>
+                <a:ea typeface="Roboto Slab"/>
+                <a:cs typeface="Roboto Slab"/>
+                <a:sym typeface="Roboto Slab"/>
+              </a:defRPr>
+            </a:lvl6pPr>
+            <a:lvl7pPr marR="0" lvl="6" algn="l" rtl="0">
+              <a:lnSpc>
+                <a:spcPct val="100000"/>
+              </a:lnSpc>
+              <a:spcBef>
+                <a:spcPts val="0"/>
+              </a:spcBef>
+              <a:spcAft>
+                <a:spcPts val="0"/>
+              </a:spcAft>
+              <a:buClr>
+                <a:srgbClr val="FFFFFF"/>
+              </a:buClr>
+              <a:buSzPts val="1800"/>
+              <a:buFont typeface="Roboto Slab"/>
+              <a:buNone/>
+              <a:defRPr sz="1800" b="1" i="0" u="none" strike="noStrike" cap="none">
+                <a:solidFill>
+                  <a:srgbClr val="FFFFFF"/>
+                </a:solidFill>
+                <a:latin typeface="Roboto Slab"/>
+                <a:ea typeface="Roboto Slab"/>
+                <a:cs typeface="Roboto Slab"/>
+                <a:sym typeface="Roboto Slab"/>
+              </a:defRPr>
+            </a:lvl7pPr>
+            <a:lvl8pPr marR="0" lvl="7" algn="l" rtl="0">
+              <a:lnSpc>
+                <a:spcPct val="100000"/>
+              </a:lnSpc>
+              <a:spcBef>
+                <a:spcPts val="0"/>
+              </a:spcBef>
+              <a:spcAft>
+                <a:spcPts val="0"/>
+              </a:spcAft>
+              <a:buClr>
+                <a:srgbClr val="FFFFFF"/>
+              </a:buClr>
+              <a:buSzPts val="1800"/>
+              <a:buFont typeface="Roboto Slab"/>
+              <a:buNone/>
+              <a:defRPr sz="1800" b="1" i="0" u="none" strike="noStrike" cap="none">
+                <a:solidFill>
+                  <a:srgbClr val="FFFFFF"/>
+                </a:solidFill>
+                <a:latin typeface="Roboto Slab"/>
+                <a:ea typeface="Roboto Slab"/>
+                <a:cs typeface="Roboto Slab"/>
+                <a:sym typeface="Roboto Slab"/>
+              </a:defRPr>
+            </a:lvl8pPr>
+            <a:lvl9pPr marR="0" lvl="8" algn="l" rtl="0">
+              <a:lnSpc>
+                <a:spcPct val="100000"/>
+              </a:lnSpc>
+              <a:spcBef>
+                <a:spcPts val="0"/>
+              </a:spcBef>
+              <a:spcAft>
+                <a:spcPts val="0"/>
+              </a:spcAft>
+              <a:buClr>
+                <a:srgbClr val="FFFFFF"/>
+              </a:buClr>
+              <a:buSzPts val="1800"/>
+              <a:buFont typeface="Roboto Slab"/>
+              <a:buNone/>
+              <a:defRPr sz="1800" b="1" i="0" u="none" strike="noStrike" cap="none">
+                <a:solidFill>
+                  <a:srgbClr val="FFFFFF"/>
+                </a:solidFill>
+                <a:latin typeface="Roboto Slab"/>
+                <a:ea typeface="Roboto Slab"/>
+                <a:cs typeface="Roboto Slab"/>
+                <a:sym typeface="Roboto Slab"/>
+              </a:defRPr>
+            </a:lvl9pPr>
+          </a:lstStyle>
+          <a:p>
+            <a:r>
+              <a:rPr lang="en-US" altLang="zh-TW" sz="3200" dirty="0" smtClean="0">
+                <a:solidFill>
+                  <a:schemeClr val="tx1"/>
+                </a:solidFill>
+              </a:rPr>
+              <a:t>DEMO Unit Test</a:t>
+            </a:r>
+            <a:endParaRPr lang="en-US" sz="1600" dirty="0">
+              <a:solidFill>
+                <a:schemeClr val="tx1"/>
+              </a:solidFill>
+            </a:endParaRPr>
           </a:p>
         </p:txBody>
       </p:sp>
@@ -22335,20 +23343,27 @@
           </a:bodyPr>
           <a:lstStyle/>
           <a:p>
-            <a:pPr marL="0" lvl="0" indent="0" rtl="0">
-              <a:spcBef>
-                <a:spcPts val="0"/>
-              </a:spcBef>
-              <a:spcAft>
-                <a:spcPts val="0"/>
-              </a:spcAft>
-              <a:buNone/>
-            </a:pPr>
+            <a:pPr lvl="0"/>
             <a:r>
-              <a:rPr lang="en-US" sz="2400" dirty="0" smtClean="0"/>
-              <a:t>Significant Test Case</a:t>
+              <a:rPr lang="en-US" altLang="zh-TW" sz="3200" dirty="0"/>
+              <a:t>Significant </a:t>
             </a:r>
-            <a:endParaRPr sz="2400" dirty="0"/>
+            <a:r>
+              <a:rPr lang="en-US" altLang="zh-TW" sz="3200" dirty="0" smtClean="0"/>
+              <a:t>	</a:t>
+            </a:r>
+            <a:br>
+              <a:rPr lang="en-US" altLang="zh-TW" sz="3200" dirty="0" smtClean="0"/>
+            </a:br>
+            <a:r>
+              <a:rPr lang="en-US" altLang="zh-TW" sz="3200" dirty="0"/>
+              <a:t>	 </a:t>
+            </a:r>
+            <a:r>
+              <a:rPr lang="en-US" altLang="zh-TW" sz="3200" dirty="0" smtClean="0"/>
+              <a:t>      Test Case</a:t>
+            </a:r>
+            <a:endParaRPr sz="1600" dirty="0"/>
           </a:p>
         </p:txBody>
       </p:sp>
@@ -22895,10 +23910,321 @@
           </a:p>
         </p:txBody>
       </p:sp>
+      <p:sp>
+        <p:nvSpPr>
+          <p:cNvPr id="12" name="Shape 111"/>
+          <p:cNvSpPr txBox="1">
+            <a:spLocks/>
+          </p:cNvSpPr>
+          <p:nvPr/>
+        </p:nvSpPr>
+        <p:spPr>
+          <a:xfrm>
+            <a:off x="900528" y="1864224"/>
+            <a:ext cx="5363112" cy="1770515"/>
+          </a:xfrm>
+          <a:prstGeom prst="rect">
+            <a:avLst/>
+          </a:prstGeom>
+          <a:noFill/>
+          <a:ln>
+            <a:noFill/>
+          </a:ln>
+        </p:spPr>
+        <p:txBody>
+          <a:bodyPr spcFirstLastPara="1" wrap="square" lIns="91425" tIns="91425" rIns="91425" bIns="91425" anchor="ctr" anchorCtr="0">
+            <a:noAutofit/>
+          </a:bodyPr>
+          <a:lstStyle>
+            <a:defPPr marR="0" lvl="0" algn="l" rtl="0">
+              <a:lnSpc>
+                <a:spcPct val="100000"/>
+              </a:lnSpc>
+              <a:spcBef>
+                <a:spcPts val="0"/>
+              </a:spcBef>
+              <a:spcAft>
+                <a:spcPts val="0"/>
+              </a:spcAft>
+            </a:defPPr>
+            <a:lvl1pPr marR="0" lvl="0" algn="l" rtl="0">
+              <a:lnSpc>
+                <a:spcPct val="100000"/>
+              </a:lnSpc>
+              <a:spcBef>
+                <a:spcPts val="0"/>
+              </a:spcBef>
+              <a:spcAft>
+                <a:spcPts val="0"/>
+              </a:spcAft>
+              <a:buClr>
+                <a:srgbClr val="FFFFFF"/>
+              </a:buClr>
+              <a:buSzPts val="1800"/>
+              <a:buFont typeface="Roboto Slab"/>
+              <a:buNone/>
+              <a:defRPr sz="1800" b="1" i="0" u="none" strike="noStrike" cap="none" baseline="0">
+                <a:solidFill>
+                  <a:srgbClr val="FFFFFF"/>
+                </a:solidFill>
+                <a:latin typeface="Times New Roman" panose="02020603050405020304" pitchFamily="18" charset="0"/>
+                <a:ea typeface="標楷體" panose="03000509000000000000" pitchFamily="65" charset="-120"/>
+                <a:cs typeface="Roboto Slab"/>
+                <a:sym typeface="Roboto Slab"/>
+              </a:defRPr>
+            </a:lvl1pPr>
+            <a:lvl2pPr marR="0" lvl="1" algn="l" rtl="0">
+              <a:lnSpc>
+                <a:spcPct val="100000"/>
+              </a:lnSpc>
+              <a:spcBef>
+                <a:spcPts val="0"/>
+              </a:spcBef>
+              <a:spcAft>
+                <a:spcPts val="0"/>
+              </a:spcAft>
+              <a:buClr>
+                <a:srgbClr val="FFFFFF"/>
+              </a:buClr>
+              <a:buSzPts val="1800"/>
+              <a:buFont typeface="Roboto Slab"/>
+              <a:buNone/>
+              <a:defRPr sz="1800" b="1" i="0" u="none" strike="noStrike" cap="none">
+                <a:solidFill>
+                  <a:srgbClr val="FFFFFF"/>
+                </a:solidFill>
+                <a:latin typeface="Roboto Slab"/>
+                <a:ea typeface="Roboto Slab"/>
+                <a:cs typeface="Roboto Slab"/>
+                <a:sym typeface="Roboto Slab"/>
+              </a:defRPr>
+            </a:lvl2pPr>
+            <a:lvl3pPr marR="0" lvl="2" algn="l" rtl="0">
+              <a:lnSpc>
+                <a:spcPct val="100000"/>
+              </a:lnSpc>
+              <a:spcBef>
+                <a:spcPts val="0"/>
+              </a:spcBef>
+              <a:spcAft>
+                <a:spcPts val="0"/>
+              </a:spcAft>
+              <a:buClr>
+                <a:srgbClr val="FFFFFF"/>
+              </a:buClr>
+              <a:buSzPts val="1800"/>
+              <a:buFont typeface="Roboto Slab"/>
+              <a:buNone/>
+              <a:defRPr sz="1800" b="1" i="0" u="none" strike="noStrike" cap="none">
+                <a:solidFill>
+                  <a:srgbClr val="FFFFFF"/>
+                </a:solidFill>
+                <a:latin typeface="Roboto Slab"/>
+                <a:ea typeface="Roboto Slab"/>
+                <a:cs typeface="Roboto Slab"/>
+                <a:sym typeface="Roboto Slab"/>
+              </a:defRPr>
+            </a:lvl3pPr>
+            <a:lvl4pPr marR="0" lvl="3" algn="l" rtl="0">
+              <a:lnSpc>
+                <a:spcPct val="100000"/>
+              </a:lnSpc>
+              <a:spcBef>
+                <a:spcPts val="0"/>
+              </a:spcBef>
+              <a:spcAft>
+                <a:spcPts val="0"/>
+              </a:spcAft>
+              <a:buClr>
+                <a:srgbClr val="FFFFFF"/>
+              </a:buClr>
+              <a:buSzPts val="1800"/>
+              <a:buFont typeface="Roboto Slab"/>
+              <a:buNone/>
+              <a:defRPr sz="1800" b="1" i="0" u="none" strike="noStrike" cap="none">
+                <a:solidFill>
+                  <a:srgbClr val="FFFFFF"/>
+                </a:solidFill>
+                <a:latin typeface="Roboto Slab"/>
+                <a:ea typeface="Roboto Slab"/>
+                <a:cs typeface="Roboto Slab"/>
+                <a:sym typeface="Roboto Slab"/>
+              </a:defRPr>
+            </a:lvl4pPr>
+            <a:lvl5pPr marR="0" lvl="4" algn="l" rtl="0">
+              <a:lnSpc>
+                <a:spcPct val="100000"/>
+              </a:lnSpc>
+              <a:spcBef>
+                <a:spcPts val="0"/>
+              </a:spcBef>
+              <a:spcAft>
+                <a:spcPts val="0"/>
+              </a:spcAft>
+              <a:buClr>
+                <a:srgbClr val="FFFFFF"/>
+              </a:buClr>
+              <a:buSzPts val="1800"/>
+              <a:buFont typeface="Roboto Slab"/>
+              <a:buNone/>
+              <a:defRPr sz="1800" b="1" i="0" u="none" strike="noStrike" cap="none">
+                <a:solidFill>
+                  <a:srgbClr val="FFFFFF"/>
+                </a:solidFill>
+                <a:latin typeface="Roboto Slab"/>
+                <a:ea typeface="Roboto Slab"/>
+                <a:cs typeface="Roboto Slab"/>
+                <a:sym typeface="Roboto Slab"/>
+              </a:defRPr>
+            </a:lvl5pPr>
+            <a:lvl6pPr marR="0" lvl="5" algn="l" rtl="0">
+              <a:lnSpc>
+                <a:spcPct val="100000"/>
+              </a:lnSpc>
+              <a:spcBef>
+                <a:spcPts val="0"/>
+              </a:spcBef>
+              <a:spcAft>
+                <a:spcPts val="0"/>
+              </a:spcAft>
+              <a:buClr>
+                <a:srgbClr val="FFFFFF"/>
+              </a:buClr>
+              <a:buSzPts val="1800"/>
+              <a:buFont typeface="Roboto Slab"/>
+              <a:buNone/>
+              <a:defRPr sz="1800" b="1" i="0" u="none" strike="noStrike" cap="none">
+                <a:solidFill>
+                  <a:srgbClr val="FFFFFF"/>
+                </a:solidFill>
+                <a:latin typeface="Roboto Slab"/>
+                <a:ea typeface="Roboto Slab"/>
+                <a:cs typeface="Roboto Slab"/>
+                <a:sym typeface="Roboto Slab"/>
+              </a:defRPr>
+            </a:lvl6pPr>
+            <a:lvl7pPr marR="0" lvl="6" algn="l" rtl="0">
+              <a:lnSpc>
+                <a:spcPct val="100000"/>
+              </a:lnSpc>
+              <a:spcBef>
+                <a:spcPts val="0"/>
+              </a:spcBef>
+              <a:spcAft>
+                <a:spcPts val="0"/>
+              </a:spcAft>
+              <a:buClr>
+                <a:srgbClr val="FFFFFF"/>
+              </a:buClr>
+              <a:buSzPts val="1800"/>
+              <a:buFont typeface="Roboto Slab"/>
+              <a:buNone/>
+              <a:defRPr sz="1800" b="1" i="0" u="none" strike="noStrike" cap="none">
+                <a:solidFill>
+                  <a:srgbClr val="FFFFFF"/>
+                </a:solidFill>
+                <a:latin typeface="Roboto Slab"/>
+                <a:ea typeface="Roboto Slab"/>
+                <a:cs typeface="Roboto Slab"/>
+                <a:sym typeface="Roboto Slab"/>
+              </a:defRPr>
+            </a:lvl7pPr>
+            <a:lvl8pPr marR="0" lvl="7" algn="l" rtl="0">
+              <a:lnSpc>
+                <a:spcPct val="100000"/>
+              </a:lnSpc>
+              <a:spcBef>
+                <a:spcPts val="0"/>
+              </a:spcBef>
+              <a:spcAft>
+                <a:spcPts val="0"/>
+              </a:spcAft>
+              <a:buClr>
+                <a:srgbClr val="FFFFFF"/>
+              </a:buClr>
+              <a:buSzPts val="1800"/>
+              <a:buFont typeface="Roboto Slab"/>
+              <a:buNone/>
+              <a:defRPr sz="1800" b="1" i="0" u="none" strike="noStrike" cap="none">
+                <a:solidFill>
+                  <a:srgbClr val="FFFFFF"/>
+                </a:solidFill>
+                <a:latin typeface="Roboto Slab"/>
+                <a:ea typeface="Roboto Slab"/>
+                <a:cs typeface="Roboto Slab"/>
+                <a:sym typeface="Roboto Slab"/>
+              </a:defRPr>
+            </a:lvl8pPr>
+            <a:lvl9pPr marR="0" lvl="8" algn="l" rtl="0">
+              <a:lnSpc>
+                <a:spcPct val="100000"/>
+              </a:lnSpc>
+              <a:spcBef>
+                <a:spcPts val="0"/>
+              </a:spcBef>
+              <a:spcAft>
+                <a:spcPts val="0"/>
+              </a:spcAft>
+              <a:buClr>
+                <a:srgbClr val="FFFFFF"/>
+              </a:buClr>
+              <a:buSzPts val="1800"/>
+              <a:buFont typeface="Roboto Slab"/>
+              <a:buNone/>
+              <a:defRPr sz="1800" b="1" i="0" u="none" strike="noStrike" cap="none">
+                <a:solidFill>
+                  <a:srgbClr val="FFFFFF"/>
+                </a:solidFill>
+                <a:latin typeface="Roboto Slab"/>
+                <a:ea typeface="Roboto Slab"/>
+                <a:cs typeface="Roboto Slab"/>
+                <a:sym typeface="Roboto Slab"/>
+              </a:defRPr>
+            </a:lvl9pPr>
+          </a:lstStyle>
+          <a:p>
+            <a:endParaRPr lang="en-US" sz="1600" dirty="0">
+              <a:solidFill>
+                <a:schemeClr val="tx1"/>
+              </a:solidFill>
+            </a:endParaRPr>
+          </a:p>
+        </p:txBody>
+      </p:sp>
+      <p:pic>
+        <p:nvPicPr>
+          <p:cNvPr id="2" name="圖片 1" descr="畫面剪輯"/>
+          <p:cNvPicPr>
+            <a:picLocks noChangeAspect="1"/>
+          </p:cNvPicPr>
+          <p:nvPr/>
+        </p:nvPicPr>
+        <p:blipFill>
+          <a:blip r:embed="rId3">
+            <a:extLst>
+              <a:ext uri="{28A0092B-C50C-407E-A947-70E740481C1C}">
+                <a14:useLocalDpi xmlns:a14="http://schemas.microsoft.com/office/drawing/2010/main" val="0"/>
+              </a:ext>
+            </a:extLst>
+          </a:blip>
+          <a:stretch>
+            <a:fillRect/>
+          </a:stretch>
+        </p:blipFill>
+        <p:spPr>
+          <a:xfrm>
+            <a:off x="807720" y="1559425"/>
+            <a:ext cx="8023860" cy="3399157"/>
+          </a:xfrm>
+          <a:prstGeom prst="rect">
+            <a:avLst/>
+          </a:prstGeom>
+        </p:spPr>
+      </p:pic>
     </p:spTree>
     <p:extLst>
       <p:ext uri="{BB962C8B-B14F-4D97-AF65-F5344CB8AC3E}">
-        <p14:creationId xmlns:p14="http://schemas.microsoft.com/office/powerpoint/2010/main" val="585914027"/>
+        <p14:creationId xmlns:p14="http://schemas.microsoft.com/office/powerpoint/2010/main" val="3327647742"/>
       </p:ext>
     </p:extLst>
   </p:cSld>
@@ -23517,59 +24843,22 @@
           </a:p>
         </p:txBody>
       </p:sp>
-    </p:spTree>
-    <p:extLst>
-      <p:ext uri="{BB962C8B-B14F-4D97-AF65-F5344CB8AC3E}">
-        <p14:creationId xmlns:p14="http://schemas.microsoft.com/office/powerpoint/2010/main" val="3841393571"/>
-      </p:ext>
-    </p:extLst>
-  </p:cSld>
-  <p:clrMapOvr>
-    <a:masterClrMapping/>
-  </p:clrMapOvr>
-  <p:timing>
-    <p:tnLst>
-      <p:par>
-        <p:cTn id="1" dur="indefinite" restart="never" nodeType="tmRoot"/>
-      </p:par>
-    </p:tnLst>
-  </p:timing>
-</p:sld>
-</file>
-
-<file path=ppt/slides/slide29.xml><?xml version="1.0" encoding="utf-8"?>
-<p:sld xmlns:a="http://schemas.openxmlformats.org/drawingml/2006/main" xmlns:r="http://schemas.openxmlformats.org/officeDocument/2006/relationships" xmlns:p="http://schemas.openxmlformats.org/presentationml/2006/main">
-  <p:cSld>
-    <p:spTree>
-      <p:nvGrpSpPr>
-        <p:cNvPr id="1" name="Shape 242"/>
-        <p:cNvGrpSpPr/>
-        <p:nvPr/>
-      </p:nvGrpSpPr>
-      <p:grpSpPr>
-        <a:xfrm>
-          <a:off x="0" y="0"/>
-          <a:ext cx="0" cy="0"/>
-          <a:chOff x="0" y="0"/>
-          <a:chExt cx="0" cy="0"/>
-        </a:xfrm>
-      </p:grpSpPr>
       <p:graphicFrame>
         <p:nvGraphicFramePr>
-          <p:cNvPr id="49" name="表格 48"/>
+          <p:cNvPr id="12" name="表格 11"/>
           <p:cNvGraphicFramePr>
             <a:graphicFrameLocks noGrp="1"/>
           </p:cNvGraphicFramePr>
           <p:nvPr>
             <p:extLst>
               <p:ext uri="{D42A27DB-BD31-4B8C-83A1-F6EECF244321}">
-                <p14:modId xmlns:p14="http://schemas.microsoft.com/office/powerpoint/2010/main" val="3050169154"/>
+                <p14:modId xmlns:p14="http://schemas.microsoft.com/office/powerpoint/2010/main" val="3218082088"/>
               </p:ext>
             </p:extLst>
           </p:nvPr>
         </p:nvGraphicFramePr>
         <p:xfrm>
-          <a:off x="1285462" y="579509"/>
+          <a:off x="1638964" y="1181015"/>
           <a:ext cx="6506816" cy="3926230"/>
         </p:xfrm>
         <a:graphic>
@@ -23660,6 +24949,13 @@
                     <a:lstStyle/>
                     <a:p>
                       <a:pPr algn="ctr"/>
+                      <a:r>
+                        <a:rPr lang="en-US" altLang="zh-TW" dirty="0" smtClean="0">
+                          <a:latin typeface="Times New Roman" panose="02020603050405020304" pitchFamily="18" charset="0"/>
+                          <a:ea typeface="標楷體" panose="03000509000000000000" pitchFamily="65" charset="-120"/>
+                        </a:rPr>
+                        <a:t>931</a:t>
+                      </a:r>
                       <a:endParaRPr lang="zh-TW" altLang="en-US" dirty="0">
                         <a:latin typeface="Times New Roman" panose="02020603050405020304" pitchFamily="18" charset="0"/>
                         <a:ea typeface="標楷體" panose="03000509000000000000" pitchFamily="65" charset="-120"/>
@@ -23709,6 +25005,13 @@
                     <a:lstStyle/>
                     <a:p>
                       <a:pPr algn="ctr"/>
+                      <a:r>
+                        <a:rPr lang="en-US" altLang="zh-TW" dirty="0" smtClean="0">
+                          <a:latin typeface="Times New Roman" panose="02020603050405020304" pitchFamily="18" charset="0"/>
+                          <a:ea typeface="標楷體" panose="03000509000000000000" pitchFamily="65" charset="-120"/>
+                        </a:rPr>
+                        <a:t>13</a:t>
+                      </a:r>
                       <a:endParaRPr lang="zh-TW" altLang="en-US" dirty="0">
                         <a:latin typeface="Times New Roman" panose="02020603050405020304" pitchFamily="18" charset="0"/>
                         <a:ea typeface="標楷體" panose="03000509000000000000" pitchFamily="65" charset="-120"/>
@@ -23758,6 +25061,13 @@
                     <a:lstStyle/>
                     <a:p>
                       <a:pPr algn="ctr"/>
+                      <a:r>
+                        <a:rPr lang="en-US" altLang="zh-TW" dirty="0" smtClean="0">
+                          <a:latin typeface="Times New Roman" panose="02020603050405020304" pitchFamily="18" charset="0"/>
+                          <a:ea typeface="標楷體" panose="03000509000000000000" pitchFamily="65" charset="-120"/>
+                        </a:rPr>
+                        <a:t>15</a:t>
+                      </a:r>
                       <a:endParaRPr lang="zh-TW" altLang="en-US" dirty="0">
                         <a:latin typeface="Times New Roman" panose="02020603050405020304" pitchFamily="18" charset="0"/>
                         <a:ea typeface="標楷體" panose="03000509000000000000" pitchFamily="65" charset="-120"/>
@@ -23807,6 +25117,13 @@
                     <a:lstStyle/>
                     <a:p>
                       <a:pPr algn="ctr"/>
+                      <a:r>
+                        <a:rPr lang="en-US" altLang="zh-TW" dirty="0" smtClean="0">
+                          <a:latin typeface="Times New Roman" panose="02020603050405020304" pitchFamily="18" charset="0"/>
+                          <a:ea typeface="標楷體" panose="03000509000000000000" pitchFamily="65" charset="-120"/>
+                        </a:rPr>
+                        <a:t>6</a:t>
+                      </a:r>
                       <a:endParaRPr lang="zh-TW" altLang="en-US" dirty="0">
                         <a:latin typeface="Times New Roman" panose="02020603050405020304" pitchFamily="18" charset="0"/>
                         <a:ea typeface="標楷體" panose="03000509000000000000" pitchFamily="65" charset="-120"/>
@@ -23849,6 +25166,13 @@
                     <a:lstStyle/>
                     <a:p>
                       <a:pPr algn="ctr"/>
+                      <a:r>
+                        <a:rPr lang="en-US" altLang="zh-TW" dirty="0" smtClean="0">
+                          <a:latin typeface="Times New Roman" panose="02020603050405020304" pitchFamily="18" charset="0"/>
+                          <a:ea typeface="標楷體" panose="03000509000000000000" pitchFamily="65" charset="-120"/>
+                        </a:rPr>
+                        <a:t>93</a:t>
+                      </a:r>
                       <a:endParaRPr lang="zh-TW" altLang="en-US" dirty="0">
                         <a:latin typeface="Times New Roman" panose="02020603050405020304" pitchFamily="18" charset="0"/>
                         <a:ea typeface="標楷體" panose="03000509000000000000" pitchFamily="65" charset="-120"/>
@@ -24109,9 +25433,566 @@
           </a:graphicData>
         </a:graphic>
       </p:graphicFrame>
+    </p:spTree>
+    <p:extLst>
+      <p:ext uri="{BB962C8B-B14F-4D97-AF65-F5344CB8AC3E}">
+        <p14:creationId xmlns:p14="http://schemas.microsoft.com/office/powerpoint/2010/main" val="3841393571"/>
+      </p:ext>
+    </p:extLst>
+  </p:cSld>
+  <p:clrMapOvr>
+    <a:masterClrMapping/>
+  </p:clrMapOvr>
+  <p:timing>
+    <p:tnLst>
+      <p:par>
+        <p:cTn id="1" dur="indefinite" restart="never" nodeType="tmRoot"/>
+      </p:par>
+    </p:tnLst>
+  </p:timing>
+</p:sld>
+</file>
+
+<file path=ppt/slides/slide29.xml><?xml version="1.0" encoding="utf-8"?>
+<p:sld xmlns:a="http://schemas.openxmlformats.org/drawingml/2006/main" xmlns:r="http://schemas.openxmlformats.org/officeDocument/2006/relationships" xmlns:p="http://schemas.openxmlformats.org/presentationml/2006/main">
+  <p:cSld>
+    <p:spTree>
+      <p:nvGrpSpPr>
+        <p:cNvPr id="1" name="Shape 110"/>
+        <p:cNvGrpSpPr/>
+        <p:nvPr/>
+      </p:nvGrpSpPr>
+      <p:grpSpPr>
+        <a:xfrm>
+          <a:off x="0" y="0"/>
+          <a:ext cx="0" cy="0"/>
+          <a:chOff x="0" y="0"/>
+          <a:chExt cx="0" cy="0"/>
+        </a:xfrm>
+      </p:grpSpPr>
+      <p:grpSp>
+        <p:nvGrpSpPr>
+          <p:cNvPr id="112" name="Shape 112"/>
+          <p:cNvGrpSpPr/>
+          <p:nvPr/>
+        </p:nvGrpSpPr>
+        <p:grpSpPr>
+          <a:xfrm>
+            <a:off x="333623" y="861852"/>
+            <a:ext cx="366458" cy="366437"/>
+            <a:chOff x="1923675" y="1633650"/>
+            <a:chExt cx="436000" cy="435975"/>
+          </a:xfrm>
+        </p:grpSpPr>
+        <p:sp>
+          <p:nvSpPr>
+            <p:cNvPr id="113" name="Shape 113"/>
+            <p:cNvSpPr/>
+            <p:nvPr/>
+          </p:nvSpPr>
+          <p:spPr>
+            <a:xfrm>
+              <a:off x="2209250" y="1633650"/>
+              <a:ext cx="150425" cy="150425"/>
+            </a:xfrm>
+            <a:custGeom>
+              <a:avLst/>
+              <a:gdLst/>
+              <a:ahLst/>
+              <a:cxnLst/>
+              <a:rect l="0" t="0" r="0" b="0"/>
+              <a:pathLst>
+                <a:path w="6017" h="6017" fill="none" extrusionOk="0">
+                  <a:moveTo>
+                    <a:pt x="5846" y="3605"/>
+                  </a:moveTo>
+                  <a:lnTo>
+                    <a:pt x="2412" y="171"/>
+                  </a:lnTo>
+                  <a:lnTo>
+                    <a:pt x="2412" y="171"/>
+                  </a:lnTo>
+                  <a:lnTo>
+                    <a:pt x="2314" y="98"/>
+                  </a:lnTo>
+                  <a:lnTo>
+                    <a:pt x="2217" y="49"/>
+                  </a:lnTo>
+                  <a:lnTo>
+                    <a:pt x="2095" y="25"/>
+                  </a:lnTo>
+                  <a:lnTo>
+                    <a:pt x="1997" y="1"/>
+                  </a:lnTo>
+                  <a:lnTo>
+                    <a:pt x="1876" y="25"/>
+                  </a:lnTo>
+                  <a:lnTo>
+                    <a:pt x="1778" y="49"/>
+                  </a:lnTo>
+                  <a:lnTo>
+                    <a:pt x="1681" y="98"/>
+                  </a:lnTo>
+                  <a:lnTo>
+                    <a:pt x="1583" y="171"/>
+                  </a:lnTo>
+                  <a:lnTo>
+                    <a:pt x="0" y="1778"/>
+                  </a:lnTo>
+                  <a:lnTo>
+                    <a:pt x="4238" y="6016"/>
+                  </a:lnTo>
+                  <a:lnTo>
+                    <a:pt x="5846" y="4433"/>
+                  </a:lnTo>
+                  <a:lnTo>
+                    <a:pt x="5846" y="4433"/>
+                  </a:lnTo>
+                  <a:lnTo>
+                    <a:pt x="5919" y="4336"/>
+                  </a:lnTo>
+                  <a:lnTo>
+                    <a:pt x="5967" y="4238"/>
+                  </a:lnTo>
+                  <a:lnTo>
+                    <a:pt x="5992" y="4141"/>
+                  </a:lnTo>
+                  <a:lnTo>
+                    <a:pt x="6016" y="4019"/>
+                  </a:lnTo>
+                  <a:lnTo>
+                    <a:pt x="5992" y="3922"/>
+                  </a:lnTo>
+                  <a:lnTo>
+                    <a:pt x="5967" y="3800"/>
+                  </a:lnTo>
+                  <a:lnTo>
+                    <a:pt x="5919" y="3703"/>
+                  </a:lnTo>
+                  <a:lnTo>
+                    <a:pt x="5846" y="3605"/>
+                  </a:lnTo>
+                  <a:lnTo>
+                    <a:pt x="5846" y="3605"/>
+                  </a:lnTo>
+                  <a:close/>
+                </a:path>
+              </a:pathLst>
+            </a:custGeom>
+            <a:noFill/>
+            <a:ln w="12175" cap="rnd" cmpd="sng">
+              <a:solidFill>
+                <a:srgbClr val="FFFFFF"/>
+              </a:solidFill>
+              <a:prstDash val="solid"/>
+              <a:round/>
+              <a:headEnd type="none" w="sm" len="sm"/>
+              <a:tailEnd type="none" w="sm" len="sm"/>
+            </a:ln>
+          </p:spPr>
+          <p:txBody>
+            <a:bodyPr spcFirstLastPara="1" wrap="square" lIns="91425" tIns="91425" rIns="91425" bIns="91425" anchor="ctr" anchorCtr="0">
+              <a:noAutofit/>
+            </a:bodyPr>
+            <a:lstStyle/>
+            <a:p>
+              <a:pPr marL="0" lvl="0" indent="0">
+                <a:spcBef>
+                  <a:spcPts val="0"/>
+                </a:spcBef>
+                <a:spcAft>
+                  <a:spcPts val="0"/>
+                </a:spcAft>
+                <a:buNone/>
+              </a:pPr>
+              <a:endParaRPr/>
+            </a:p>
+          </p:txBody>
+        </p:sp>
+        <p:sp>
+          <p:nvSpPr>
+            <p:cNvPr id="114" name="Shape 114"/>
+            <p:cNvSpPr/>
+            <p:nvPr/>
+          </p:nvSpPr>
+          <p:spPr>
+            <a:xfrm>
+              <a:off x="2019900" y="1757250"/>
+              <a:ext cx="261825" cy="261850"/>
+            </a:xfrm>
+            <a:custGeom>
+              <a:avLst/>
+              <a:gdLst/>
+              <a:ahLst/>
+              <a:cxnLst/>
+              <a:rect l="0" t="0" r="0" b="0"/>
+              <a:pathLst>
+                <a:path w="10473" h="10474" fill="none" extrusionOk="0">
+                  <a:moveTo>
+                    <a:pt x="10473" y="1"/>
+                  </a:moveTo>
+                  <a:lnTo>
+                    <a:pt x="0" y="10473"/>
+                  </a:lnTo>
+                </a:path>
+              </a:pathLst>
+            </a:custGeom>
+            <a:noFill/>
+            <a:ln w="12175" cap="rnd" cmpd="sng">
+              <a:solidFill>
+                <a:srgbClr val="FFFFFF"/>
+              </a:solidFill>
+              <a:prstDash val="solid"/>
+              <a:round/>
+              <a:headEnd type="none" w="sm" len="sm"/>
+              <a:tailEnd type="none" w="sm" len="sm"/>
+            </a:ln>
+          </p:spPr>
+          <p:txBody>
+            <a:bodyPr spcFirstLastPara="1" wrap="square" lIns="91425" tIns="91425" rIns="91425" bIns="91425" anchor="ctr" anchorCtr="0">
+              <a:noAutofit/>
+            </a:bodyPr>
+            <a:lstStyle/>
+            <a:p>
+              <a:pPr marL="0" lvl="0" indent="0">
+                <a:spcBef>
+                  <a:spcPts val="0"/>
+                </a:spcBef>
+                <a:spcAft>
+                  <a:spcPts val="0"/>
+                </a:spcAft>
+                <a:buNone/>
+              </a:pPr>
+              <a:endParaRPr/>
+            </a:p>
+          </p:txBody>
+        </p:sp>
+        <p:sp>
+          <p:nvSpPr>
+            <p:cNvPr id="115" name="Shape 115"/>
+            <p:cNvSpPr/>
+            <p:nvPr/>
+          </p:nvSpPr>
+          <p:spPr>
+            <a:xfrm>
+              <a:off x="1923675" y="1681150"/>
+              <a:ext cx="388500" cy="388475"/>
+            </a:xfrm>
+            <a:custGeom>
+              <a:avLst/>
+              <a:gdLst/>
+              <a:ahLst/>
+              <a:cxnLst/>
+              <a:rect l="0" t="0" r="0" b="0"/>
+              <a:pathLst>
+                <a:path w="15540" h="15539" fill="none" extrusionOk="0">
+                  <a:moveTo>
+                    <a:pt x="11277" y="0"/>
+                  </a:moveTo>
+                  <a:lnTo>
+                    <a:pt x="756" y="10546"/>
+                  </a:lnTo>
+                  <a:lnTo>
+                    <a:pt x="756" y="10546"/>
+                  </a:lnTo>
+                  <a:lnTo>
+                    <a:pt x="683" y="10619"/>
+                  </a:lnTo>
+                  <a:lnTo>
+                    <a:pt x="634" y="10692"/>
+                  </a:lnTo>
+                  <a:lnTo>
+                    <a:pt x="610" y="10765"/>
+                  </a:lnTo>
+                  <a:lnTo>
+                    <a:pt x="585" y="10863"/>
+                  </a:lnTo>
+                  <a:lnTo>
+                    <a:pt x="1" y="14881"/>
+                  </a:lnTo>
+                  <a:lnTo>
+                    <a:pt x="1" y="14881"/>
+                  </a:lnTo>
+                  <a:lnTo>
+                    <a:pt x="1" y="15003"/>
+                  </a:lnTo>
+                  <a:lnTo>
+                    <a:pt x="25" y="15149"/>
+                  </a:lnTo>
+                  <a:lnTo>
+                    <a:pt x="98" y="15271"/>
+                  </a:lnTo>
+                  <a:lnTo>
+                    <a:pt x="171" y="15368"/>
+                  </a:lnTo>
+                  <a:lnTo>
+                    <a:pt x="171" y="15368"/>
+                  </a:lnTo>
+                  <a:lnTo>
+                    <a:pt x="269" y="15441"/>
+                  </a:lnTo>
+                  <a:lnTo>
+                    <a:pt x="366" y="15490"/>
+                  </a:lnTo>
+                  <a:lnTo>
+                    <a:pt x="464" y="15514"/>
+                  </a:lnTo>
+                  <a:lnTo>
+                    <a:pt x="585" y="15539"/>
+                  </a:lnTo>
+                  <a:lnTo>
+                    <a:pt x="585" y="15539"/>
+                  </a:lnTo>
+                  <a:lnTo>
+                    <a:pt x="659" y="15539"/>
+                  </a:lnTo>
+                  <a:lnTo>
+                    <a:pt x="4677" y="14954"/>
+                  </a:lnTo>
+                  <a:lnTo>
+                    <a:pt x="4677" y="14954"/>
+                  </a:lnTo>
+                  <a:lnTo>
+                    <a:pt x="4848" y="14905"/>
+                  </a:lnTo>
+                  <a:lnTo>
+                    <a:pt x="4921" y="14857"/>
+                  </a:lnTo>
+                  <a:lnTo>
+                    <a:pt x="4994" y="14784"/>
+                  </a:lnTo>
+                  <a:lnTo>
+                    <a:pt x="15539" y="4262"/>
+                  </a:lnTo>
+                </a:path>
+              </a:pathLst>
+            </a:custGeom>
+            <a:noFill/>
+            <a:ln w="12175" cap="rnd" cmpd="sng">
+              <a:solidFill>
+                <a:srgbClr val="FFFFFF"/>
+              </a:solidFill>
+              <a:prstDash val="solid"/>
+              <a:round/>
+              <a:headEnd type="none" w="sm" len="sm"/>
+              <a:tailEnd type="none" w="sm" len="sm"/>
+            </a:ln>
+          </p:spPr>
+          <p:txBody>
+            <a:bodyPr spcFirstLastPara="1" wrap="square" lIns="91425" tIns="91425" rIns="91425" bIns="91425" anchor="ctr" anchorCtr="0">
+              <a:noAutofit/>
+            </a:bodyPr>
+            <a:lstStyle/>
+            <a:p>
+              <a:pPr marL="0" lvl="0" indent="0">
+                <a:spcBef>
+                  <a:spcPts val="0"/>
+                </a:spcBef>
+                <a:spcAft>
+                  <a:spcPts val="0"/>
+                </a:spcAft>
+                <a:buNone/>
+              </a:pPr>
+              <a:endParaRPr/>
+            </a:p>
+          </p:txBody>
+        </p:sp>
+        <p:sp>
+          <p:nvSpPr>
+            <p:cNvPr id="116" name="Shape 116"/>
+            <p:cNvSpPr/>
+            <p:nvPr/>
+          </p:nvSpPr>
+          <p:spPr>
+            <a:xfrm>
+              <a:off x="1974225" y="1711575"/>
+              <a:ext cx="261825" cy="261850"/>
+            </a:xfrm>
+            <a:custGeom>
+              <a:avLst/>
+              <a:gdLst/>
+              <a:ahLst/>
+              <a:cxnLst/>
+              <a:rect l="0" t="0" r="0" b="0"/>
+              <a:pathLst>
+                <a:path w="10473" h="10474" fill="none" extrusionOk="0">
+                  <a:moveTo>
+                    <a:pt x="0" y="10474"/>
+                  </a:moveTo>
+                  <a:lnTo>
+                    <a:pt x="10473" y="1"/>
+                  </a:lnTo>
+                </a:path>
+              </a:pathLst>
+            </a:custGeom>
+            <a:noFill/>
+            <a:ln w="12175" cap="rnd" cmpd="sng">
+              <a:solidFill>
+                <a:srgbClr val="FFFFFF"/>
+              </a:solidFill>
+              <a:prstDash val="solid"/>
+              <a:round/>
+              <a:headEnd type="none" w="sm" len="sm"/>
+              <a:tailEnd type="none" w="sm" len="sm"/>
+            </a:ln>
+          </p:spPr>
+          <p:txBody>
+            <a:bodyPr spcFirstLastPara="1" wrap="square" lIns="91425" tIns="91425" rIns="91425" bIns="91425" anchor="ctr" anchorCtr="0">
+              <a:noAutofit/>
+            </a:bodyPr>
+            <a:lstStyle/>
+            <a:p>
+              <a:pPr marL="0" lvl="0" indent="0">
+                <a:spcBef>
+                  <a:spcPts val="0"/>
+                </a:spcBef>
+                <a:spcAft>
+                  <a:spcPts val="0"/>
+                </a:spcAft>
+                <a:buNone/>
+              </a:pPr>
+              <a:endParaRPr/>
+            </a:p>
+          </p:txBody>
+        </p:sp>
+        <p:sp>
+          <p:nvSpPr>
+            <p:cNvPr id="117" name="Shape 117"/>
+            <p:cNvSpPr/>
+            <p:nvPr/>
+          </p:nvSpPr>
+          <p:spPr>
+            <a:xfrm>
+              <a:off x="1934650" y="2014200"/>
+              <a:ext cx="44475" cy="44475"/>
+            </a:xfrm>
+            <a:custGeom>
+              <a:avLst/>
+              <a:gdLst/>
+              <a:ahLst/>
+              <a:cxnLst/>
+              <a:rect l="0" t="0" r="0" b="0"/>
+              <a:pathLst>
+                <a:path w="1779" h="1779" fill="none" extrusionOk="0">
+                  <a:moveTo>
+                    <a:pt x="1778" y="1778"/>
+                  </a:moveTo>
+                  <a:lnTo>
+                    <a:pt x="0" y="0"/>
+                  </a:lnTo>
+                </a:path>
+              </a:pathLst>
+            </a:custGeom>
+            <a:noFill/>
+            <a:ln w="12175" cap="rnd" cmpd="sng">
+              <a:solidFill>
+                <a:srgbClr val="FFFFFF"/>
+              </a:solidFill>
+              <a:prstDash val="solid"/>
+              <a:round/>
+              <a:headEnd type="none" w="sm" len="sm"/>
+              <a:tailEnd type="none" w="sm" len="sm"/>
+            </a:ln>
+          </p:spPr>
+          <p:txBody>
+            <a:bodyPr spcFirstLastPara="1" wrap="square" lIns="91425" tIns="91425" rIns="91425" bIns="91425" anchor="ctr" anchorCtr="0">
+              <a:noAutofit/>
+            </a:bodyPr>
+            <a:lstStyle/>
+            <a:p>
+              <a:pPr marL="0" lvl="0" indent="0">
+                <a:spcBef>
+                  <a:spcPts val="0"/>
+                </a:spcBef>
+                <a:spcAft>
+                  <a:spcPts val="0"/>
+                </a:spcAft>
+                <a:buNone/>
+              </a:pPr>
+              <a:endParaRPr/>
+            </a:p>
+          </p:txBody>
+        </p:sp>
+        <p:sp>
+          <p:nvSpPr>
+            <p:cNvPr id="118" name="Shape 118"/>
+            <p:cNvSpPr/>
+            <p:nvPr/>
+          </p:nvSpPr>
+          <p:spPr>
+            <a:xfrm>
+              <a:off x="1944375" y="1947225"/>
+              <a:ext cx="101725" cy="101700"/>
+            </a:xfrm>
+            <a:custGeom>
+              <a:avLst/>
+              <a:gdLst/>
+              <a:ahLst/>
+              <a:cxnLst/>
+              <a:rect l="0" t="0" r="0" b="0"/>
+              <a:pathLst>
+                <a:path w="4069" h="4068" fill="none" extrusionOk="0">
+                  <a:moveTo>
+                    <a:pt x="1" y="49"/>
+                  </a:moveTo>
+                  <a:lnTo>
+                    <a:pt x="1" y="49"/>
+                  </a:lnTo>
+                  <a:lnTo>
+                    <a:pt x="25" y="0"/>
+                  </a:lnTo>
+                  <a:lnTo>
+                    <a:pt x="25" y="0"/>
+                  </a:lnTo>
+                  <a:lnTo>
+                    <a:pt x="4068" y="4043"/>
+                  </a:lnTo>
+                  <a:lnTo>
+                    <a:pt x="4068" y="4043"/>
+                  </a:lnTo>
+                  <a:lnTo>
+                    <a:pt x="4068" y="4043"/>
+                  </a:lnTo>
+                  <a:lnTo>
+                    <a:pt x="4020" y="4068"/>
+                  </a:lnTo>
+                </a:path>
+              </a:pathLst>
+            </a:custGeom>
+            <a:noFill/>
+            <a:ln w="12175" cap="rnd" cmpd="sng">
+              <a:solidFill>
+                <a:srgbClr val="FFFFFF"/>
+              </a:solidFill>
+              <a:prstDash val="solid"/>
+              <a:round/>
+              <a:headEnd type="none" w="sm" len="sm"/>
+              <a:tailEnd type="none" w="sm" len="sm"/>
+            </a:ln>
+          </p:spPr>
+          <p:txBody>
+            <a:bodyPr spcFirstLastPara="1" wrap="square" lIns="91425" tIns="91425" rIns="91425" bIns="91425" anchor="ctr" anchorCtr="0">
+              <a:noAutofit/>
+            </a:bodyPr>
+            <a:lstStyle/>
+            <a:p>
+              <a:pPr marL="0" lvl="0" indent="0">
+                <a:spcBef>
+                  <a:spcPts val="0"/>
+                </a:spcBef>
+                <a:spcAft>
+                  <a:spcPts val="0"/>
+                </a:spcAft>
+                <a:buNone/>
+              </a:pPr>
+              <a:endParaRPr/>
+            </a:p>
+          </p:txBody>
+        </p:sp>
+      </p:grpSp>
       <p:sp>
         <p:nvSpPr>
-          <p:cNvPr id="2" name="投影片編號版面配置區 1"/>
+          <p:cNvPr id="3" name="投影片編號版面配置區 2"/>
           <p:cNvSpPr>
             <a:spLocks noGrp="1"/>
           </p:cNvSpPr>
@@ -24119,15 +26000,7 @@
             <p:ph type="sldNum" sz="quarter" idx="4"/>
           </p:nvPr>
         </p:nvSpPr>
-        <p:spPr>
-          <a:xfrm>
-            <a:off x="354330" y="4652963"/>
-            <a:ext cx="400050" cy="284797"/>
-          </a:xfrm>
-          <a:prstGeom prst="rect">
-            <a:avLst/>
-          </a:prstGeom>
-        </p:spPr>
+        <p:spPr/>
         <p:txBody>
           <a:bodyPr/>
           <a:lstStyle/>
@@ -24136,11 +26009,114 @@
               <a:rPr lang="zh-TW" altLang="en-US" smtClean="0"/>
               <a:t>29</a:t>
             </a:fld>
-            <a:endParaRPr lang="zh-TW" altLang="en-US" dirty="0"/>
+            <a:endParaRPr lang="zh-TW" altLang="en-US"/>
+          </a:p>
+        </p:txBody>
+      </p:sp>
+      <p:sp>
+        <p:nvSpPr>
+          <p:cNvPr id="2" name="矩形 1"/>
+          <p:cNvSpPr/>
+          <p:nvPr/>
+        </p:nvSpPr>
+        <p:spPr>
+          <a:xfrm>
+            <a:off x="251460" y="195772"/>
+            <a:ext cx="4594860" cy="1859280"/>
+          </a:xfrm>
+          <a:prstGeom prst="rect">
+            <a:avLst/>
+          </a:prstGeom>
+          <a:solidFill>
+            <a:schemeClr val="bg1"/>
+          </a:solidFill>
+          <a:ln>
+            <a:solidFill>
+              <a:schemeClr val="bg1"/>
+            </a:solidFill>
+          </a:ln>
+        </p:spPr>
+        <p:style>
+          <a:lnRef idx="2">
+            <a:schemeClr val="accent1">
+              <a:shade val="50000"/>
+            </a:schemeClr>
+          </a:lnRef>
+          <a:fillRef idx="1">
+            <a:schemeClr val="accent1"/>
+          </a:fillRef>
+          <a:effectRef idx="0">
+            <a:schemeClr val="accent1"/>
+          </a:effectRef>
+          <a:fontRef idx="minor">
+            <a:schemeClr val="lt1"/>
+          </a:fontRef>
+        </p:style>
+        <p:txBody>
+          <a:bodyPr rtlCol="0" anchor="ctr"/>
+          <a:lstStyle/>
+          <a:p>
+            <a:pPr algn="ctr"/>
+            <a:endParaRPr lang="zh-TW" altLang="en-US"/>
+          </a:p>
+        </p:txBody>
+      </p:sp>
+      <p:sp>
+        <p:nvSpPr>
+          <p:cNvPr id="111" name="Shape 111"/>
+          <p:cNvSpPr txBox="1">
+            <a:spLocks noGrp="1"/>
+          </p:cNvSpPr>
+          <p:nvPr>
+            <p:ph type="title"/>
+          </p:nvPr>
+        </p:nvSpPr>
+        <p:spPr>
+          <a:xfrm>
+            <a:off x="3201768" y="1830262"/>
+            <a:ext cx="4380131" cy="1994978"/>
+          </a:xfrm>
+          <a:prstGeom prst="rect">
+            <a:avLst/>
+          </a:prstGeom>
+        </p:spPr>
+        <p:txBody>
+          <a:bodyPr spcFirstLastPara="1" wrap="square" lIns="91425" tIns="91425" rIns="91425" bIns="91425" anchor="ctr" anchorCtr="0">
+            <a:noAutofit/>
+          </a:bodyPr>
+          <a:lstStyle/>
+          <a:p>
+            <a:pPr marL="0" lvl="0" indent="0" rtl="0">
+              <a:spcBef>
+                <a:spcPts val="0"/>
+              </a:spcBef>
+              <a:spcAft>
+                <a:spcPts val="0"/>
+              </a:spcAft>
+              <a:buNone/>
+            </a:pPr>
+            <a:r>
+              <a:rPr lang="en-US" altLang="zh-TW" sz="4400" dirty="0" smtClean="0">
+                <a:solidFill>
+                  <a:schemeClr val="tx1"/>
+                </a:solidFill>
+              </a:rPr>
+              <a:t>Thank You</a:t>
+            </a:r>
+            <a:endParaRPr sz="2400" dirty="0">
+              <a:solidFill>
+                <a:schemeClr val="tx1"/>
+              </a:solidFill>
+            </a:endParaRPr>
           </a:p>
         </p:txBody>
       </p:sp>
     </p:spTree>
+    <p:extLst>
+      <p:ext uri="{BB962C8B-B14F-4D97-AF65-F5344CB8AC3E}">
+        <p14:creationId xmlns:p14="http://schemas.microsoft.com/office/powerpoint/2010/main" val="1081795826"/>
+      </p:ext>
+    </p:extLst>
   </p:cSld>
   <p:clrMapOvr>
     <a:masterClrMapping/>
@@ -25605,8 +27581,8 @@
         </p:blipFill>
         <p:spPr>
           <a:xfrm>
-            <a:off x="436521" y="1858247"/>
-            <a:ext cx="8302913" cy="2455336"/>
+            <a:off x="831898" y="1858247"/>
+            <a:ext cx="7512158" cy="2455336"/>
           </a:xfrm>
           <a:prstGeom prst="rect">
             <a:avLst/>
@@ -26911,6 +28887,296 @@
               <a:t>6</a:t>
             </a:fld>
             <a:endParaRPr lang="zh-TW" altLang="en-US"/>
+          </a:p>
+        </p:txBody>
+      </p:sp>
+      <p:sp>
+        <p:nvSpPr>
+          <p:cNvPr id="12" name="Shape 111"/>
+          <p:cNvSpPr txBox="1">
+            <a:spLocks/>
+          </p:cNvSpPr>
+          <p:nvPr/>
+        </p:nvSpPr>
+        <p:spPr>
+          <a:xfrm>
+            <a:off x="2005428" y="2222364"/>
+            <a:ext cx="5363112" cy="1770515"/>
+          </a:xfrm>
+          <a:prstGeom prst="rect">
+            <a:avLst/>
+          </a:prstGeom>
+          <a:noFill/>
+          <a:ln>
+            <a:noFill/>
+          </a:ln>
+        </p:spPr>
+        <p:txBody>
+          <a:bodyPr spcFirstLastPara="1" wrap="square" lIns="91425" tIns="91425" rIns="91425" bIns="91425" anchor="ctr" anchorCtr="0">
+            <a:noAutofit/>
+          </a:bodyPr>
+          <a:lstStyle>
+            <a:defPPr marR="0" lvl="0" algn="l" rtl="0">
+              <a:lnSpc>
+                <a:spcPct val="100000"/>
+              </a:lnSpc>
+              <a:spcBef>
+                <a:spcPts val="0"/>
+              </a:spcBef>
+              <a:spcAft>
+                <a:spcPts val="0"/>
+              </a:spcAft>
+            </a:defPPr>
+            <a:lvl1pPr marR="0" lvl="0" algn="l" rtl="0">
+              <a:lnSpc>
+                <a:spcPct val="100000"/>
+              </a:lnSpc>
+              <a:spcBef>
+                <a:spcPts val="0"/>
+              </a:spcBef>
+              <a:spcAft>
+                <a:spcPts val="0"/>
+              </a:spcAft>
+              <a:buClr>
+                <a:srgbClr val="FFFFFF"/>
+              </a:buClr>
+              <a:buSzPts val="1800"/>
+              <a:buFont typeface="Roboto Slab"/>
+              <a:buNone/>
+              <a:defRPr sz="1800" b="1" i="0" u="none" strike="noStrike" cap="none" baseline="0">
+                <a:solidFill>
+                  <a:srgbClr val="FFFFFF"/>
+                </a:solidFill>
+                <a:latin typeface="Times New Roman" panose="02020603050405020304" pitchFamily="18" charset="0"/>
+                <a:ea typeface="標楷體" panose="03000509000000000000" pitchFamily="65" charset="-120"/>
+                <a:cs typeface="Roboto Slab"/>
+                <a:sym typeface="Roboto Slab"/>
+              </a:defRPr>
+            </a:lvl1pPr>
+            <a:lvl2pPr marR="0" lvl="1" algn="l" rtl="0">
+              <a:lnSpc>
+                <a:spcPct val="100000"/>
+              </a:lnSpc>
+              <a:spcBef>
+                <a:spcPts val="0"/>
+              </a:spcBef>
+              <a:spcAft>
+                <a:spcPts val="0"/>
+              </a:spcAft>
+              <a:buClr>
+                <a:srgbClr val="FFFFFF"/>
+              </a:buClr>
+              <a:buSzPts val="1800"/>
+              <a:buFont typeface="Roboto Slab"/>
+              <a:buNone/>
+              <a:defRPr sz="1800" b="1" i="0" u="none" strike="noStrike" cap="none">
+                <a:solidFill>
+                  <a:srgbClr val="FFFFFF"/>
+                </a:solidFill>
+                <a:latin typeface="Roboto Slab"/>
+                <a:ea typeface="Roboto Slab"/>
+                <a:cs typeface="Roboto Slab"/>
+                <a:sym typeface="Roboto Slab"/>
+              </a:defRPr>
+            </a:lvl2pPr>
+            <a:lvl3pPr marR="0" lvl="2" algn="l" rtl="0">
+              <a:lnSpc>
+                <a:spcPct val="100000"/>
+              </a:lnSpc>
+              <a:spcBef>
+                <a:spcPts val="0"/>
+              </a:spcBef>
+              <a:spcAft>
+                <a:spcPts val="0"/>
+              </a:spcAft>
+              <a:buClr>
+                <a:srgbClr val="FFFFFF"/>
+              </a:buClr>
+              <a:buSzPts val="1800"/>
+              <a:buFont typeface="Roboto Slab"/>
+              <a:buNone/>
+              <a:defRPr sz="1800" b="1" i="0" u="none" strike="noStrike" cap="none">
+                <a:solidFill>
+                  <a:srgbClr val="FFFFFF"/>
+                </a:solidFill>
+                <a:latin typeface="Roboto Slab"/>
+                <a:ea typeface="Roboto Slab"/>
+                <a:cs typeface="Roboto Slab"/>
+                <a:sym typeface="Roboto Slab"/>
+              </a:defRPr>
+            </a:lvl3pPr>
+            <a:lvl4pPr marR="0" lvl="3" algn="l" rtl="0">
+              <a:lnSpc>
+                <a:spcPct val="100000"/>
+              </a:lnSpc>
+              <a:spcBef>
+                <a:spcPts val="0"/>
+              </a:spcBef>
+              <a:spcAft>
+                <a:spcPts val="0"/>
+              </a:spcAft>
+              <a:buClr>
+                <a:srgbClr val="FFFFFF"/>
+              </a:buClr>
+              <a:buSzPts val="1800"/>
+              <a:buFont typeface="Roboto Slab"/>
+              <a:buNone/>
+              <a:defRPr sz="1800" b="1" i="0" u="none" strike="noStrike" cap="none">
+                <a:solidFill>
+                  <a:srgbClr val="FFFFFF"/>
+                </a:solidFill>
+                <a:latin typeface="Roboto Slab"/>
+                <a:ea typeface="Roboto Slab"/>
+                <a:cs typeface="Roboto Slab"/>
+                <a:sym typeface="Roboto Slab"/>
+              </a:defRPr>
+            </a:lvl4pPr>
+            <a:lvl5pPr marR="0" lvl="4" algn="l" rtl="0">
+              <a:lnSpc>
+                <a:spcPct val="100000"/>
+              </a:lnSpc>
+              <a:spcBef>
+                <a:spcPts val="0"/>
+              </a:spcBef>
+              <a:spcAft>
+                <a:spcPts val="0"/>
+              </a:spcAft>
+              <a:buClr>
+                <a:srgbClr val="FFFFFF"/>
+              </a:buClr>
+              <a:buSzPts val="1800"/>
+              <a:buFont typeface="Roboto Slab"/>
+              <a:buNone/>
+              <a:defRPr sz="1800" b="1" i="0" u="none" strike="noStrike" cap="none">
+                <a:solidFill>
+                  <a:srgbClr val="FFFFFF"/>
+                </a:solidFill>
+                <a:latin typeface="Roboto Slab"/>
+                <a:ea typeface="Roboto Slab"/>
+                <a:cs typeface="Roboto Slab"/>
+                <a:sym typeface="Roboto Slab"/>
+              </a:defRPr>
+            </a:lvl5pPr>
+            <a:lvl6pPr marR="0" lvl="5" algn="l" rtl="0">
+              <a:lnSpc>
+                <a:spcPct val="100000"/>
+              </a:lnSpc>
+              <a:spcBef>
+                <a:spcPts val="0"/>
+              </a:spcBef>
+              <a:spcAft>
+                <a:spcPts val="0"/>
+              </a:spcAft>
+              <a:buClr>
+                <a:srgbClr val="FFFFFF"/>
+              </a:buClr>
+              <a:buSzPts val="1800"/>
+              <a:buFont typeface="Roboto Slab"/>
+              <a:buNone/>
+              <a:defRPr sz="1800" b="1" i="0" u="none" strike="noStrike" cap="none">
+                <a:solidFill>
+                  <a:srgbClr val="FFFFFF"/>
+                </a:solidFill>
+                <a:latin typeface="Roboto Slab"/>
+                <a:ea typeface="Roboto Slab"/>
+                <a:cs typeface="Roboto Slab"/>
+                <a:sym typeface="Roboto Slab"/>
+              </a:defRPr>
+            </a:lvl6pPr>
+            <a:lvl7pPr marR="0" lvl="6" algn="l" rtl="0">
+              <a:lnSpc>
+                <a:spcPct val="100000"/>
+              </a:lnSpc>
+              <a:spcBef>
+                <a:spcPts val="0"/>
+              </a:spcBef>
+              <a:spcAft>
+                <a:spcPts val="0"/>
+              </a:spcAft>
+              <a:buClr>
+                <a:srgbClr val="FFFFFF"/>
+              </a:buClr>
+              <a:buSzPts val="1800"/>
+              <a:buFont typeface="Roboto Slab"/>
+              <a:buNone/>
+              <a:defRPr sz="1800" b="1" i="0" u="none" strike="noStrike" cap="none">
+                <a:solidFill>
+                  <a:srgbClr val="FFFFFF"/>
+                </a:solidFill>
+                <a:latin typeface="Roboto Slab"/>
+                <a:ea typeface="Roboto Slab"/>
+                <a:cs typeface="Roboto Slab"/>
+                <a:sym typeface="Roboto Slab"/>
+              </a:defRPr>
+            </a:lvl7pPr>
+            <a:lvl8pPr marR="0" lvl="7" algn="l" rtl="0">
+              <a:lnSpc>
+                <a:spcPct val="100000"/>
+              </a:lnSpc>
+              <a:spcBef>
+                <a:spcPts val="0"/>
+              </a:spcBef>
+              <a:spcAft>
+                <a:spcPts val="0"/>
+              </a:spcAft>
+              <a:buClr>
+                <a:srgbClr val="FFFFFF"/>
+              </a:buClr>
+              <a:buSzPts val="1800"/>
+              <a:buFont typeface="Roboto Slab"/>
+              <a:buNone/>
+              <a:defRPr sz="1800" b="1" i="0" u="none" strike="noStrike" cap="none">
+                <a:solidFill>
+                  <a:srgbClr val="FFFFFF"/>
+                </a:solidFill>
+                <a:latin typeface="Roboto Slab"/>
+                <a:ea typeface="Roboto Slab"/>
+                <a:cs typeface="Roboto Slab"/>
+                <a:sym typeface="Roboto Slab"/>
+              </a:defRPr>
+            </a:lvl8pPr>
+            <a:lvl9pPr marR="0" lvl="8" algn="l" rtl="0">
+              <a:lnSpc>
+                <a:spcPct val="100000"/>
+              </a:lnSpc>
+              <a:spcBef>
+                <a:spcPts val="0"/>
+              </a:spcBef>
+              <a:spcAft>
+                <a:spcPts val="0"/>
+              </a:spcAft>
+              <a:buClr>
+                <a:srgbClr val="FFFFFF"/>
+              </a:buClr>
+              <a:buSzPts val="1800"/>
+              <a:buFont typeface="Roboto Slab"/>
+              <a:buNone/>
+              <a:defRPr sz="1800" b="1" i="0" u="none" strike="noStrike" cap="none">
+                <a:solidFill>
+                  <a:srgbClr val="FFFFFF"/>
+                </a:solidFill>
+                <a:latin typeface="Roboto Slab"/>
+                <a:ea typeface="Roboto Slab"/>
+                <a:cs typeface="Roboto Slab"/>
+                <a:sym typeface="Roboto Slab"/>
+              </a:defRPr>
+            </a:lvl9pPr>
+          </a:lstStyle>
+          <a:p>
+            <a:pPr algn="ctr"/>
+            <a:r>
+              <a:rPr lang="en-US" altLang="zh-TW" sz="6000" dirty="0" smtClean="0">
+                <a:solidFill>
+                  <a:schemeClr val="tx1"/>
+                </a:solidFill>
+              </a:rPr>
+              <a:t>DEMO</a:t>
+            </a:r>
+            <a:endParaRPr lang="en-US" sz="3200" dirty="0">
+              <a:solidFill>
+                <a:schemeClr val="tx1"/>
+              </a:solidFill>
+            </a:endParaRPr>
           </a:p>
         </p:txBody>
       </p:sp>

</xml_diff>

<commit_message>
add fakeDB and modify ppt
</commit_message>
<xml_diff>
--- a/OOAD_Midterm.pptx
+++ b/OOAD_Midterm.pptx
@@ -298,6 +298,9 @@
     <p:ext uri="{EFAFB233-063F-42B5-8137-9DF3F51BA10A}">
       <p15:sldGuideLst xmlns:p15="http://schemas.microsoft.com/office/powerpoint/2012/main"/>
     </p:ext>
+    <p:ext uri="{2D200454-40CA-4A62-9FC3-DE9A4176ACB9}">
+      <p15:notesGuideLst xmlns:p15="http://schemas.microsoft.com/office/powerpoint/2012/main"/>
+    </p:ext>
   </p:extLst>
 </p:presentation>
 </file>
@@ -384,7 +387,7 @@
           <a:p>
             <a:fld id="{D0CD3812-1CB0-40EA-8A99-ADA007E8EE2D}" type="datetimeFigureOut">
               <a:rPr lang="zh-TW" altLang="en-US" smtClean="0"/>
-              <a:t>2018/5/11</a:t>
+              <a:t>2018/5/14</a:t>
             </a:fld>
             <a:endParaRPr lang="zh-TW" altLang="en-US"/>
           </a:p>
@@ -9880,8 +9883,8 @@
         </p:blipFill>
         <p:spPr>
           <a:xfrm>
-            <a:off x="3855720" y="746571"/>
-            <a:ext cx="5219700" cy="4328349"/>
+            <a:off x="4552122" y="1335762"/>
+            <a:ext cx="4591878" cy="3807738"/>
           </a:xfrm>
           <a:prstGeom prst="rect">
             <a:avLst/>
@@ -9970,10 +9973,6 @@
             <a:r>
               <a:rPr lang="en-US" dirty="0" smtClean="0"/>
               <a:t>ealizations </a:t>
-            </a:r>
-            <a:r>
-              <a:rPr lang="en-US" dirty="0" smtClean="0"/>
-              <a:t/>
             </a:r>
             <a:br>
               <a:rPr lang="en-US" dirty="0" smtClean="0"/>
@@ -10555,8 +10554,8 @@
         </p:blipFill>
         <p:spPr>
           <a:xfrm>
-            <a:off x="1562100" y="1404213"/>
-            <a:ext cx="5235001" cy="3739287"/>
+            <a:off x="1411356" y="1559425"/>
+            <a:ext cx="5021310" cy="3586651"/>
           </a:xfrm>
           <a:prstGeom prst="rect">
             <a:avLst/>
@@ -10573,8 +10572,8 @@
         </p:nvSpPr>
         <p:spPr>
           <a:xfrm>
-            <a:off x="4939128" y="530725"/>
-            <a:ext cx="4472897" cy="1028700"/>
+            <a:off x="4551833" y="504859"/>
+            <a:ext cx="4592167" cy="1054566"/>
           </a:xfrm>
           <a:prstGeom prst="rect">
             <a:avLst/>
@@ -10935,10 +10934,6 @@
               <a:rPr lang="en-US" dirty="0" smtClean="0"/>
               <a:t>ealizations </a:t>
             </a:r>
-            <a:r>
-              <a:rPr lang="en-US" dirty="0" smtClean="0"/>
-              <a:t/>
-            </a:r>
             <a:br>
               <a:rPr lang="en-US" dirty="0" smtClean="0"/>
             </a:br>
@@ -11519,8 +11514,8 @@
         </p:blipFill>
         <p:spPr>
           <a:xfrm>
-            <a:off x="1106268" y="1228289"/>
-            <a:ext cx="6331162" cy="3915211"/>
+            <a:off x="1106268" y="1548079"/>
+            <a:ext cx="5814039" cy="3595421"/>
           </a:xfrm>
           <a:prstGeom prst="rect">
             <a:avLst/>
@@ -11537,8 +11532,8 @@
         </p:nvSpPr>
         <p:spPr>
           <a:xfrm>
-            <a:off x="4939128" y="530725"/>
-            <a:ext cx="4472897" cy="1028700"/>
+            <a:off x="4578338" y="519379"/>
+            <a:ext cx="4565662" cy="1028700"/>
           </a:xfrm>
           <a:prstGeom prst="rect">
             <a:avLst/>
@@ -11899,10 +11894,6 @@
               <a:rPr lang="en-US" dirty="0" smtClean="0"/>
               <a:t>ealizations </a:t>
             </a:r>
-            <a:r>
-              <a:rPr lang="en-US" dirty="0" smtClean="0"/>
-              <a:t/>
-            </a:r>
             <a:br>
               <a:rPr lang="en-US" dirty="0" smtClean="0"/>
             </a:br>
@@ -12483,8 +12474,8 @@
         </p:blipFill>
         <p:spPr>
           <a:xfrm>
-            <a:off x="1363980" y="1365188"/>
-            <a:ext cx="6322891" cy="3778312"/>
+            <a:off x="1072340" y="1496445"/>
+            <a:ext cx="6103236" cy="3647055"/>
           </a:xfrm>
           <a:prstGeom prst="rect">
             <a:avLst/>
@@ -12501,8 +12492,8 @@
         </p:nvSpPr>
         <p:spPr>
           <a:xfrm>
-            <a:off x="4939128" y="530725"/>
-            <a:ext cx="4472897" cy="1028700"/>
+            <a:off x="4581319" y="523039"/>
+            <a:ext cx="4562681" cy="1036385"/>
           </a:xfrm>
           <a:prstGeom prst="rect">
             <a:avLst/>
@@ -12819,54 +12810,6 @@
       </p:grpSpPr>
       <p:sp>
         <p:nvSpPr>
-          <p:cNvPr id="2" name="矩形 1"/>
-          <p:cNvSpPr/>
-          <p:nvPr/>
-        </p:nvSpPr>
-        <p:spPr>
-          <a:xfrm>
-            <a:off x="251878" y="0"/>
-            <a:ext cx="4595349" cy="1562646"/>
-          </a:xfrm>
-          <a:prstGeom prst="rect">
-            <a:avLst/>
-          </a:prstGeom>
-          <a:solidFill>
-            <a:schemeClr val="bg1"/>
-          </a:solidFill>
-          <a:ln>
-            <a:solidFill>
-              <a:schemeClr val="bg1"/>
-            </a:solidFill>
-          </a:ln>
-        </p:spPr>
-        <p:style>
-          <a:lnRef idx="2">
-            <a:schemeClr val="accent1">
-              <a:shade val="50000"/>
-            </a:schemeClr>
-          </a:lnRef>
-          <a:fillRef idx="1">
-            <a:schemeClr val="accent1"/>
-          </a:fillRef>
-          <a:effectRef idx="0">
-            <a:schemeClr val="accent1"/>
-          </a:effectRef>
-          <a:fontRef idx="minor">
-            <a:schemeClr val="lt1"/>
-          </a:fontRef>
-        </p:style>
-        <p:txBody>
-          <a:bodyPr rtlCol="0" anchor="ctr"/>
-          <a:lstStyle/>
-          <a:p>
-            <a:pPr algn="ctr"/>
-            <a:endParaRPr lang="zh-TW" altLang="en-US"/>
-          </a:p>
-        </p:txBody>
-      </p:sp>
-      <p:sp>
-        <p:nvSpPr>
           <p:cNvPr id="111" name="Shape 111"/>
           <p:cNvSpPr txBox="1">
             <a:spLocks noGrp="1"/>
@@ -12910,10 +12853,6 @@
             <a:r>
               <a:rPr lang="en-US" dirty="0" smtClean="0"/>
               <a:t>ealizations </a:t>
-            </a:r>
-            <a:r>
-              <a:rPr lang="en-US" dirty="0" smtClean="0"/>
-              <a:t/>
             </a:r>
             <a:br>
               <a:rPr lang="en-US" dirty="0" smtClean="0"/>
@@ -13483,8 +13422,8 @@
         </p:nvSpPr>
         <p:spPr>
           <a:xfrm>
-            <a:off x="7678053" y="0"/>
-            <a:ext cx="1641207" cy="1028700"/>
+            <a:off x="4578626" y="530726"/>
+            <a:ext cx="4565374" cy="1028700"/>
           </a:xfrm>
           <a:prstGeom prst="rect">
             <a:avLst/>
@@ -13752,17 +13691,7 @@
                   <a:schemeClr val="tx1"/>
                 </a:solidFill>
               </a:rPr>
-              <a:t>   SD-Delete </a:t>
-            </a:r>
-          </a:p>
-          <a:p>
-            <a:r>
-              <a:rPr lang="en-US" altLang="zh-TW" dirty="0">
-                <a:solidFill>
-                  <a:schemeClr val="tx1"/>
-                </a:solidFill>
-              </a:rPr>
-              <a:t> </a:t>
+              <a:t>   </a:t>
             </a:r>
             <a:r>
               <a:rPr lang="en-US" altLang="zh-TW" dirty="0" smtClean="0">
@@ -13770,7 +13699,15 @@
                   <a:schemeClr val="tx1"/>
                 </a:solidFill>
               </a:rPr>
-              <a:t>            Event</a:t>
+              <a:t>SD-Delete </a:t>
+            </a:r>
+            <a:r>
+              <a:rPr lang="en-US" altLang="zh-TW" dirty="0" smtClean="0">
+                <a:solidFill>
+                  <a:schemeClr val="tx1"/>
+                </a:solidFill>
+              </a:rPr>
+              <a:t>Event</a:t>
             </a:r>
             <a:endParaRPr lang="en-US" altLang="zh-TW" dirty="0">
               <a:solidFill>
@@ -13802,8 +13739,8 @@
         </p:blipFill>
         <p:spPr>
           <a:xfrm>
-            <a:off x="-144362" y="0"/>
-            <a:ext cx="9067382" cy="5067300"/>
+            <a:off x="1170011" y="1423890"/>
+            <a:ext cx="6655837" cy="3719610"/>
           </a:xfrm>
           <a:prstGeom prst="rect">
             <a:avLst/>
@@ -13849,54 +13786,6 @@
       </p:grpSpPr>
       <p:sp>
         <p:nvSpPr>
-          <p:cNvPr id="2" name="矩形 1"/>
-          <p:cNvSpPr/>
-          <p:nvPr/>
-        </p:nvSpPr>
-        <p:spPr>
-          <a:xfrm>
-            <a:off x="251878" y="0"/>
-            <a:ext cx="4595349" cy="1562646"/>
-          </a:xfrm>
-          <a:prstGeom prst="rect">
-            <a:avLst/>
-          </a:prstGeom>
-          <a:solidFill>
-            <a:schemeClr val="bg1"/>
-          </a:solidFill>
-          <a:ln>
-            <a:solidFill>
-              <a:schemeClr val="bg1"/>
-            </a:solidFill>
-          </a:ln>
-        </p:spPr>
-        <p:style>
-          <a:lnRef idx="2">
-            <a:schemeClr val="accent1">
-              <a:shade val="50000"/>
-            </a:schemeClr>
-          </a:lnRef>
-          <a:fillRef idx="1">
-            <a:schemeClr val="accent1"/>
-          </a:fillRef>
-          <a:effectRef idx="0">
-            <a:schemeClr val="accent1"/>
-          </a:effectRef>
-          <a:fontRef idx="minor">
-            <a:schemeClr val="lt1"/>
-          </a:fontRef>
-        </p:style>
-        <p:txBody>
-          <a:bodyPr rtlCol="0" anchor="ctr"/>
-          <a:lstStyle/>
-          <a:p>
-            <a:pPr algn="ctr"/>
-            <a:endParaRPr lang="zh-TW" altLang="en-US"/>
-          </a:p>
-        </p:txBody>
-      </p:sp>
-      <p:sp>
-        <p:nvSpPr>
           <p:cNvPr id="111" name="Shape 111"/>
           <p:cNvSpPr txBox="1">
             <a:spLocks noGrp="1"/>
@@ -13940,10 +13829,6 @@
             <a:r>
               <a:rPr lang="en-US" dirty="0" smtClean="0"/>
               <a:t>ealizations </a:t>
-            </a:r>
-            <a:r>
-              <a:rPr lang="en-US" dirty="0" smtClean="0"/>
-              <a:t/>
             </a:r>
             <a:br>
               <a:rPr lang="en-US" dirty="0" smtClean="0"/>
@@ -14525,8 +14410,8 @@
         </p:blipFill>
         <p:spPr>
           <a:xfrm>
-            <a:off x="0" y="0"/>
-            <a:ext cx="9143999" cy="5314187"/>
+            <a:off x="854766" y="1567110"/>
+            <a:ext cx="7849011" cy="3576390"/>
           </a:xfrm>
           <a:prstGeom prst="rect">
             <a:avLst/>
@@ -14543,8 +14428,8 @@
         </p:nvSpPr>
         <p:spPr>
           <a:xfrm>
-            <a:off x="7110645" y="-24400"/>
-            <a:ext cx="4472897" cy="1028700"/>
+            <a:off x="4571712" y="523040"/>
+            <a:ext cx="4572288" cy="1044070"/>
           </a:xfrm>
           <a:prstGeom prst="rect">
             <a:avLst/>
@@ -14913,10 +14798,6 @@
               <a:rPr lang="en-US" dirty="0" smtClean="0"/>
               <a:t>ealizations </a:t>
             </a:r>
-            <a:r>
-              <a:rPr lang="en-US" dirty="0" smtClean="0"/>
-              <a:t/>
-            </a:r>
             <a:br>
               <a:rPr lang="en-US" dirty="0" smtClean="0"/>
             </a:br>
@@ -15497,8 +15378,8 @@
         </p:blipFill>
         <p:spPr>
           <a:xfrm>
-            <a:off x="723900" y="1304833"/>
-            <a:ext cx="8420100" cy="3838667"/>
+            <a:off x="759725" y="1559425"/>
+            <a:ext cx="7973989" cy="3635288"/>
           </a:xfrm>
           <a:prstGeom prst="rect">
             <a:avLst/>
@@ -15515,8 +15396,8 @@
         </p:nvSpPr>
         <p:spPr>
           <a:xfrm>
-            <a:off x="4939128" y="530725"/>
-            <a:ext cx="4472897" cy="1028700"/>
+            <a:off x="4561442" y="530725"/>
+            <a:ext cx="4582557" cy="1028700"/>
           </a:xfrm>
           <a:prstGeom prst="rect">
             <a:avLst/>
@@ -15893,10 +15774,6 @@
               <a:rPr lang="en-US" dirty="0" smtClean="0"/>
               <a:t>ealizations </a:t>
             </a:r>
-            <a:r>
-              <a:rPr lang="en-US" dirty="0" smtClean="0"/>
-              <a:t/>
-            </a:r>
             <a:br>
               <a:rPr lang="en-US" dirty="0" smtClean="0"/>
             </a:br>
@@ -16477,8 +16354,8 @@
         </p:blipFill>
         <p:spPr>
           <a:xfrm>
-            <a:off x="213360" y="1386840"/>
-            <a:ext cx="8943765" cy="3756660"/>
+            <a:off x="660157" y="1559425"/>
+            <a:ext cx="8361995" cy="3512298"/>
           </a:xfrm>
           <a:prstGeom prst="rect">
             <a:avLst/>
@@ -16495,8 +16372,8 @@
         </p:nvSpPr>
         <p:spPr>
           <a:xfrm>
-            <a:off x="4939128" y="530725"/>
-            <a:ext cx="4472897" cy="1028700"/>
+            <a:off x="4549255" y="473933"/>
+            <a:ext cx="4594745" cy="1085491"/>
           </a:xfrm>
           <a:prstGeom prst="rect">
             <a:avLst/>
@@ -16865,10 +16742,6 @@
               <a:rPr lang="en-US" dirty="0" smtClean="0"/>
               <a:t>ealizations </a:t>
             </a:r>
-            <a:r>
-              <a:rPr lang="en-US" dirty="0" smtClean="0"/>
-              <a:t/>
-            </a:r>
             <a:br>
               <a:rPr lang="en-US" dirty="0" smtClean="0"/>
             </a:br>
@@ -17449,8 +17322,8 @@
         </p:blipFill>
         <p:spPr>
           <a:xfrm>
-            <a:off x="361537" y="1200394"/>
-            <a:ext cx="8810378" cy="4105458"/>
+            <a:off x="723900" y="1463290"/>
+            <a:ext cx="8217758" cy="3829309"/>
           </a:xfrm>
           <a:prstGeom prst="rect">
             <a:avLst/>
@@ -17467,8 +17340,8 @@
         </p:nvSpPr>
         <p:spPr>
           <a:xfrm>
-            <a:off x="4939128" y="530725"/>
-            <a:ext cx="4472897" cy="1028700"/>
+            <a:off x="4568067" y="523039"/>
+            <a:ext cx="4575933" cy="1036385"/>
           </a:xfrm>
           <a:prstGeom prst="rect">
             <a:avLst/>
@@ -18649,10 +18522,6 @@
               <a:rPr lang="en-US" dirty="0" smtClean="0"/>
               <a:t>ealizations </a:t>
             </a:r>
-            <a:r>
-              <a:rPr lang="en-US" dirty="0" smtClean="0"/>
-              <a:t/>
-            </a:r>
             <a:br>
               <a:rPr lang="en-US" dirty="0" smtClean="0"/>
             </a:br>
@@ -19233,8 +19102,8 @@
         </p:blipFill>
         <p:spPr>
           <a:xfrm>
-            <a:off x="333623" y="1262560"/>
-            <a:ext cx="8785859" cy="4012571"/>
+            <a:off x="393771" y="1451925"/>
+            <a:ext cx="8317725" cy="3798771"/>
           </a:xfrm>
           <a:prstGeom prst="rect">
             <a:avLst/>
@@ -19251,8 +19120,8 @@
         </p:nvSpPr>
         <p:spPr>
           <a:xfrm>
-            <a:off x="4939128" y="530725"/>
-            <a:ext cx="4472897" cy="1028700"/>
+            <a:off x="4578626" y="530724"/>
+            <a:ext cx="4578981" cy="980023"/>
           </a:xfrm>
           <a:prstGeom prst="rect">
             <a:avLst/>
@@ -24852,14 +24721,14 @@
           <p:nvPr>
             <p:extLst>
               <p:ext uri="{D42A27DB-BD31-4B8C-83A1-F6EECF244321}">
-                <p14:modId xmlns:p14="http://schemas.microsoft.com/office/powerpoint/2010/main" val="3218082088"/>
+                <p14:modId xmlns:p14="http://schemas.microsoft.com/office/powerpoint/2010/main" val="1530411397"/>
               </p:ext>
             </p:extLst>
           </p:nvPr>
         </p:nvGraphicFramePr>
         <p:xfrm>
-          <a:off x="1638964" y="1181015"/>
-          <a:ext cx="6506816" cy="3926230"/>
+          <a:off x="1272210" y="1559425"/>
+          <a:ext cx="6873570" cy="3547820"/>
         </p:xfrm>
         <a:graphic>
           <a:graphicData uri="http://schemas.openxmlformats.org/drawingml/2006/table">
@@ -24868,14 +24737,14 @@
                 <a:tableStyleId>{69C7853C-536D-4A76-A0AE-DD22124D55A5}</a:tableStyleId>
               </a:tblPr>
               <a:tblGrid>
-                <a:gridCol w="4229429">
+                <a:gridCol w="4467819">
                   <a:extLst>
                     <a:ext uri="{9D8B030D-6E8A-4147-A177-3AD203B41FA5}">
                       <a16:colId xmlns:a16="http://schemas.microsoft.com/office/drawing/2014/main" val="395655269"/>
                     </a:ext>
                   </a:extLst>
                 </a:gridCol>
-                <a:gridCol w="2277387">
+                <a:gridCol w="2405751">
                   <a:extLst>
                     <a:ext uri="{9D8B030D-6E8A-4147-A177-3AD203B41FA5}">
                       <a16:colId xmlns:a16="http://schemas.microsoft.com/office/drawing/2014/main" val="2951768356"/>
@@ -24883,7 +24752,7 @@
                   </a:extLst>
                 </a:gridCol>
               </a:tblGrid>
-              <a:tr h="392623">
+              <a:tr h="354782">
                 <a:tc gridSpan="2">
                   <a:txBody>
                     <a:bodyPr/>
@@ -24891,10 +24760,7 @@
                     <a:p>
                       <a:pPr algn="ctr"/>
                       <a:r>
-                        <a:rPr lang="en-US" altLang="zh-TW" dirty="0" smtClean="0">
-                          <a:latin typeface="Times New Roman" panose="02020603050405020304" pitchFamily="18" charset="0"/>
-                          <a:ea typeface="標楷體" panose="03000509000000000000" pitchFamily="65" charset="-120"/>
-                        </a:rPr>
+                        <a:rPr lang="en-US" altLang="zh-TW" dirty="0" smtClean="0"/>
                         <a:t>Project Information</a:t>
                       </a:r>
                       <a:endParaRPr lang="zh-TW" altLang="en-US" dirty="0">
@@ -24921,7 +24787,7 @@
                   </a:ext>
                 </a:extLst>
               </a:tr>
-              <a:tr h="392623">
+              <a:tr h="354782">
                 <a:tc>
                   <a:txBody>
                     <a:bodyPr/>
@@ -24929,10 +24795,7 @@
                     <a:p>
                       <a:pPr algn="ctr"/>
                       <a:r>
-                        <a:rPr lang="en-US" altLang="zh-TW" dirty="0" smtClean="0">
-                          <a:latin typeface="Times New Roman" panose="02020603050405020304" pitchFamily="18" charset="0"/>
-                          <a:ea typeface="標楷體" panose="03000509000000000000" pitchFamily="65" charset="-120"/>
-                        </a:rPr>
+                        <a:rPr lang="en-US" altLang="zh-TW" dirty="0" smtClean="0"/>
                         <a:t>LOC of production code</a:t>
                       </a:r>
                       <a:endParaRPr lang="zh-TW" altLang="en-US" dirty="0">
@@ -24950,10 +24813,7 @@
                     <a:p>
                       <a:pPr algn="ctr"/>
                       <a:r>
-                        <a:rPr lang="en-US" altLang="zh-TW" dirty="0" smtClean="0">
-                          <a:latin typeface="Times New Roman" panose="02020603050405020304" pitchFamily="18" charset="0"/>
-                          <a:ea typeface="標楷體" panose="03000509000000000000" pitchFamily="65" charset="-120"/>
-                        </a:rPr>
+                        <a:rPr lang="en-US" altLang="zh-TW" dirty="0" smtClean="0"/>
                         <a:t>931</a:t>
                       </a:r>
                       <a:endParaRPr lang="zh-TW" altLang="en-US" dirty="0">
@@ -24970,7 +24830,7 @@
                   </a:ext>
                 </a:extLst>
               </a:tr>
-              <a:tr h="392623">
+              <a:tr h="354782">
                 <a:tc>
                   <a:txBody>
                     <a:bodyPr/>
@@ -24978,17 +24838,11 @@
                     <a:p>
                       <a:pPr algn="ctr"/>
                       <a:r>
-                        <a:rPr lang="en-US" altLang="zh-TW" dirty="0" smtClean="0">
-                          <a:latin typeface="Times New Roman" panose="02020603050405020304" pitchFamily="18" charset="0"/>
-                          <a:ea typeface="標楷體" panose="03000509000000000000" pitchFamily="65" charset="-120"/>
-                        </a:rPr>
+                        <a:rPr lang="en-US" altLang="zh-TW" dirty="0" smtClean="0"/>
                         <a:t>The number classes</a:t>
                       </a:r>
                       <a:r>
-                        <a:rPr lang="en-US" altLang="zh-TW" baseline="0" dirty="0" smtClean="0">
-                          <a:latin typeface="Times New Roman" panose="02020603050405020304" pitchFamily="18" charset="0"/>
-                          <a:ea typeface="標楷體" panose="03000509000000000000" pitchFamily="65" charset="-120"/>
-                        </a:rPr>
+                        <a:rPr lang="en-US" altLang="zh-TW" baseline="0" dirty="0" smtClean="0"/>
                         <a:t> of production code</a:t>
                       </a:r>
                       <a:endParaRPr lang="zh-TW" altLang="en-US" dirty="0">
@@ -25006,10 +24860,7 @@
                     <a:p>
                       <a:pPr algn="ctr"/>
                       <a:r>
-                        <a:rPr lang="en-US" altLang="zh-TW" dirty="0" smtClean="0">
-                          <a:latin typeface="Times New Roman" panose="02020603050405020304" pitchFamily="18" charset="0"/>
-                          <a:ea typeface="標楷體" panose="03000509000000000000" pitchFamily="65" charset="-120"/>
-                        </a:rPr>
+                        <a:rPr lang="en-US" altLang="zh-TW" dirty="0" smtClean="0"/>
                         <a:t>13</a:t>
                       </a:r>
                       <a:endParaRPr lang="zh-TW" altLang="en-US" dirty="0">
@@ -25026,7 +24877,7 @@
                   </a:ext>
                 </a:extLst>
               </a:tr>
-              <a:tr h="392623">
+              <a:tr h="354782">
                 <a:tc>
                   <a:txBody>
                     <a:bodyPr/>
@@ -25034,17 +24885,11 @@
                     <a:p>
                       <a:pPr algn="ctr"/>
                       <a:r>
-                        <a:rPr lang="en-US" altLang="zh-TW" dirty="0" smtClean="0">
-                          <a:latin typeface="Times New Roman" panose="02020603050405020304" pitchFamily="18" charset="0"/>
-                          <a:ea typeface="標楷體" panose="03000509000000000000" pitchFamily="65" charset="-120"/>
-                        </a:rPr>
+                        <a:rPr lang="en-US" altLang="zh-TW" dirty="0" smtClean="0"/>
                         <a:t>The number of methods of production</a:t>
                       </a:r>
                       <a:r>
-                        <a:rPr lang="en-US" altLang="zh-TW" baseline="0" dirty="0" smtClean="0">
-                          <a:latin typeface="Times New Roman" panose="02020603050405020304" pitchFamily="18" charset="0"/>
-                          <a:ea typeface="標楷體" panose="03000509000000000000" pitchFamily="65" charset="-120"/>
-                        </a:rPr>
+                        <a:rPr lang="en-US" altLang="zh-TW" baseline="0" dirty="0" smtClean="0"/>
                         <a:t> code</a:t>
                       </a:r>
                       <a:endParaRPr lang="zh-TW" altLang="en-US" dirty="0">
@@ -25062,10 +24907,7 @@
                     <a:p>
                       <a:pPr algn="ctr"/>
                       <a:r>
-                        <a:rPr lang="en-US" altLang="zh-TW" dirty="0" smtClean="0">
-                          <a:latin typeface="Times New Roman" panose="02020603050405020304" pitchFamily="18" charset="0"/>
-                          <a:ea typeface="標楷體" panose="03000509000000000000" pitchFamily="65" charset="-120"/>
-                        </a:rPr>
+                        <a:rPr lang="en-US" altLang="zh-TW" dirty="0" smtClean="0"/>
                         <a:t>15</a:t>
                       </a:r>
                       <a:endParaRPr lang="zh-TW" altLang="en-US" dirty="0">
@@ -25082,7 +24924,7 @@
                   </a:ext>
                 </a:extLst>
               </a:tr>
-              <a:tr h="392623">
+              <a:tr h="354782">
                 <a:tc>
                   <a:txBody>
                     <a:bodyPr/>
@@ -25090,17 +24932,11 @@
                     <a:p>
                       <a:pPr algn="ctr"/>
                       <a:r>
-                        <a:rPr lang="en-US" altLang="zh-TW" dirty="0" smtClean="0">
-                          <a:latin typeface="Times New Roman" panose="02020603050405020304" pitchFamily="18" charset="0"/>
-                          <a:ea typeface="標楷體" panose="03000509000000000000" pitchFamily="65" charset="-120"/>
-                        </a:rPr>
+                        <a:rPr lang="en-US" altLang="zh-TW" dirty="0" smtClean="0"/>
                         <a:t>The number</a:t>
                       </a:r>
                       <a:r>
-                        <a:rPr lang="en-US" altLang="zh-TW" baseline="0" dirty="0" smtClean="0">
-                          <a:latin typeface="Times New Roman" panose="02020603050405020304" pitchFamily="18" charset="0"/>
-                          <a:ea typeface="標楷體" panose="03000509000000000000" pitchFamily="65" charset="-120"/>
-                        </a:rPr>
+                        <a:rPr lang="en-US" altLang="zh-TW" baseline="0" dirty="0" smtClean="0"/>
                         <a:t> of unit tests</a:t>
                       </a:r>
                       <a:endParaRPr lang="zh-TW" altLang="en-US" dirty="0">
@@ -25118,10 +24954,7 @@
                     <a:p>
                       <a:pPr algn="ctr"/>
                       <a:r>
-                        <a:rPr lang="en-US" altLang="zh-TW" dirty="0" smtClean="0">
-                          <a:latin typeface="Times New Roman" panose="02020603050405020304" pitchFamily="18" charset="0"/>
-                          <a:ea typeface="標楷體" panose="03000509000000000000" pitchFamily="65" charset="-120"/>
-                        </a:rPr>
+                        <a:rPr lang="en-US" altLang="zh-TW" dirty="0" smtClean="0"/>
                         <a:t>6</a:t>
                       </a:r>
                       <a:endParaRPr lang="zh-TW" altLang="en-US" dirty="0">
@@ -25138,7 +24971,7 @@
                   </a:ext>
                 </a:extLst>
               </a:tr>
-              <a:tr h="392623">
+              <a:tr h="354782">
                 <a:tc>
                   <a:txBody>
                     <a:bodyPr/>
@@ -25146,10 +24979,7 @@
                     <a:p>
                       <a:pPr algn="ctr"/>
                       <a:r>
-                        <a:rPr lang="en-US" altLang="zh-TW" dirty="0" smtClean="0">
-                          <a:latin typeface="Times New Roman" panose="02020603050405020304" pitchFamily="18" charset="0"/>
-                          <a:ea typeface="標楷體" panose="03000509000000000000" pitchFamily="65" charset="-120"/>
-                        </a:rPr>
+                        <a:rPr lang="en-US" altLang="zh-TW" dirty="0" smtClean="0"/>
                         <a:t>LOC of test code</a:t>
                       </a:r>
                       <a:endParaRPr lang="zh-TW" altLang="en-US" dirty="0">
@@ -25167,10 +24997,7 @@
                     <a:p>
                       <a:pPr algn="ctr"/>
                       <a:r>
-                        <a:rPr lang="en-US" altLang="zh-TW" dirty="0" smtClean="0">
-                          <a:latin typeface="Times New Roman" panose="02020603050405020304" pitchFamily="18" charset="0"/>
-                          <a:ea typeface="標楷體" panose="03000509000000000000" pitchFamily="65" charset="-120"/>
-                        </a:rPr>
+                        <a:rPr lang="en-US" altLang="zh-TW" dirty="0" smtClean="0"/>
                         <a:t>93</a:t>
                       </a:r>
                       <a:endParaRPr lang="zh-TW" altLang="en-US" dirty="0">
@@ -25187,7 +25014,7 @@
                   </a:ext>
                 </a:extLst>
               </a:tr>
-              <a:tr h="392623">
+              <a:tr h="354782">
                 <a:tc>
                   <a:txBody>
                     <a:bodyPr/>
@@ -25195,17 +25022,11 @@
                     <a:p>
                       <a:pPr algn="ctr"/>
                       <a:r>
-                        <a:rPr lang="en-US" altLang="zh-TW" dirty="0" smtClean="0">
-                          <a:latin typeface="Times New Roman" panose="02020603050405020304" pitchFamily="18" charset="0"/>
-                          <a:ea typeface="標楷體" panose="03000509000000000000" pitchFamily="65" charset="-120"/>
-                        </a:rPr>
+                        <a:rPr lang="en-US" altLang="zh-TW" dirty="0" smtClean="0"/>
                         <a:t>Team member</a:t>
                       </a:r>
                       <a:r>
-                        <a:rPr lang="en-US" altLang="zh-TW" baseline="0" dirty="0" smtClean="0">
-                          <a:latin typeface="Times New Roman" panose="02020603050405020304" pitchFamily="18" charset="0"/>
-                          <a:ea typeface="標楷體" panose="03000509000000000000" pitchFamily="65" charset="-120"/>
-                        </a:rPr>
+                        <a:rPr lang="en-US" altLang="zh-TW" baseline="0" dirty="0" smtClean="0"/>
                         <a:t> Hank time efforts</a:t>
                       </a:r>
                       <a:endParaRPr lang="zh-TW" altLang="en-US" dirty="0">
@@ -25223,10 +25044,7 @@
                     <a:p>
                       <a:pPr algn="ctr"/>
                       <a:r>
-                        <a:rPr lang="en-US" altLang="zh-TW" dirty="0" smtClean="0">
-                          <a:latin typeface="Times New Roman" panose="02020603050405020304" pitchFamily="18" charset="0"/>
-                          <a:ea typeface="標楷體" panose="03000509000000000000" pitchFamily="65" charset="-120"/>
-                        </a:rPr>
+                        <a:rPr lang="en-US" altLang="zh-TW" dirty="0" smtClean="0"/>
                         <a:t>98 hr.</a:t>
                       </a:r>
                       <a:endParaRPr lang="zh-TW" altLang="en-US" dirty="0">
@@ -25243,7 +25061,7 @@
                   </a:ext>
                 </a:extLst>
               </a:tr>
-              <a:tr h="392623">
+              <a:tr h="354782">
                 <a:tc>
                   <a:txBody>
                     <a:bodyPr/>
@@ -25269,17 +25087,11 @@
                         <a:defRPr/>
                       </a:pPr>
                       <a:r>
-                        <a:rPr lang="en-US" altLang="zh-TW" dirty="0" smtClean="0">
-                          <a:latin typeface="Times New Roman" panose="02020603050405020304" pitchFamily="18" charset="0"/>
-                          <a:ea typeface="標楷體" panose="03000509000000000000" pitchFamily="65" charset="-120"/>
-                        </a:rPr>
+                        <a:rPr lang="en-US" altLang="zh-TW" dirty="0" smtClean="0"/>
                         <a:t>Team</a:t>
                       </a:r>
                       <a:r>
-                        <a:rPr lang="en-US" altLang="zh-TW" baseline="0" dirty="0" smtClean="0">
-                          <a:latin typeface="Times New Roman" panose="02020603050405020304" pitchFamily="18" charset="0"/>
-                          <a:ea typeface="標楷體" panose="03000509000000000000" pitchFamily="65" charset="-120"/>
-                        </a:rPr>
+                        <a:rPr lang="en-US" altLang="zh-TW" baseline="0" dirty="0" smtClean="0"/>
                         <a:t> member Andy time efforts</a:t>
                       </a:r>
                       <a:endParaRPr lang="zh-TW" altLang="en-US" dirty="0" smtClean="0">
@@ -25297,10 +25109,7 @@
                     <a:p>
                       <a:pPr algn="ctr"/>
                       <a:r>
-                        <a:rPr lang="en-US" altLang="zh-TW" dirty="0" smtClean="0">
-                          <a:latin typeface="Times New Roman" panose="02020603050405020304" pitchFamily="18" charset="0"/>
-                          <a:ea typeface="標楷體" panose="03000509000000000000" pitchFamily="65" charset="-120"/>
-                        </a:rPr>
+                        <a:rPr lang="en-US" altLang="zh-TW" dirty="0" smtClean="0"/>
                         <a:t>84 hr.</a:t>
                       </a:r>
                       <a:endParaRPr lang="zh-TW" altLang="en-US" dirty="0">
@@ -25317,7 +25126,7 @@
                   </a:ext>
                 </a:extLst>
               </a:tr>
-              <a:tr h="392623">
+              <a:tr h="354782">
                 <a:tc>
                   <a:txBody>
                     <a:bodyPr/>
@@ -25325,17 +25134,11 @@
                     <a:p>
                       <a:pPr algn="ctr"/>
                       <a:r>
-                        <a:rPr lang="en-US" altLang="zh-TW" dirty="0" smtClean="0">
-                          <a:latin typeface="Times New Roman" panose="02020603050405020304" pitchFamily="18" charset="0"/>
-                          <a:ea typeface="標楷體" panose="03000509000000000000" pitchFamily="65" charset="-120"/>
-                        </a:rPr>
+                        <a:rPr lang="en-US" altLang="zh-TW" dirty="0" smtClean="0"/>
                         <a:t>Team</a:t>
                       </a:r>
                       <a:r>
-                        <a:rPr lang="en-US" altLang="zh-TW" baseline="0" dirty="0" smtClean="0">
-                          <a:latin typeface="Times New Roman" panose="02020603050405020304" pitchFamily="18" charset="0"/>
-                          <a:ea typeface="標楷體" panose="03000509000000000000" pitchFamily="65" charset="-120"/>
-                        </a:rPr>
+                        <a:rPr lang="en-US" altLang="zh-TW" baseline="0" dirty="0" smtClean="0"/>
                         <a:t> member Johnson time efforts</a:t>
                       </a:r>
                       <a:endParaRPr lang="zh-TW" altLang="en-US" dirty="0">
@@ -25353,10 +25156,7 @@
                     <a:p>
                       <a:pPr algn="ctr"/>
                       <a:r>
-                        <a:rPr lang="en-US" altLang="zh-TW" dirty="0" smtClean="0">
-                          <a:latin typeface="Times New Roman" panose="02020603050405020304" pitchFamily="18" charset="0"/>
-                          <a:ea typeface="標楷體" panose="03000509000000000000" pitchFamily="65" charset="-120"/>
-                        </a:rPr>
+                        <a:rPr lang="en-US" altLang="zh-TW" dirty="0" smtClean="0"/>
                         <a:t>75 hr.</a:t>
                       </a:r>
                       <a:endParaRPr lang="zh-TW" altLang="en-US" dirty="0">
@@ -25373,7 +25173,7 @@
                   </a:ext>
                 </a:extLst>
               </a:tr>
-              <a:tr h="392623">
+              <a:tr h="354782">
                 <a:tc>
                   <a:txBody>
                     <a:bodyPr/>
@@ -25381,17 +25181,11 @@
                     <a:p>
                       <a:pPr algn="ctr"/>
                       <a:r>
-                        <a:rPr lang="en-US" altLang="zh-TW" dirty="0" smtClean="0">
-                          <a:latin typeface="Times New Roman" panose="02020603050405020304" pitchFamily="18" charset="0"/>
-                          <a:ea typeface="標楷體" panose="03000509000000000000" pitchFamily="65" charset="-120"/>
-                        </a:rPr>
+                        <a:rPr lang="en-US" altLang="zh-TW" dirty="0" smtClean="0"/>
                         <a:t>Total</a:t>
                       </a:r>
                       <a:r>
-                        <a:rPr lang="en-US" altLang="zh-TW" baseline="0" dirty="0" smtClean="0">
-                          <a:latin typeface="Times New Roman" panose="02020603050405020304" pitchFamily="18" charset="0"/>
-                          <a:ea typeface="標楷體" panose="03000509000000000000" pitchFamily="65" charset="-120"/>
-                        </a:rPr>
+                        <a:rPr lang="en-US" altLang="zh-TW" baseline="0" dirty="0" smtClean="0"/>
                         <a:t> time efforts</a:t>
                       </a:r>
                       <a:endParaRPr lang="zh-TW" altLang="en-US" dirty="0">
@@ -25409,10 +25203,7 @@
                     <a:p>
                       <a:pPr algn="ctr"/>
                       <a:r>
-                        <a:rPr lang="en-US" altLang="zh-TW" dirty="0" smtClean="0">
-                          <a:latin typeface="Times New Roman" panose="02020603050405020304" pitchFamily="18" charset="0"/>
-                          <a:ea typeface="標楷體" panose="03000509000000000000" pitchFamily="65" charset="-120"/>
-                        </a:rPr>
+                        <a:rPr lang="en-US" altLang="zh-TW" dirty="0" smtClean="0"/>
                         <a:t>257 hr.</a:t>
                       </a:r>
                       <a:endParaRPr lang="zh-TW" altLang="en-US" dirty="0">
@@ -26737,14 +26528,7 @@
                 <a:latin typeface="標楷體" panose="03000509000000000000" pitchFamily="65" charset="-120"/>
                 <a:ea typeface="標楷體" panose="03000509000000000000" pitchFamily="65" charset="-120"/>
               </a:rPr>
-              <a:t>    </a:t>
-            </a:r>
-            <a:r>
-              <a:rPr lang="zh-TW" altLang="en-US" sz="1800" dirty="0" smtClean="0">
-                <a:latin typeface="標楷體" panose="03000509000000000000" pitchFamily="65" charset="-120"/>
-                <a:ea typeface="標楷體" panose="03000509000000000000" pitchFamily="65" charset="-120"/>
-              </a:rPr>
-              <a:t>在人生中</a:t>
+              <a:t>    在人生中</a:t>
             </a:r>
             <a:r>
               <a:rPr lang="zh-TW" altLang="zh-TW" sz="1800" dirty="0" smtClean="0">
@@ -26800,14 +26584,7 @@
                 <a:latin typeface="標楷體" panose="03000509000000000000" pitchFamily="65" charset="-120"/>
                 <a:ea typeface="標楷體" panose="03000509000000000000" pitchFamily="65" charset="-120"/>
               </a:rPr>
-              <a:t>時間</a:t>
-            </a:r>
-            <a:r>
-              <a:rPr lang="zh-TW" altLang="zh-TW" sz="1800" dirty="0" smtClean="0">
-                <a:latin typeface="標楷體" panose="03000509000000000000" pitchFamily="65" charset="-120"/>
-                <a:ea typeface="標楷體" panose="03000509000000000000" pitchFamily="65" charset="-120"/>
-              </a:rPr>
-              <a:t>之外</a:t>
+              <a:t>時間之外</a:t>
             </a:r>
             <a:r>
               <a:rPr lang="zh-TW" altLang="en-US" sz="1800" dirty="0" smtClean="0">

</xml_diff>

<commit_message>
modify ppt and implement CalculateTotialTime
</commit_message>
<xml_diff>
--- a/OOAD_Midterm.pptx
+++ b/OOAD_Midterm.pptx
@@ -45,23 +45,23 @@
   <p:notesSz cx="9144000" cy="6858000"/>
   <p:embeddedFontLst>
     <p:embeddedFont>
-      <p:font typeface="Roboto Slab" panose="02020500000000000000" charset="0"/>
+      <p:font typeface="Calibri" panose="020F0502020204030204" pitchFamily="34" charset="0"/>
       <p:regular r:id="rId33"/>
       <p:bold r:id="rId34"/>
+      <p:italic r:id="rId35"/>
+      <p:boldItalic r:id="rId36"/>
     </p:embeddedFont>
     <p:embeddedFont>
-      <p:font typeface="Calibri" panose="020F0502020204030204" pitchFamily="34" charset="0"/>
-      <p:regular r:id="rId35"/>
-      <p:bold r:id="rId36"/>
-      <p:italic r:id="rId37"/>
-      <p:boldItalic r:id="rId38"/>
+      <p:font typeface="Nixie One" panose="02020500000000000000" charset="0"/>
+      <p:regular r:id="rId37"/>
+    </p:embeddedFont>
+    <p:embeddedFont>
+      <p:font typeface="Roboto Slab" panose="02020500000000000000" charset="0"/>
+      <p:regular r:id="rId38"/>
+      <p:bold r:id="rId39"/>
     </p:embeddedFont>
     <p:embeddedFont>
       <p:font typeface="標楷體" panose="03000509000000000000" pitchFamily="65" charset="-120"/>
-      <p:regular r:id="rId39"/>
-    </p:embeddedFont>
-    <p:embeddedFont>
-      <p:font typeface="Nixie One" panose="02020500000000000000" charset="0"/>
       <p:regular r:id="rId40"/>
     </p:embeddedFont>
   </p:embeddedFontLst>
@@ -387,7 +387,7 @@
           <a:p>
             <a:fld id="{D0CD3812-1CB0-40EA-8A99-ADA007E8EE2D}" type="datetimeFigureOut">
               <a:rPr lang="zh-TW" altLang="en-US" smtClean="0"/>
-              <a:t>2018/5/14</a:t>
+              <a:t>2018/5/15</a:t>
             </a:fld>
             <a:endParaRPr lang="zh-TW" altLang="en-US"/>
           </a:p>
@@ -13691,23 +13691,7 @@
                   <a:schemeClr val="tx1"/>
                 </a:solidFill>
               </a:rPr>
-              <a:t>   </a:t>
-            </a:r>
-            <a:r>
-              <a:rPr lang="en-US" altLang="zh-TW" dirty="0" smtClean="0">
-                <a:solidFill>
-                  <a:schemeClr val="tx1"/>
-                </a:solidFill>
-              </a:rPr>
-              <a:t>SD-Delete </a:t>
-            </a:r>
-            <a:r>
-              <a:rPr lang="en-US" altLang="zh-TW" dirty="0" smtClean="0">
-                <a:solidFill>
-                  <a:schemeClr val="tx1"/>
-                </a:solidFill>
-              </a:rPr>
-              <a:t>Event</a:t>
+              <a:t>   SD-Delete Event</a:t>
             </a:r>
             <a:endParaRPr lang="en-US" altLang="zh-TW" dirty="0">
               <a:solidFill>
@@ -20385,8 +20369,8 @@
         </p:blipFill>
         <p:spPr>
           <a:xfrm>
-            <a:off x="1378094" y="0"/>
-            <a:ext cx="6473820" cy="5143500"/>
+            <a:off x="1212574" y="0"/>
+            <a:ext cx="7070035" cy="5143500"/>
           </a:xfrm>
           <a:prstGeom prst="rect">
             <a:avLst/>
@@ -21391,8 +21375,8 @@
         </p:blipFill>
         <p:spPr>
           <a:xfrm>
-            <a:off x="1378094" y="0"/>
-            <a:ext cx="6473820" cy="5143500"/>
+            <a:off x="1205948" y="0"/>
+            <a:ext cx="7268817" cy="5143500"/>
           </a:xfrm>
           <a:prstGeom prst="rect">
             <a:avLst/>
@@ -21435,7 +21419,7 @@
         </p:nvSpPr>
         <p:spPr>
           <a:xfrm>
-            <a:off x="6560820" y="-125730"/>
+            <a:off x="7136755" y="-138982"/>
             <a:ext cx="1151870" cy="941070"/>
           </a:xfrm>
           <a:prstGeom prst="mathMultiply">
@@ -21475,7 +21459,7 @@
         </p:nvSpPr>
         <p:spPr>
           <a:xfrm>
-            <a:off x="6560820" y="1055370"/>
+            <a:off x="7196924" y="1004018"/>
             <a:ext cx="1151870" cy="941070"/>
           </a:xfrm>
           <a:prstGeom prst="mathMultiply">
@@ -21515,7 +21499,7 @@
         </p:nvSpPr>
         <p:spPr>
           <a:xfrm>
-            <a:off x="1737360" y="2358390"/>
+            <a:off x="1730734" y="2437903"/>
             <a:ext cx="1151870" cy="941070"/>
           </a:xfrm>
           <a:prstGeom prst="mathMultiply">
@@ -21555,7 +21539,7 @@
         </p:nvSpPr>
         <p:spPr>
           <a:xfrm>
-            <a:off x="3393522" y="-201930"/>
+            <a:off x="3817591" y="-188677"/>
             <a:ext cx="1151870" cy="941070"/>
           </a:xfrm>
           <a:prstGeom prst="mathMultiply">

</xml_diff>

<commit_message>
modify ppt and change domain model
</commit_message>
<xml_diff>
--- a/OOAD_Midterm.pptx
+++ b/OOAD_Midterm.pptx
@@ -25,8 +25,8 @@
     <p:sldId id="275" r:id="rId13"/>
     <p:sldId id="291" r:id="rId14"/>
     <p:sldId id="290" r:id="rId15"/>
-    <p:sldId id="292" r:id="rId16"/>
-    <p:sldId id="300" r:id="rId17"/>
+    <p:sldId id="300" r:id="rId16"/>
+    <p:sldId id="292" r:id="rId17"/>
     <p:sldId id="296" r:id="rId18"/>
     <p:sldId id="293" r:id="rId19"/>
     <p:sldId id="295" r:id="rId20"/>
@@ -1441,7 +1441,7 @@
     </p:spTree>
     <p:extLst>
       <p:ext uri="{BB962C8B-B14F-4D97-AF65-F5344CB8AC3E}">
-        <p14:creationId xmlns:p14="http://schemas.microsoft.com/office/powerpoint/2010/main" val="2769621835"/>
+        <p14:creationId xmlns:p14="http://schemas.microsoft.com/office/powerpoint/2010/main" val="2892188042"/>
       </p:ext>
     </p:extLst>
   </p:cSld>
@@ -1550,7 +1550,7 @@
     </p:spTree>
     <p:extLst>
       <p:ext uri="{BB962C8B-B14F-4D97-AF65-F5344CB8AC3E}">
-        <p14:creationId xmlns:p14="http://schemas.microsoft.com/office/powerpoint/2010/main" val="2892188042"/>
+        <p14:creationId xmlns:p14="http://schemas.microsoft.com/office/powerpoint/2010/main" val="2769621835"/>
       </p:ext>
     </p:extLst>
   </p:cSld>
@@ -9073,8 +9073,8 @@
         </p:blipFill>
         <p:spPr>
           <a:xfrm>
-            <a:off x="2272749" y="1181704"/>
-            <a:ext cx="4591878" cy="3807738"/>
+            <a:off x="2272749" y="1181705"/>
+            <a:ext cx="4591878" cy="3807736"/>
           </a:xfrm>
           <a:prstGeom prst="rect">
             <a:avLst/>
@@ -9224,8 +9224,8 @@
         </p:blipFill>
         <p:spPr>
           <a:xfrm>
-            <a:off x="1053548" y="1345541"/>
-            <a:ext cx="6081091" cy="3800535"/>
+            <a:off x="713568" y="1133061"/>
+            <a:ext cx="6421072" cy="4013015"/>
           </a:xfrm>
           <a:prstGeom prst="rect">
             <a:avLst/>
@@ -9242,7 +9242,7 @@
         </p:nvSpPr>
         <p:spPr>
           <a:xfrm>
-            <a:off x="2621985" y="845784"/>
+            <a:off x="2416576" y="898793"/>
             <a:ext cx="4592167" cy="1054566"/>
           </a:xfrm>
           <a:prstGeom prst="rect">
@@ -9603,8 +9603,8 @@
         </p:blipFill>
         <p:spPr>
           <a:xfrm>
-            <a:off x="1060174" y="1521857"/>
-            <a:ext cx="5917096" cy="3621643"/>
+            <a:off x="843657" y="1113183"/>
+            <a:ext cx="6584795" cy="4030318"/>
           </a:xfrm>
           <a:prstGeom prst="rect">
             <a:avLst/>
@@ -9621,7 +9621,7 @@
         </p:nvSpPr>
         <p:spPr>
           <a:xfrm>
-            <a:off x="2477868" y="1007507"/>
+            <a:off x="2583886" y="921367"/>
             <a:ext cx="4565662" cy="1028700"/>
           </a:xfrm>
           <a:prstGeom prst="rect">
@@ -10043,8 +10043,8 @@
         </p:blipFill>
         <p:spPr>
           <a:xfrm>
-            <a:off x="1245704" y="1436810"/>
-            <a:ext cx="6003235" cy="3647055"/>
+            <a:off x="819488" y="1186709"/>
+            <a:ext cx="6429452" cy="3889421"/>
           </a:xfrm>
           <a:prstGeom prst="rect">
             <a:avLst/>
@@ -10061,7 +10061,7 @@
         </p:nvSpPr>
         <p:spPr>
           <a:xfrm>
-            <a:off x="2471005" y="845784"/>
+            <a:off x="2398119" y="977947"/>
             <a:ext cx="4562681" cy="1036385"/>
           </a:xfrm>
           <a:prstGeom prst="rect">
@@ -10696,6 +10696,454 @@
           </a:p>
         </p:txBody>
       </p:sp>
+      <p:pic>
+        <p:nvPicPr>
+          <p:cNvPr id="11" name="圖片 10"/>
+          <p:cNvPicPr>
+            <a:picLocks noChangeAspect="1"/>
+          </p:cNvPicPr>
+          <p:nvPr/>
+        </p:nvPicPr>
+        <p:blipFill>
+          <a:blip r:embed="rId3">
+            <a:extLst>
+              <a:ext uri="{28A0092B-C50C-407E-A947-70E740481C1C}">
+                <a14:useLocalDpi xmlns:a14="http://schemas.microsoft.com/office/drawing/2010/main" val="0"/>
+              </a:ext>
+            </a:extLst>
+          </a:blip>
+          <a:stretch>
+            <a:fillRect/>
+          </a:stretch>
+        </p:blipFill>
+        <p:spPr>
+          <a:xfrm>
+            <a:off x="723900" y="1567110"/>
+            <a:ext cx="8420100" cy="3576390"/>
+          </a:xfrm>
+          <a:prstGeom prst="rect">
+            <a:avLst/>
+          </a:prstGeom>
+        </p:spPr>
+      </p:pic>
+      <p:sp>
+        <p:nvSpPr>
+          <p:cNvPr id="12" name="Shape 111"/>
+          <p:cNvSpPr txBox="1">
+            <a:spLocks/>
+          </p:cNvSpPr>
+          <p:nvPr/>
+        </p:nvSpPr>
+        <p:spPr>
+          <a:xfrm>
+            <a:off x="2981595" y="845784"/>
+            <a:ext cx="4572288" cy="1044070"/>
+          </a:xfrm>
+          <a:prstGeom prst="rect">
+            <a:avLst/>
+          </a:prstGeom>
+          <a:noFill/>
+          <a:ln>
+            <a:noFill/>
+          </a:ln>
+        </p:spPr>
+        <p:txBody>
+          <a:bodyPr spcFirstLastPara="1" wrap="square" lIns="91425" tIns="91425" rIns="91425" bIns="91425" anchor="ctr" anchorCtr="0">
+            <a:noAutofit/>
+          </a:bodyPr>
+          <a:lstStyle>
+            <a:defPPr marR="0" lvl="0" algn="l" rtl="0">
+              <a:lnSpc>
+                <a:spcPct val="100000"/>
+              </a:lnSpc>
+              <a:spcBef>
+                <a:spcPts val="0"/>
+              </a:spcBef>
+              <a:spcAft>
+                <a:spcPts val="0"/>
+              </a:spcAft>
+            </a:defPPr>
+            <a:lvl1pPr marR="0" lvl="0" algn="l" rtl="0">
+              <a:lnSpc>
+                <a:spcPct val="100000"/>
+              </a:lnSpc>
+              <a:spcBef>
+                <a:spcPts val="0"/>
+              </a:spcBef>
+              <a:spcAft>
+                <a:spcPts val="0"/>
+              </a:spcAft>
+              <a:buClr>
+                <a:srgbClr val="FFFFFF"/>
+              </a:buClr>
+              <a:buSzPts val="1800"/>
+              <a:buFont typeface="Roboto Slab"/>
+              <a:buNone/>
+              <a:defRPr sz="1800" b="1" i="0" u="none" strike="noStrike" cap="none" baseline="0">
+                <a:solidFill>
+                  <a:srgbClr val="FFFFFF"/>
+                </a:solidFill>
+                <a:latin typeface="Times New Roman" panose="02020603050405020304" pitchFamily="18" charset="0"/>
+                <a:ea typeface="標楷體" panose="03000509000000000000" pitchFamily="65" charset="-120"/>
+                <a:cs typeface="Roboto Slab"/>
+                <a:sym typeface="Roboto Slab"/>
+              </a:defRPr>
+            </a:lvl1pPr>
+            <a:lvl2pPr marR="0" lvl="1" algn="l" rtl="0">
+              <a:lnSpc>
+                <a:spcPct val="100000"/>
+              </a:lnSpc>
+              <a:spcBef>
+                <a:spcPts val="0"/>
+              </a:spcBef>
+              <a:spcAft>
+                <a:spcPts val="0"/>
+              </a:spcAft>
+              <a:buClr>
+                <a:srgbClr val="FFFFFF"/>
+              </a:buClr>
+              <a:buSzPts val="1800"/>
+              <a:buFont typeface="Roboto Slab"/>
+              <a:buNone/>
+              <a:defRPr sz="1800" b="1" i="0" u="none" strike="noStrike" cap="none">
+                <a:solidFill>
+                  <a:srgbClr val="FFFFFF"/>
+                </a:solidFill>
+                <a:latin typeface="Roboto Slab"/>
+                <a:ea typeface="Roboto Slab"/>
+                <a:cs typeface="Roboto Slab"/>
+                <a:sym typeface="Roboto Slab"/>
+              </a:defRPr>
+            </a:lvl2pPr>
+            <a:lvl3pPr marR="0" lvl="2" algn="l" rtl="0">
+              <a:lnSpc>
+                <a:spcPct val="100000"/>
+              </a:lnSpc>
+              <a:spcBef>
+                <a:spcPts val="0"/>
+              </a:spcBef>
+              <a:spcAft>
+                <a:spcPts val="0"/>
+              </a:spcAft>
+              <a:buClr>
+                <a:srgbClr val="FFFFFF"/>
+              </a:buClr>
+              <a:buSzPts val="1800"/>
+              <a:buFont typeface="Roboto Slab"/>
+              <a:buNone/>
+              <a:defRPr sz="1800" b="1" i="0" u="none" strike="noStrike" cap="none">
+                <a:solidFill>
+                  <a:srgbClr val="FFFFFF"/>
+                </a:solidFill>
+                <a:latin typeface="Roboto Slab"/>
+                <a:ea typeface="Roboto Slab"/>
+                <a:cs typeface="Roboto Slab"/>
+                <a:sym typeface="Roboto Slab"/>
+              </a:defRPr>
+            </a:lvl3pPr>
+            <a:lvl4pPr marR="0" lvl="3" algn="l" rtl="0">
+              <a:lnSpc>
+                <a:spcPct val="100000"/>
+              </a:lnSpc>
+              <a:spcBef>
+                <a:spcPts val="0"/>
+              </a:spcBef>
+              <a:spcAft>
+                <a:spcPts val="0"/>
+              </a:spcAft>
+              <a:buClr>
+                <a:srgbClr val="FFFFFF"/>
+              </a:buClr>
+              <a:buSzPts val="1800"/>
+              <a:buFont typeface="Roboto Slab"/>
+              <a:buNone/>
+              <a:defRPr sz="1800" b="1" i="0" u="none" strike="noStrike" cap="none">
+                <a:solidFill>
+                  <a:srgbClr val="FFFFFF"/>
+                </a:solidFill>
+                <a:latin typeface="Roboto Slab"/>
+                <a:ea typeface="Roboto Slab"/>
+                <a:cs typeface="Roboto Slab"/>
+                <a:sym typeface="Roboto Slab"/>
+              </a:defRPr>
+            </a:lvl4pPr>
+            <a:lvl5pPr marR="0" lvl="4" algn="l" rtl="0">
+              <a:lnSpc>
+                <a:spcPct val="100000"/>
+              </a:lnSpc>
+              <a:spcBef>
+                <a:spcPts val="0"/>
+              </a:spcBef>
+              <a:spcAft>
+                <a:spcPts val="0"/>
+              </a:spcAft>
+              <a:buClr>
+                <a:srgbClr val="FFFFFF"/>
+              </a:buClr>
+              <a:buSzPts val="1800"/>
+              <a:buFont typeface="Roboto Slab"/>
+              <a:buNone/>
+              <a:defRPr sz="1800" b="1" i="0" u="none" strike="noStrike" cap="none">
+                <a:solidFill>
+                  <a:srgbClr val="FFFFFF"/>
+                </a:solidFill>
+                <a:latin typeface="Roboto Slab"/>
+                <a:ea typeface="Roboto Slab"/>
+                <a:cs typeface="Roboto Slab"/>
+                <a:sym typeface="Roboto Slab"/>
+              </a:defRPr>
+            </a:lvl5pPr>
+            <a:lvl6pPr marR="0" lvl="5" algn="l" rtl="0">
+              <a:lnSpc>
+                <a:spcPct val="100000"/>
+              </a:lnSpc>
+              <a:spcBef>
+                <a:spcPts val="0"/>
+              </a:spcBef>
+              <a:spcAft>
+                <a:spcPts val="0"/>
+              </a:spcAft>
+              <a:buClr>
+                <a:srgbClr val="FFFFFF"/>
+              </a:buClr>
+              <a:buSzPts val="1800"/>
+              <a:buFont typeface="Roboto Slab"/>
+              <a:buNone/>
+              <a:defRPr sz="1800" b="1" i="0" u="none" strike="noStrike" cap="none">
+                <a:solidFill>
+                  <a:srgbClr val="FFFFFF"/>
+                </a:solidFill>
+                <a:latin typeface="Roboto Slab"/>
+                <a:ea typeface="Roboto Slab"/>
+                <a:cs typeface="Roboto Slab"/>
+                <a:sym typeface="Roboto Slab"/>
+              </a:defRPr>
+            </a:lvl6pPr>
+            <a:lvl7pPr marR="0" lvl="6" algn="l" rtl="0">
+              <a:lnSpc>
+                <a:spcPct val="100000"/>
+              </a:lnSpc>
+              <a:spcBef>
+                <a:spcPts val="0"/>
+              </a:spcBef>
+              <a:spcAft>
+                <a:spcPts val="0"/>
+              </a:spcAft>
+              <a:buClr>
+                <a:srgbClr val="FFFFFF"/>
+              </a:buClr>
+              <a:buSzPts val="1800"/>
+              <a:buFont typeface="Roboto Slab"/>
+              <a:buNone/>
+              <a:defRPr sz="1800" b="1" i="0" u="none" strike="noStrike" cap="none">
+                <a:solidFill>
+                  <a:srgbClr val="FFFFFF"/>
+                </a:solidFill>
+                <a:latin typeface="Roboto Slab"/>
+                <a:ea typeface="Roboto Slab"/>
+                <a:cs typeface="Roboto Slab"/>
+                <a:sym typeface="Roboto Slab"/>
+              </a:defRPr>
+            </a:lvl7pPr>
+            <a:lvl8pPr marR="0" lvl="7" algn="l" rtl="0">
+              <a:lnSpc>
+                <a:spcPct val="100000"/>
+              </a:lnSpc>
+              <a:spcBef>
+                <a:spcPts val="0"/>
+              </a:spcBef>
+              <a:spcAft>
+                <a:spcPts val="0"/>
+              </a:spcAft>
+              <a:buClr>
+                <a:srgbClr val="FFFFFF"/>
+              </a:buClr>
+              <a:buSzPts val="1800"/>
+              <a:buFont typeface="Roboto Slab"/>
+              <a:buNone/>
+              <a:defRPr sz="1800" b="1" i="0" u="none" strike="noStrike" cap="none">
+                <a:solidFill>
+                  <a:srgbClr val="FFFFFF"/>
+                </a:solidFill>
+                <a:latin typeface="Roboto Slab"/>
+                <a:ea typeface="Roboto Slab"/>
+                <a:cs typeface="Roboto Slab"/>
+                <a:sym typeface="Roboto Slab"/>
+              </a:defRPr>
+            </a:lvl8pPr>
+            <a:lvl9pPr marR="0" lvl="8" algn="l" rtl="0">
+              <a:lnSpc>
+                <a:spcPct val="100000"/>
+              </a:lnSpc>
+              <a:spcBef>
+                <a:spcPts val="0"/>
+              </a:spcBef>
+              <a:spcAft>
+                <a:spcPts val="0"/>
+              </a:spcAft>
+              <a:buClr>
+                <a:srgbClr val="FFFFFF"/>
+              </a:buClr>
+              <a:buSzPts val="1800"/>
+              <a:buFont typeface="Roboto Slab"/>
+              <a:buNone/>
+              <a:defRPr sz="1800" b="1" i="0" u="none" strike="noStrike" cap="none">
+                <a:solidFill>
+                  <a:srgbClr val="FFFFFF"/>
+                </a:solidFill>
+                <a:latin typeface="Roboto Slab"/>
+                <a:ea typeface="Roboto Slab"/>
+                <a:cs typeface="Roboto Slab"/>
+                <a:sym typeface="Roboto Slab"/>
+              </a:defRPr>
+            </a:lvl9pPr>
+          </a:lstStyle>
+          <a:p>
+            <a:r>
+              <a:rPr lang="en-US" dirty="0" smtClean="0">
+                <a:solidFill>
+                  <a:schemeClr val="tx1"/>
+                </a:solidFill>
+              </a:rPr>
+              <a:t>S</a:t>
+            </a:r>
+            <a:r>
+              <a:rPr lang="en-US" altLang="zh-TW" dirty="0" smtClean="0">
+                <a:solidFill>
+                  <a:schemeClr val="tx1"/>
+                </a:solidFill>
+              </a:rPr>
+              <a:t>D-Add Event</a:t>
+            </a:r>
+            <a:endParaRPr lang="en-US" dirty="0">
+              <a:solidFill>
+                <a:schemeClr val="tx1"/>
+              </a:solidFill>
+            </a:endParaRPr>
+          </a:p>
+        </p:txBody>
+      </p:sp>
+      <p:sp>
+        <p:nvSpPr>
+          <p:cNvPr id="15" name="Shape 111"/>
+          <p:cNvSpPr txBox="1">
+            <a:spLocks noGrp="1"/>
+          </p:cNvSpPr>
+          <p:nvPr>
+            <p:ph type="title"/>
+          </p:nvPr>
+        </p:nvSpPr>
+        <p:spPr>
+          <a:xfrm>
+            <a:off x="910799" y="504859"/>
+            <a:ext cx="4141592" cy="681850"/>
+          </a:xfrm>
+          <a:prstGeom prst="rect">
+            <a:avLst/>
+          </a:prstGeom>
+        </p:spPr>
+        <p:txBody>
+          <a:bodyPr spcFirstLastPara="1" wrap="square" lIns="91425" tIns="91425" rIns="91425" bIns="91425" anchor="ctr" anchorCtr="0">
+            <a:noAutofit/>
+          </a:bodyPr>
+          <a:lstStyle/>
+          <a:p>
+            <a:pPr marL="0" lvl="0" indent="0" rtl="0">
+              <a:spcBef>
+                <a:spcPts val="0"/>
+              </a:spcBef>
+              <a:spcAft>
+                <a:spcPts val="0"/>
+              </a:spcAft>
+              <a:buNone/>
+            </a:pPr>
+            <a:r>
+              <a:rPr lang="en-US" sz="2000" dirty="0" smtClean="0"/>
+              <a:t>Use Case </a:t>
+            </a:r>
+            <a:r>
+              <a:rPr lang="en-US" altLang="zh-TW" sz="2000" dirty="0" smtClean="0"/>
+              <a:t>R</a:t>
+            </a:r>
+            <a:r>
+              <a:rPr lang="en-US" sz="2000" dirty="0" smtClean="0"/>
+              <a:t>ealizations </a:t>
+            </a:r>
+            <a:br>
+              <a:rPr lang="en-US" sz="2000" dirty="0" smtClean="0"/>
+            </a:br>
+            <a:r>
+              <a:rPr lang="en-US" sz="2000" dirty="0"/>
+              <a:t>	</a:t>
+            </a:r>
+            <a:r>
+              <a:rPr lang="en-US" sz="2000" dirty="0" smtClean="0"/>
+              <a:t>with GRASP Patterns</a:t>
+            </a:r>
+            <a:endParaRPr sz="2000" dirty="0"/>
+          </a:p>
+        </p:txBody>
+      </p:sp>
+    </p:spTree>
+    <p:extLst>
+      <p:ext uri="{BB962C8B-B14F-4D97-AF65-F5344CB8AC3E}">
+        <p14:creationId xmlns:p14="http://schemas.microsoft.com/office/powerpoint/2010/main" val="1530335907"/>
+      </p:ext>
+    </p:extLst>
+  </p:cSld>
+  <p:clrMapOvr>
+    <a:masterClrMapping/>
+  </p:clrMapOvr>
+  <p:timing>
+    <p:tnLst>
+      <p:par>
+        <p:cTn id="1" dur="indefinite" restart="never" nodeType="tmRoot"/>
+      </p:par>
+    </p:tnLst>
+  </p:timing>
+</p:sld>
+</file>
+
+<file path=ppt/slides/slide16.xml><?xml version="1.0" encoding="utf-8"?>
+<p:sld xmlns:a="http://schemas.openxmlformats.org/drawingml/2006/main" xmlns:r="http://schemas.openxmlformats.org/officeDocument/2006/relationships" xmlns:p="http://schemas.openxmlformats.org/presentationml/2006/main">
+  <p:cSld>
+    <p:spTree>
+      <p:nvGrpSpPr>
+        <p:cNvPr id="1" name="Shape 110"/>
+        <p:cNvGrpSpPr/>
+        <p:nvPr/>
+      </p:nvGrpSpPr>
+      <p:grpSpPr>
+        <a:xfrm>
+          <a:off x="0" y="0"/>
+          <a:ext cx="0" cy="0"/>
+          <a:chOff x="0" y="0"/>
+          <a:chExt cx="0" cy="0"/>
+        </a:xfrm>
+      </p:grpSpPr>
+      <p:sp>
+        <p:nvSpPr>
+          <p:cNvPr id="3" name="投影片編號版面配置區 2"/>
+          <p:cNvSpPr>
+            <a:spLocks noGrp="1"/>
+          </p:cNvSpPr>
+          <p:nvPr>
+            <p:ph type="sldNum" sz="quarter" idx="4"/>
+          </p:nvPr>
+        </p:nvSpPr>
+        <p:spPr/>
+        <p:txBody>
+          <a:bodyPr/>
+          <a:lstStyle/>
+          <a:p>
+            <a:fld id="{EC3EB3F6-344C-43CD-ADCE-F2EDBE9BD694}" type="slidenum">
+              <a:rPr lang="zh-TW" altLang="en-US" smtClean="0"/>
+              <a:t>16</a:t>
+            </a:fld>
+            <a:endParaRPr lang="zh-TW" altLang="en-US"/>
+          </a:p>
+        </p:txBody>
+      </p:sp>
       <p:sp>
         <p:nvSpPr>
           <p:cNvPr id="12" name="Shape 111"/>
@@ -11315,454 +11763,6 @@
     <p:extLst>
       <p:ext uri="{BB962C8B-B14F-4D97-AF65-F5344CB8AC3E}">
         <p14:creationId xmlns:p14="http://schemas.microsoft.com/office/powerpoint/2010/main" val="1038781209"/>
-      </p:ext>
-    </p:extLst>
-  </p:cSld>
-  <p:clrMapOvr>
-    <a:masterClrMapping/>
-  </p:clrMapOvr>
-  <p:timing>
-    <p:tnLst>
-      <p:par>
-        <p:cTn id="1" dur="indefinite" restart="never" nodeType="tmRoot"/>
-      </p:par>
-    </p:tnLst>
-  </p:timing>
-</p:sld>
-</file>
-
-<file path=ppt/slides/slide16.xml><?xml version="1.0" encoding="utf-8"?>
-<p:sld xmlns:a="http://schemas.openxmlformats.org/drawingml/2006/main" xmlns:r="http://schemas.openxmlformats.org/officeDocument/2006/relationships" xmlns:p="http://schemas.openxmlformats.org/presentationml/2006/main">
-  <p:cSld>
-    <p:spTree>
-      <p:nvGrpSpPr>
-        <p:cNvPr id="1" name="Shape 110"/>
-        <p:cNvGrpSpPr/>
-        <p:nvPr/>
-      </p:nvGrpSpPr>
-      <p:grpSpPr>
-        <a:xfrm>
-          <a:off x="0" y="0"/>
-          <a:ext cx="0" cy="0"/>
-          <a:chOff x="0" y="0"/>
-          <a:chExt cx="0" cy="0"/>
-        </a:xfrm>
-      </p:grpSpPr>
-      <p:sp>
-        <p:nvSpPr>
-          <p:cNvPr id="3" name="投影片編號版面配置區 2"/>
-          <p:cNvSpPr>
-            <a:spLocks noGrp="1"/>
-          </p:cNvSpPr>
-          <p:nvPr>
-            <p:ph type="sldNum" sz="quarter" idx="4"/>
-          </p:nvPr>
-        </p:nvSpPr>
-        <p:spPr/>
-        <p:txBody>
-          <a:bodyPr/>
-          <a:lstStyle/>
-          <a:p>
-            <a:fld id="{EC3EB3F6-344C-43CD-ADCE-F2EDBE9BD694}" type="slidenum">
-              <a:rPr lang="zh-TW" altLang="en-US" smtClean="0"/>
-              <a:t>16</a:t>
-            </a:fld>
-            <a:endParaRPr lang="zh-TW" altLang="en-US"/>
-          </a:p>
-        </p:txBody>
-      </p:sp>
-      <p:pic>
-        <p:nvPicPr>
-          <p:cNvPr id="11" name="圖片 10"/>
-          <p:cNvPicPr>
-            <a:picLocks noChangeAspect="1"/>
-          </p:cNvPicPr>
-          <p:nvPr/>
-        </p:nvPicPr>
-        <p:blipFill>
-          <a:blip r:embed="rId3">
-            <a:extLst>
-              <a:ext uri="{28A0092B-C50C-407E-A947-70E740481C1C}">
-                <a14:useLocalDpi xmlns:a14="http://schemas.microsoft.com/office/drawing/2010/main" val="0"/>
-              </a:ext>
-            </a:extLst>
-          </a:blip>
-          <a:stretch>
-            <a:fillRect/>
-          </a:stretch>
-        </p:blipFill>
-        <p:spPr>
-          <a:xfrm>
-            <a:off x="723900" y="1567110"/>
-            <a:ext cx="8420100" cy="3576390"/>
-          </a:xfrm>
-          <a:prstGeom prst="rect">
-            <a:avLst/>
-          </a:prstGeom>
-        </p:spPr>
-      </p:pic>
-      <p:sp>
-        <p:nvSpPr>
-          <p:cNvPr id="12" name="Shape 111"/>
-          <p:cNvSpPr txBox="1">
-            <a:spLocks/>
-          </p:cNvSpPr>
-          <p:nvPr/>
-        </p:nvSpPr>
-        <p:spPr>
-          <a:xfrm>
-            <a:off x="2981595" y="845784"/>
-            <a:ext cx="4572288" cy="1044070"/>
-          </a:xfrm>
-          <a:prstGeom prst="rect">
-            <a:avLst/>
-          </a:prstGeom>
-          <a:noFill/>
-          <a:ln>
-            <a:noFill/>
-          </a:ln>
-        </p:spPr>
-        <p:txBody>
-          <a:bodyPr spcFirstLastPara="1" wrap="square" lIns="91425" tIns="91425" rIns="91425" bIns="91425" anchor="ctr" anchorCtr="0">
-            <a:noAutofit/>
-          </a:bodyPr>
-          <a:lstStyle>
-            <a:defPPr marR="0" lvl="0" algn="l" rtl="0">
-              <a:lnSpc>
-                <a:spcPct val="100000"/>
-              </a:lnSpc>
-              <a:spcBef>
-                <a:spcPts val="0"/>
-              </a:spcBef>
-              <a:spcAft>
-                <a:spcPts val="0"/>
-              </a:spcAft>
-            </a:defPPr>
-            <a:lvl1pPr marR="0" lvl="0" algn="l" rtl="0">
-              <a:lnSpc>
-                <a:spcPct val="100000"/>
-              </a:lnSpc>
-              <a:spcBef>
-                <a:spcPts val="0"/>
-              </a:spcBef>
-              <a:spcAft>
-                <a:spcPts val="0"/>
-              </a:spcAft>
-              <a:buClr>
-                <a:srgbClr val="FFFFFF"/>
-              </a:buClr>
-              <a:buSzPts val="1800"/>
-              <a:buFont typeface="Roboto Slab"/>
-              <a:buNone/>
-              <a:defRPr sz="1800" b="1" i="0" u="none" strike="noStrike" cap="none" baseline="0">
-                <a:solidFill>
-                  <a:srgbClr val="FFFFFF"/>
-                </a:solidFill>
-                <a:latin typeface="Times New Roman" panose="02020603050405020304" pitchFamily="18" charset="0"/>
-                <a:ea typeface="標楷體" panose="03000509000000000000" pitchFamily="65" charset="-120"/>
-                <a:cs typeface="Roboto Slab"/>
-                <a:sym typeface="Roboto Slab"/>
-              </a:defRPr>
-            </a:lvl1pPr>
-            <a:lvl2pPr marR="0" lvl="1" algn="l" rtl="0">
-              <a:lnSpc>
-                <a:spcPct val="100000"/>
-              </a:lnSpc>
-              <a:spcBef>
-                <a:spcPts val="0"/>
-              </a:spcBef>
-              <a:spcAft>
-                <a:spcPts val="0"/>
-              </a:spcAft>
-              <a:buClr>
-                <a:srgbClr val="FFFFFF"/>
-              </a:buClr>
-              <a:buSzPts val="1800"/>
-              <a:buFont typeface="Roboto Slab"/>
-              <a:buNone/>
-              <a:defRPr sz="1800" b="1" i="0" u="none" strike="noStrike" cap="none">
-                <a:solidFill>
-                  <a:srgbClr val="FFFFFF"/>
-                </a:solidFill>
-                <a:latin typeface="Roboto Slab"/>
-                <a:ea typeface="Roboto Slab"/>
-                <a:cs typeface="Roboto Slab"/>
-                <a:sym typeface="Roboto Slab"/>
-              </a:defRPr>
-            </a:lvl2pPr>
-            <a:lvl3pPr marR="0" lvl="2" algn="l" rtl="0">
-              <a:lnSpc>
-                <a:spcPct val="100000"/>
-              </a:lnSpc>
-              <a:spcBef>
-                <a:spcPts val="0"/>
-              </a:spcBef>
-              <a:spcAft>
-                <a:spcPts val="0"/>
-              </a:spcAft>
-              <a:buClr>
-                <a:srgbClr val="FFFFFF"/>
-              </a:buClr>
-              <a:buSzPts val="1800"/>
-              <a:buFont typeface="Roboto Slab"/>
-              <a:buNone/>
-              <a:defRPr sz="1800" b="1" i="0" u="none" strike="noStrike" cap="none">
-                <a:solidFill>
-                  <a:srgbClr val="FFFFFF"/>
-                </a:solidFill>
-                <a:latin typeface="Roboto Slab"/>
-                <a:ea typeface="Roboto Slab"/>
-                <a:cs typeface="Roboto Slab"/>
-                <a:sym typeface="Roboto Slab"/>
-              </a:defRPr>
-            </a:lvl3pPr>
-            <a:lvl4pPr marR="0" lvl="3" algn="l" rtl="0">
-              <a:lnSpc>
-                <a:spcPct val="100000"/>
-              </a:lnSpc>
-              <a:spcBef>
-                <a:spcPts val="0"/>
-              </a:spcBef>
-              <a:spcAft>
-                <a:spcPts val="0"/>
-              </a:spcAft>
-              <a:buClr>
-                <a:srgbClr val="FFFFFF"/>
-              </a:buClr>
-              <a:buSzPts val="1800"/>
-              <a:buFont typeface="Roboto Slab"/>
-              <a:buNone/>
-              <a:defRPr sz="1800" b="1" i="0" u="none" strike="noStrike" cap="none">
-                <a:solidFill>
-                  <a:srgbClr val="FFFFFF"/>
-                </a:solidFill>
-                <a:latin typeface="Roboto Slab"/>
-                <a:ea typeface="Roboto Slab"/>
-                <a:cs typeface="Roboto Slab"/>
-                <a:sym typeface="Roboto Slab"/>
-              </a:defRPr>
-            </a:lvl4pPr>
-            <a:lvl5pPr marR="0" lvl="4" algn="l" rtl="0">
-              <a:lnSpc>
-                <a:spcPct val="100000"/>
-              </a:lnSpc>
-              <a:spcBef>
-                <a:spcPts val="0"/>
-              </a:spcBef>
-              <a:spcAft>
-                <a:spcPts val="0"/>
-              </a:spcAft>
-              <a:buClr>
-                <a:srgbClr val="FFFFFF"/>
-              </a:buClr>
-              <a:buSzPts val="1800"/>
-              <a:buFont typeface="Roboto Slab"/>
-              <a:buNone/>
-              <a:defRPr sz="1800" b="1" i="0" u="none" strike="noStrike" cap="none">
-                <a:solidFill>
-                  <a:srgbClr val="FFFFFF"/>
-                </a:solidFill>
-                <a:latin typeface="Roboto Slab"/>
-                <a:ea typeface="Roboto Slab"/>
-                <a:cs typeface="Roboto Slab"/>
-                <a:sym typeface="Roboto Slab"/>
-              </a:defRPr>
-            </a:lvl5pPr>
-            <a:lvl6pPr marR="0" lvl="5" algn="l" rtl="0">
-              <a:lnSpc>
-                <a:spcPct val="100000"/>
-              </a:lnSpc>
-              <a:spcBef>
-                <a:spcPts val="0"/>
-              </a:spcBef>
-              <a:spcAft>
-                <a:spcPts val="0"/>
-              </a:spcAft>
-              <a:buClr>
-                <a:srgbClr val="FFFFFF"/>
-              </a:buClr>
-              <a:buSzPts val="1800"/>
-              <a:buFont typeface="Roboto Slab"/>
-              <a:buNone/>
-              <a:defRPr sz="1800" b="1" i="0" u="none" strike="noStrike" cap="none">
-                <a:solidFill>
-                  <a:srgbClr val="FFFFFF"/>
-                </a:solidFill>
-                <a:latin typeface="Roboto Slab"/>
-                <a:ea typeface="Roboto Slab"/>
-                <a:cs typeface="Roboto Slab"/>
-                <a:sym typeface="Roboto Slab"/>
-              </a:defRPr>
-            </a:lvl6pPr>
-            <a:lvl7pPr marR="0" lvl="6" algn="l" rtl="0">
-              <a:lnSpc>
-                <a:spcPct val="100000"/>
-              </a:lnSpc>
-              <a:spcBef>
-                <a:spcPts val="0"/>
-              </a:spcBef>
-              <a:spcAft>
-                <a:spcPts val="0"/>
-              </a:spcAft>
-              <a:buClr>
-                <a:srgbClr val="FFFFFF"/>
-              </a:buClr>
-              <a:buSzPts val="1800"/>
-              <a:buFont typeface="Roboto Slab"/>
-              <a:buNone/>
-              <a:defRPr sz="1800" b="1" i="0" u="none" strike="noStrike" cap="none">
-                <a:solidFill>
-                  <a:srgbClr val="FFFFFF"/>
-                </a:solidFill>
-                <a:latin typeface="Roboto Slab"/>
-                <a:ea typeface="Roboto Slab"/>
-                <a:cs typeface="Roboto Slab"/>
-                <a:sym typeface="Roboto Slab"/>
-              </a:defRPr>
-            </a:lvl7pPr>
-            <a:lvl8pPr marR="0" lvl="7" algn="l" rtl="0">
-              <a:lnSpc>
-                <a:spcPct val="100000"/>
-              </a:lnSpc>
-              <a:spcBef>
-                <a:spcPts val="0"/>
-              </a:spcBef>
-              <a:spcAft>
-                <a:spcPts val="0"/>
-              </a:spcAft>
-              <a:buClr>
-                <a:srgbClr val="FFFFFF"/>
-              </a:buClr>
-              <a:buSzPts val="1800"/>
-              <a:buFont typeface="Roboto Slab"/>
-              <a:buNone/>
-              <a:defRPr sz="1800" b="1" i="0" u="none" strike="noStrike" cap="none">
-                <a:solidFill>
-                  <a:srgbClr val="FFFFFF"/>
-                </a:solidFill>
-                <a:latin typeface="Roboto Slab"/>
-                <a:ea typeface="Roboto Slab"/>
-                <a:cs typeface="Roboto Slab"/>
-                <a:sym typeface="Roboto Slab"/>
-              </a:defRPr>
-            </a:lvl8pPr>
-            <a:lvl9pPr marR="0" lvl="8" algn="l" rtl="0">
-              <a:lnSpc>
-                <a:spcPct val="100000"/>
-              </a:lnSpc>
-              <a:spcBef>
-                <a:spcPts val="0"/>
-              </a:spcBef>
-              <a:spcAft>
-                <a:spcPts val="0"/>
-              </a:spcAft>
-              <a:buClr>
-                <a:srgbClr val="FFFFFF"/>
-              </a:buClr>
-              <a:buSzPts val="1800"/>
-              <a:buFont typeface="Roboto Slab"/>
-              <a:buNone/>
-              <a:defRPr sz="1800" b="1" i="0" u="none" strike="noStrike" cap="none">
-                <a:solidFill>
-                  <a:srgbClr val="FFFFFF"/>
-                </a:solidFill>
-                <a:latin typeface="Roboto Slab"/>
-                <a:ea typeface="Roboto Slab"/>
-                <a:cs typeface="Roboto Slab"/>
-                <a:sym typeface="Roboto Slab"/>
-              </a:defRPr>
-            </a:lvl9pPr>
-          </a:lstStyle>
-          <a:p>
-            <a:r>
-              <a:rPr lang="en-US" dirty="0" smtClean="0">
-                <a:solidFill>
-                  <a:schemeClr val="tx1"/>
-                </a:solidFill>
-              </a:rPr>
-              <a:t>S</a:t>
-            </a:r>
-            <a:r>
-              <a:rPr lang="en-US" altLang="zh-TW" dirty="0" smtClean="0">
-                <a:solidFill>
-                  <a:schemeClr val="tx1"/>
-                </a:solidFill>
-              </a:rPr>
-              <a:t>D-Add Event</a:t>
-            </a:r>
-            <a:endParaRPr lang="en-US" dirty="0">
-              <a:solidFill>
-                <a:schemeClr val="tx1"/>
-              </a:solidFill>
-            </a:endParaRPr>
-          </a:p>
-        </p:txBody>
-      </p:sp>
-      <p:sp>
-        <p:nvSpPr>
-          <p:cNvPr id="15" name="Shape 111"/>
-          <p:cNvSpPr txBox="1">
-            <a:spLocks noGrp="1"/>
-          </p:cNvSpPr>
-          <p:nvPr>
-            <p:ph type="title"/>
-          </p:nvPr>
-        </p:nvSpPr>
-        <p:spPr>
-          <a:xfrm>
-            <a:off x="910799" y="504859"/>
-            <a:ext cx="4141592" cy="681850"/>
-          </a:xfrm>
-          <a:prstGeom prst="rect">
-            <a:avLst/>
-          </a:prstGeom>
-        </p:spPr>
-        <p:txBody>
-          <a:bodyPr spcFirstLastPara="1" wrap="square" lIns="91425" tIns="91425" rIns="91425" bIns="91425" anchor="ctr" anchorCtr="0">
-            <a:noAutofit/>
-          </a:bodyPr>
-          <a:lstStyle/>
-          <a:p>
-            <a:pPr marL="0" lvl="0" indent="0" rtl="0">
-              <a:spcBef>
-                <a:spcPts val="0"/>
-              </a:spcBef>
-              <a:spcAft>
-                <a:spcPts val="0"/>
-              </a:spcAft>
-              <a:buNone/>
-            </a:pPr>
-            <a:r>
-              <a:rPr lang="en-US" sz="2000" dirty="0" smtClean="0"/>
-              <a:t>Use Case </a:t>
-            </a:r>
-            <a:r>
-              <a:rPr lang="en-US" altLang="zh-TW" sz="2000" dirty="0" smtClean="0"/>
-              <a:t>R</a:t>
-            </a:r>
-            <a:r>
-              <a:rPr lang="en-US" sz="2000" dirty="0" smtClean="0"/>
-              <a:t>ealizations </a:t>
-            </a:r>
-            <a:br>
-              <a:rPr lang="en-US" sz="2000" dirty="0" smtClean="0"/>
-            </a:br>
-            <a:r>
-              <a:rPr lang="en-US" sz="2000" dirty="0"/>
-              <a:t>	</a:t>
-            </a:r>
-            <a:r>
-              <a:rPr lang="en-US" sz="2000" dirty="0" smtClean="0"/>
-              <a:t>with GRASP Patterns</a:t>
-            </a:r>
-            <a:endParaRPr sz="2000" dirty="0"/>
-          </a:p>
-        </p:txBody>
-      </p:sp>
-    </p:spTree>
-    <p:extLst>
-      <p:ext uri="{BB962C8B-B14F-4D97-AF65-F5344CB8AC3E}">
-        <p14:creationId xmlns:p14="http://schemas.microsoft.com/office/powerpoint/2010/main" val="1530335907"/>
       </p:ext>
     </p:extLst>
   </p:cSld>
@@ -19273,14 +19273,14 @@
                         </a:spcAft>
                       </a:pPr>
                       <a:r>
-                        <a:rPr lang="en-US" sz="1400" baseline="0">
+                        <a:rPr lang="en-US" sz="1400" baseline="0" dirty="0">
                           <a:effectLst/>
                           <a:latin typeface="Times New Roman" panose="02020603050405020304" pitchFamily="18" charset="0"/>
                           <a:ea typeface="標楷體" panose="03000509000000000000" pitchFamily="65" charset="-120"/>
                         </a:rPr>
                         <a:t>Use Case Name</a:t>
                       </a:r>
-                      <a:endParaRPr lang="zh-TW" sz="1400" baseline="0">
+                      <a:endParaRPr lang="zh-TW" sz="1400" baseline="0" dirty="0">
                         <a:solidFill>
                           <a:srgbClr val="00000A"/>
                         </a:solidFill>
@@ -19492,14 +19492,14 @@
                         </a:spcAft>
                       </a:pPr>
                       <a:r>
-                        <a:rPr lang="en-US" sz="1400" baseline="0">
+                        <a:rPr lang="en-US" sz="1400" baseline="0" dirty="0">
                           <a:effectLst/>
                           <a:latin typeface="Times New Roman" panose="02020603050405020304" pitchFamily="18" charset="0"/>
                           <a:ea typeface="標楷體" panose="03000509000000000000" pitchFamily="65" charset="-120"/>
                         </a:rPr>
                         <a:t>Primary Actor</a:t>
                       </a:r>
-                      <a:endParaRPr lang="zh-TW" sz="1400" baseline="0">
+                      <a:endParaRPr lang="zh-TW" sz="1400" baseline="0" dirty="0">
                         <a:solidFill>
                           <a:srgbClr val="00000A"/>
                         </a:solidFill>
@@ -20004,674 +20004,6 @@
           </a:p>
         </p:txBody>
       </p:sp>
-      <p:graphicFrame>
-        <p:nvGraphicFramePr>
-          <p:cNvPr id="2" name="表格 1"/>
-          <p:cNvGraphicFramePr>
-            <a:graphicFrameLocks noGrp="1"/>
-          </p:cNvGraphicFramePr>
-          <p:nvPr/>
-        </p:nvGraphicFramePr>
-        <p:xfrm>
-          <a:off x="868362" y="1860550"/>
-          <a:ext cx="7239318" cy="2665476"/>
-        </p:xfrm>
-        <a:graphic>
-          <a:graphicData uri="http://schemas.openxmlformats.org/drawingml/2006/table">
-            <a:tbl>
-              <a:tblPr firstRow="1" firstCol="1" bandRow="1">
-                <a:tableStyleId>{5BBF7210-B6BD-411A-9250-96871AA75DA7}</a:tableStyleId>
-              </a:tblPr>
-              <a:tblGrid>
-                <a:gridCol w="2690178">
-                  <a:extLst>
-                    <a:ext uri="{9D8B030D-6E8A-4147-A177-3AD203B41FA5}">
-                      <a16:colId xmlns:a16="http://schemas.microsoft.com/office/drawing/2014/main" val="3509931902"/>
-                    </a:ext>
-                  </a:extLst>
-                </a:gridCol>
-                <a:gridCol w="4549140">
-                  <a:extLst>
-                    <a:ext uri="{9D8B030D-6E8A-4147-A177-3AD203B41FA5}">
-                      <a16:colId xmlns:a16="http://schemas.microsoft.com/office/drawing/2014/main" val="3902675017"/>
-                    </a:ext>
-                  </a:extLst>
-                </a:gridCol>
-              </a:tblGrid>
-              <a:tr h="270383">
-                <a:tc>
-                  <a:txBody>
-                    <a:bodyPr/>
-                    <a:lstStyle/>
-                    <a:p>
-                      <a:pPr>
-                        <a:spcAft>
-                          <a:spcPts val="0"/>
-                        </a:spcAft>
-                      </a:pPr>
-                      <a:r>
-                        <a:rPr lang="en-US" sz="1200" baseline="0">
-                          <a:effectLst/>
-                          <a:latin typeface="Times New Roman" panose="02020603050405020304" pitchFamily="18" charset="0"/>
-                          <a:ea typeface="標楷體" panose="03000509000000000000" pitchFamily="65" charset="-120"/>
-                        </a:rPr>
-                        <a:t>Use Case ID</a:t>
-                      </a:r>
-                      <a:endParaRPr lang="zh-TW" sz="1200" baseline="0">
-                        <a:solidFill>
-                          <a:srgbClr val="00000A"/>
-                        </a:solidFill>
-                        <a:effectLst/>
-                        <a:latin typeface="Times New Roman" panose="02020603050405020304" pitchFamily="18" charset="0"/>
-                        <a:ea typeface="標楷體" panose="03000509000000000000" pitchFamily="65" charset="-120"/>
-                        <a:cs typeface="Calibri" panose="020F0502020204030204" pitchFamily="34" charset="0"/>
-                      </a:endParaRPr>
-                    </a:p>
-                  </a:txBody>
-                  <a:tcPr marL="65405" marR="68580" marT="0" marB="0" anchor="ctr"/>
-                </a:tc>
-                <a:tc>
-                  <a:txBody>
-                    <a:bodyPr/>
-                    <a:lstStyle/>
-                    <a:p>
-                      <a:pPr marL="0" lvl="0" indent="0">
-                        <a:spcAft>
-                          <a:spcPts val="0"/>
-                        </a:spcAft>
-                        <a:buFont typeface="+mj-lt"/>
-                        <a:buNone/>
-                      </a:pPr>
-                      <a:r>
-                        <a:rPr lang="en-US" altLang="zh-TW" sz="1200" baseline="0" dirty="0" smtClean="0">
-                          <a:effectLst/>
-                          <a:latin typeface="Times New Roman" panose="02020603050405020304" pitchFamily="18" charset="0"/>
-                          <a:ea typeface="標楷體" panose="03000509000000000000" pitchFamily="65" charset="-120"/>
-                        </a:rPr>
-                        <a:t>2. </a:t>
-                      </a:r>
-                      <a:endParaRPr lang="zh-TW" altLang="zh-TW" sz="1200" baseline="0" dirty="0">
-                        <a:solidFill>
-                          <a:srgbClr val="00000A"/>
-                        </a:solidFill>
-                        <a:effectLst/>
-                        <a:latin typeface="Times New Roman" panose="02020603050405020304" pitchFamily="18" charset="0"/>
-                        <a:ea typeface="標楷體" panose="03000509000000000000" pitchFamily="65" charset="-120"/>
-                        <a:cs typeface="Calibri" panose="020F0502020204030204" pitchFamily="34" charset="0"/>
-                      </a:endParaRPr>
-                    </a:p>
-                  </a:txBody>
-                  <a:tcPr marL="65405" marR="68580" marT="0" marB="0" anchor="ctr"/>
-                </a:tc>
-                <a:extLst>
-                  <a:ext uri="{0D108BD9-81ED-4DB2-BD59-A6C34878D82A}">
-                    <a16:rowId xmlns:a16="http://schemas.microsoft.com/office/drawing/2014/main" val="2518501439"/>
-                  </a:ext>
-                </a:extLst>
-              </a:tr>
-              <a:tr h="270383">
-                <a:tc>
-                  <a:txBody>
-                    <a:bodyPr/>
-                    <a:lstStyle/>
-                    <a:p>
-                      <a:pPr>
-                        <a:spcAft>
-                          <a:spcPts val="0"/>
-                        </a:spcAft>
-                      </a:pPr>
-                      <a:r>
-                        <a:rPr lang="en-US" sz="1200" baseline="0">
-                          <a:effectLst/>
-                          <a:latin typeface="Times New Roman" panose="02020603050405020304" pitchFamily="18" charset="0"/>
-                          <a:ea typeface="標楷體" panose="03000509000000000000" pitchFamily="65" charset="-120"/>
-                        </a:rPr>
-                        <a:t>Use Case Name</a:t>
-                      </a:r>
-                      <a:endParaRPr lang="zh-TW" sz="1200" baseline="0">
-                        <a:solidFill>
-                          <a:srgbClr val="00000A"/>
-                        </a:solidFill>
-                        <a:effectLst/>
-                        <a:latin typeface="Times New Roman" panose="02020603050405020304" pitchFamily="18" charset="0"/>
-                        <a:ea typeface="標楷體" panose="03000509000000000000" pitchFamily="65" charset="-120"/>
-                        <a:cs typeface="Calibri" panose="020F0502020204030204" pitchFamily="34" charset="0"/>
-                      </a:endParaRPr>
-                    </a:p>
-                  </a:txBody>
-                  <a:tcPr marL="65405" marR="68580" marT="0" marB="0" anchor="ctr"/>
-                </a:tc>
-                <a:tc>
-                  <a:txBody>
-                    <a:bodyPr/>
-                    <a:lstStyle/>
-                    <a:p>
-                      <a:pPr>
-                        <a:spcAft>
-                          <a:spcPts val="0"/>
-                        </a:spcAft>
-                      </a:pPr>
-                      <a:r>
-                        <a:rPr lang="zh-TW" sz="1200" baseline="0" dirty="0">
-                          <a:effectLst/>
-                          <a:latin typeface="Times New Roman" panose="02020603050405020304" pitchFamily="18" charset="0"/>
-                          <a:ea typeface="標楷體" panose="03000509000000000000" pitchFamily="65" charset="-120"/>
-                        </a:rPr>
-                        <a:t>管理類別。</a:t>
-                      </a:r>
-                      <a:endParaRPr lang="zh-TW" sz="1200" baseline="0" dirty="0">
-                        <a:solidFill>
-                          <a:srgbClr val="00000A"/>
-                        </a:solidFill>
-                        <a:effectLst/>
-                        <a:latin typeface="Times New Roman" panose="02020603050405020304" pitchFamily="18" charset="0"/>
-                        <a:ea typeface="標楷體" panose="03000509000000000000" pitchFamily="65" charset="-120"/>
-                        <a:cs typeface="Calibri" panose="020F0502020204030204" pitchFamily="34" charset="0"/>
-                      </a:endParaRPr>
-                    </a:p>
-                  </a:txBody>
-                  <a:tcPr marL="65405" marR="68580" marT="0" marB="0" anchor="ctr"/>
-                </a:tc>
-                <a:extLst>
-                  <a:ext uri="{0D108BD9-81ED-4DB2-BD59-A6C34878D82A}">
-                    <a16:rowId xmlns:a16="http://schemas.microsoft.com/office/drawing/2014/main" val="240785887"/>
-                  </a:ext>
-                </a:extLst>
-              </a:tr>
-              <a:tr h="270383">
-                <a:tc>
-                  <a:txBody>
-                    <a:bodyPr/>
-                    <a:lstStyle/>
-                    <a:p>
-                      <a:pPr>
-                        <a:spcAft>
-                          <a:spcPts val="0"/>
-                        </a:spcAft>
-                      </a:pPr>
-                      <a:r>
-                        <a:rPr lang="en-US" sz="1200" baseline="0" dirty="0">
-                          <a:effectLst/>
-                          <a:latin typeface="Times New Roman" panose="02020603050405020304" pitchFamily="18" charset="0"/>
-                          <a:ea typeface="標楷體" panose="03000509000000000000" pitchFamily="65" charset="-120"/>
-                        </a:rPr>
-                        <a:t>Scope</a:t>
-                      </a:r>
-                      <a:endParaRPr lang="zh-TW" sz="1200" baseline="0" dirty="0">
-                        <a:solidFill>
-                          <a:srgbClr val="00000A"/>
-                        </a:solidFill>
-                        <a:effectLst/>
-                        <a:latin typeface="Times New Roman" panose="02020603050405020304" pitchFamily="18" charset="0"/>
-                        <a:ea typeface="標楷體" panose="03000509000000000000" pitchFamily="65" charset="-120"/>
-                        <a:cs typeface="Calibri" panose="020F0502020204030204" pitchFamily="34" charset="0"/>
-                      </a:endParaRPr>
-                    </a:p>
-                  </a:txBody>
-                  <a:tcPr marL="65405" marR="68580" marT="0" marB="0" anchor="ctr"/>
-                </a:tc>
-                <a:tc>
-                  <a:txBody>
-                    <a:bodyPr/>
-                    <a:lstStyle/>
-                    <a:p>
-                      <a:pPr>
-                        <a:spcAft>
-                          <a:spcPts val="0"/>
-                        </a:spcAft>
-                      </a:pPr>
-                      <a:r>
-                        <a:rPr lang="en-US" sz="1200" baseline="0">
-                          <a:effectLst/>
-                          <a:latin typeface="Times New Roman" panose="02020603050405020304" pitchFamily="18" charset="0"/>
-                          <a:ea typeface="標楷體" panose="03000509000000000000" pitchFamily="65" charset="-120"/>
-                        </a:rPr>
-                        <a:t>Timelog System.</a:t>
-                      </a:r>
-                      <a:endParaRPr lang="zh-TW" sz="1200" baseline="0">
-                        <a:solidFill>
-                          <a:srgbClr val="00000A"/>
-                        </a:solidFill>
-                        <a:effectLst/>
-                        <a:latin typeface="Times New Roman" panose="02020603050405020304" pitchFamily="18" charset="0"/>
-                        <a:ea typeface="標楷體" panose="03000509000000000000" pitchFamily="65" charset="-120"/>
-                        <a:cs typeface="Calibri" panose="020F0502020204030204" pitchFamily="34" charset="0"/>
-                      </a:endParaRPr>
-                    </a:p>
-                  </a:txBody>
-                  <a:tcPr marL="65405" marR="68580" marT="0" marB="0" anchor="ctr"/>
-                </a:tc>
-                <a:extLst>
-                  <a:ext uri="{0D108BD9-81ED-4DB2-BD59-A6C34878D82A}">
-                    <a16:rowId xmlns:a16="http://schemas.microsoft.com/office/drawing/2014/main" val="4130174878"/>
-                  </a:ext>
-                </a:extLst>
-              </a:tr>
-              <a:tr h="270383">
-                <a:tc>
-                  <a:txBody>
-                    <a:bodyPr/>
-                    <a:lstStyle/>
-                    <a:p>
-                      <a:pPr>
-                        <a:spcAft>
-                          <a:spcPts val="0"/>
-                        </a:spcAft>
-                      </a:pPr>
-                      <a:r>
-                        <a:rPr lang="en-US" sz="1200" baseline="0">
-                          <a:effectLst/>
-                          <a:latin typeface="Times New Roman" panose="02020603050405020304" pitchFamily="18" charset="0"/>
-                          <a:ea typeface="標楷體" panose="03000509000000000000" pitchFamily="65" charset="-120"/>
-                        </a:rPr>
-                        <a:t>Level</a:t>
-                      </a:r>
-                      <a:endParaRPr lang="zh-TW" sz="1200" baseline="0">
-                        <a:solidFill>
-                          <a:srgbClr val="00000A"/>
-                        </a:solidFill>
-                        <a:effectLst/>
-                        <a:latin typeface="Times New Roman" panose="02020603050405020304" pitchFamily="18" charset="0"/>
-                        <a:ea typeface="標楷體" panose="03000509000000000000" pitchFamily="65" charset="-120"/>
-                        <a:cs typeface="Calibri" panose="020F0502020204030204" pitchFamily="34" charset="0"/>
-                      </a:endParaRPr>
-                    </a:p>
-                  </a:txBody>
-                  <a:tcPr marL="65405" marR="68580" marT="0" marB="0" anchor="ctr"/>
-                </a:tc>
-                <a:tc>
-                  <a:txBody>
-                    <a:bodyPr/>
-                    <a:lstStyle/>
-                    <a:p>
-                      <a:pPr>
-                        <a:spcAft>
-                          <a:spcPts val="0"/>
-                        </a:spcAft>
-                      </a:pPr>
-                      <a:r>
-                        <a:rPr lang="en-US" sz="1200" baseline="0" dirty="0">
-                          <a:effectLst/>
-                          <a:latin typeface="Times New Roman" panose="02020603050405020304" pitchFamily="18" charset="0"/>
-                          <a:ea typeface="標楷體" panose="03000509000000000000" pitchFamily="65" charset="-120"/>
-                        </a:rPr>
-                        <a:t>User goal.</a:t>
-                      </a:r>
-                      <a:endParaRPr lang="zh-TW" sz="1200" baseline="0" dirty="0">
-                        <a:solidFill>
-                          <a:srgbClr val="00000A"/>
-                        </a:solidFill>
-                        <a:effectLst/>
-                        <a:latin typeface="Times New Roman" panose="02020603050405020304" pitchFamily="18" charset="0"/>
-                        <a:ea typeface="標楷體" panose="03000509000000000000" pitchFamily="65" charset="-120"/>
-                        <a:cs typeface="Calibri" panose="020F0502020204030204" pitchFamily="34" charset="0"/>
-                      </a:endParaRPr>
-                    </a:p>
-                  </a:txBody>
-                  <a:tcPr marL="65405" marR="68580" marT="0" marB="0" anchor="ctr"/>
-                </a:tc>
-                <a:extLst>
-                  <a:ext uri="{0D108BD9-81ED-4DB2-BD59-A6C34878D82A}">
-                    <a16:rowId xmlns:a16="http://schemas.microsoft.com/office/drawing/2014/main" val="2437475773"/>
-                  </a:ext>
-                </a:extLst>
-              </a:tr>
-              <a:tr h="270383">
-                <a:tc>
-                  <a:txBody>
-                    <a:bodyPr/>
-                    <a:lstStyle/>
-                    <a:p>
-                      <a:pPr>
-                        <a:spcAft>
-                          <a:spcPts val="0"/>
-                        </a:spcAft>
-                      </a:pPr>
-                      <a:r>
-                        <a:rPr lang="en-US" sz="1200" baseline="0" dirty="0">
-                          <a:effectLst/>
-                          <a:latin typeface="Times New Roman" panose="02020603050405020304" pitchFamily="18" charset="0"/>
-                          <a:ea typeface="標楷體" panose="03000509000000000000" pitchFamily="65" charset="-120"/>
-                        </a:rPr>
-                        <a:t>Primary Actor</a:t>
-                      </a:r>
-                      <a:endParaRPr lang="zh-TW" sz="1200" baseline="0" dirty="0">
-                        <a:solidFill>
-                          <a:srgbClr val="00000A"/>
-                        </a:solidFill>
-                        <a:effectLst/>
-                        <a:latin typeface="Times New Roman" panose="02020603050405020304" pitchFamily="18" charset="0"/>
-                        <a:ea typeface="標楷體" panose="03000509000000000000" pitchFamily="65" charset="-120"/>
-                        <a:cs typeface="Calibri" panose="020F0502020204030204" pitchFamily="34" charset="0"/>
-                      </a:endParaRPr>
-                    </a:p>
-                  </a:txBody>
-                  <a:tcPr marL="65405" marR="68580" marT="0" marB="0" anchor="ctr"/>
-                </a:tc>
-                <a:tc>
-                  <a:txBody>
-                    <a:bodyPr/>
-                    <a:lstStyle/>
-                    <a:p>
-                      <a:pPr>
-                        <a:spcAft>
-                          <a:spcPts val="0"/>
-                        </a:spcAft>
-                      </a:pPr>
-                      <a:r>
-                        <a:rPr lang="en-US" sz="1200" baseline="0" dirty="0">
-                          <a:effectLst/>
-                          <a:latin typeface="Times New Roman" panose="02020603050405020304" pitchFamily="18" charset="0"/>
-                          <a:ea typeface="標楷體" panose="03000509000000000000" pitchFamily="65" charset="-120"/>
-                        </a:rPr>
-                        <a:t>User.</a:t>
-                      </a:r>
-                      <a:endParaRPr lang="zh-TW" sz="1200" baseline="0" dirty="0">
-                        <a:solidFill>
-                          <a:srgbClr val="00000A"/>
-                        </a:solidFill>
-                        <a:effectLst/>
-                        <a:latin typeface="Times New Roman" panose="02020603050405020304" pitchFamily="18" charset="0"/>
-                        <a:ea typeface="標楷體" panose="03000509000000000000" pitchFamily="65" charset="-120"/>
-                        <a:cs typeface="Calibri" panose="020F0502020204030204" pitchFamily="34" charset="0"/>
-                      </a:endParaRPr>
-                    </a:p>
-                  </a:txBody>
-                  <a:tcPr marL="65405" marR="68580" marT="0" marB="0" anchor="ctr"/>
-                </a:tc>
-                <a:extLst>
-                  <a:ext uri="{0D108BD9-81ED-4DB2-BD59-A6C34878D82A}">
-                    <a16:rowId xmlns:a16="http://schemas.microsoft.com/office/drawing/2014/main" val="1136033829"/>
-                  </a:ext>
-                </a:extLst>
-              </a:tr>
-              <a:tr h="346075">
-                <a:tc>
-                  <a:txBody>
-                    <a:bodyPr/>
-                    <a:lstStyle/>
-                    <a:p>
-                      <a:pPr>
-                        <a:spcAft>
-                          <a:spcPts val="0"/>
-                        </a:spcAft>
-                      </a:pPr>
-                      <a:r>
-                        <a:rPr lang="en-US" sz="1200" baseline="0" dirty="0">
-                          <a:effectLst/>
-                          <a:latin typeface="Times New Roman" panose="02020603050405020304" pitchFamily="18" charset="0"/>
-                          <a:ea typeface="標楷體" panose="03000509000000000000" pitchFamily="65" charset="-120"/>
-                        </a:rPr>
-                        <a:t>Stakeholders and Interests</a:t>
-                      </a:r>
-                      <a:endParaRPr lang="zh-TW" sz="1200" baseline="0" dirty="0">
-                        <a:solidFill>
-                          <a:srgbClr val="00000A"/>
-                        </a:solidFill>
-                        <a:effectLst/>
-                        <a:latin typeface="Times New Roman" panose="02020603050405020304" pitchFamily="18" charset="0"/>
-                        <a:ea typeface="標楷體" panose="03000509000000000000" pitchFamily="65" charset="-120"/>
-                        <a:cs typeface="Calibri" panose="020F0502020204030204" pitchFamily="34" charset="0"/>
-                      </a:endParaRPr>
-                    </a:p>
-                  </a:txBody>
-                  <a:tcPr marL="65405" marR="68580" marT="0" marB="0" anchor="ctr"/>
-                </a:tc>
-                <a:tc>
-                  <a:txBody>
-                    <a:bodyPr/>
-                    <a:lstStyle/>
-                    <a:p>
-                      <a:pPr>
-                        <a:spcAft>
-                          <a:spcPts val="0"/>
-                        </a:spcAft>
-                      </a:pPr>
-                      <a:r>
-                        <a:rPr lang="en-US" sz="1200" baseline="0" dirty="0">
-                          <a:effectLst/>
-                          <a:latin typeface="Times New Roman" panose="02020603050405020304" pitchFamily="18" charset="0"/>
-                          <a:ea typeface="標楷體" panose="03000509000000000000" pitchFamily="65" charset="-120"/>
-                        </a:rPr>
-                        <a:t>User</a:t>
-                      </a:r>
-                      <a:r>
-                        <a:rPr lang="zh-TW" sz="1200" baseline="0" dirty="0">
-                          <a:effectLst/>
-                          <a:latin typeface="Times New Roman" panose="02020603050405020304" pitchFamily="18" charset="0"/>
-                          <a:ea typeface="標楷體" panose="03000509000000000000" pitchFamily="65" charset="-120"/>
-                        </a:rPr>
-                        <a:t>：使用者想管理類別</a:t>
-                      </a:r>
-                      <a:r>
-                        <a:rPr lang="zh-TW" sz="1200" baseline="0" dirty="0" smtClean="0">
-                          <a:effectLst/>
-                          <a:latin typeface="Times New Roman" panose="02020603050405020304" pitchFamily="18" charset="0"/>
-                          <a:ea typeface="標楷體" panose="03000509000000000000" pitchFamily="65" charset="-120"/>
-                        </a:rPr>
-                        <a:t>。</a:t>
-                      </a:r>
-                      <a:endParaRPr lang="zh-TW" sz="1200" baseline="0" dirty="0">
-                        <a:solidFill>
-                          <a:srgbClr val="00000A"/>
-                        </a:solidFill>
-                        <a:effectLst/>
-                        <a:latin typeface="Times New Roman" panose="02020603050405020304" pitchFamily="18" charset="0"/>
-                        <a:ea typeface="標楷體" panose="03000509000000000000" pitchFamily="65" charset="-120"/>
-                        <a:cs typeface="Calibri" panose="020F0502020204030204" pitchFamily="34" charset="0"/>
-                      </a:endParaRPr>
-                    </a:p>
-                  </a:txBody>
-                  <a:tcPr marL="65405" marR="68580" marT="0" marB="0" anchor="ctr"/>
-                </a:tc>
-                <a:extLst>
-                  <a:ext uri="{0D108BD9-81ED-4DB2-BD59-A6C34878D82A}">
-                    <a16:rowId xmlns:a16="http://schemas.microsoft.com/office/drawing/2014/main" val="3423073543"/>
-                  </a:ext>
-                </a:extLst>
-              </a:tr>
-              <a:tr h="270383">
-                <a:tc>
-                  <a:txBody>
-                    <a:bodyPr/>
-                    <a:lstStyle/>
-                    <a:p>
-                      <a:pPr>
-                        <a:spcAft>
-                          <a:spcPts val="0"/>
-                        </a:spcAft>
-                      </a:pPr>
-                      <a:r>
-                        <a:rPr lang="en-US" sz="1200" baseline="0">
-                          <a:effectLst/>
-                          <a:latin typeface="Times New Roman" panose="02020603050405020304" pitchFamily="18" charset="0"/>
-                          <a:ea typeface="標楷體" panose="03000509000000000000" pitchFamily="65" charset="-120"/>
-                        </a:rPr>
-                        <a:t>Preconditions</a:t>
-                      </a:r>
-                      <a:endParaRPr lang="zh-TW" sz="1200" baseline="0">
-                        <a:solidFill>
-                          <a:srgbClr val="00000A"/>
-                        </a:solidFill>
-                        <a:effectLst/>
-                        <a:latin typeface="Times New Roman" panose="02020603050405020304" pitchFamily="18" charset="0"/>
-                        <a:ea typeface="標楷體" panose="03000509000000000000" pitchFamily="65" charset="-120"/>
-                        <a:cs typeface="Calibri" panose="020F0502020204030204" pitchFamily="34" charset="0"/>
-                      </a:endParaRPr>
-                    </a:p>
-                  </a:txBody>
-                  <a:tcPr marL="65405" marR="68580" marT="0" marB="0" anchor="ctr"/>
-                </a:tc>
-                <a:tc>
-                  <a:txBody>
-                    <a:bodyPr/>
-                    <a:lstStyle/>
-                    <a:p>
-                      <a:pPr lvl="0"/>
-                      <a:r>
-                        <a:rPr lang="en-US" altLang="zh-TW" sz="1400" b="0" i="0" u="none" strike="noStrike" cap="none" baseline="0" dirty="0" smtClean="0">
-                          <a:solidFill>
-                            <a:srgbClr val="000000"/>
-                          </a:solidFill>
-                          <a:effectLst/>
-                          <a:latin typeface="Times New Roman" panose="02020603050405020304" pitchFamily="18" charset="0"/>
-                          <a:ea typeface="標楷體" panose="03000509000000000000" pitchFamily="65" charset="-120"/>
-                          <a:cs typeface="Arial"/>
-                          <a:sym typeface="Arial"/>
-                        </a:rPr>
-                        <a:t>1. </a:t>
-                      </a:r>
-                      <a:r>
-                        <a:rPr lang="zh-TW" altLang="zh-TW" sz="1400" b="0" i="0" u="none" strike="noStrike" cap="none" baseline="0" dirty="0" smtClean="0">
-                          <a:solidFill>
-                            <a:srgbClr val="000000"/>
-                          </a:solidFill>
-                          <a:effectLst/>
-                          <a:latin typeface="Times New Roman" panose="02020603050405020304" pitchFamily="18" charset="0"/>
-                          <a:ea typeface="標楷體" panose="03000509000000000000" pitchFamily="65" charset="-120"/>
-                          <a:cs typeface="Arial"/>
-                          <a:sym typeface="Arial"/>
-                        </a:rPr>
-                        <a:t>登入系統</a:t>
-                      </a:r>
-                      <a:r>
-                        <a:rPr lang="zh-TW" altLang="zh-TW" sz="1400" baseline="0" dirty="0" smtClean="0">
-                          <a:effectLst/>
-                          <a:latin typeface="Times New Roman" panose="02020603050405020304" pitchFamily="18" charset="0"/>
-                          <a:ea typeface="標楷體" panose="03000509000000000000" pitchFamily="65" charset="-120"/>
-                        </a:rPr>
-                        <a:t>。</a:t>
-                      </a:r>
-                      <a:endParaRPr lang="zh-TW" altLang="zh-TW" sz="1400" b="0" i="0" u="none" strike="noStrike" cap="none" baseline="0" dirty="0" smtClean="0">
-                        <a:solidFill>
-                          <a:srgbClr val="000000"/>
-                        </a:solidFill>
-                        <a:effectLst/>
-                        <a:latin typeface="Times New Roman" panose="02020603050405020304" pitchFamily="18" charset="0"/>
-                        <a:ea typeface="標楷體" panose="03000509000000000000" pitchFamily="65" charset="-120"/>
-                        <a:cs typeface="Arial"/>
-                        <a:sym typeface="Arial"/>
-                      </a:endParaRPr>
-                    </a:p>
-                    <a:p>
-                      <a:r>
-                        <a:rPr lang="en-US" altLang="zh-TW" sz="1400" b="0" i="0" u="none" strike="noStrike" cap="none" baseline="0" dirty="0" smtClean="0">
-                          <a:solidFill>
-                            <a:srgbClr val="000000"/>
-                          </a:solidFill>
-                          <a:effectLst/>
-                          <a:latin typeface="Times New Roman" panose="02020603050405020304" pitchFamily="18" charset="0"/>
-                          <a:ea typeface="標楷體" panose="03000509000000000000" pitchFamily="65" charset="-120"/>
-                          <a:cs typeface="Arial"/>
-                          <a:sym typeface="Arial"/>
-                        </a:rPr>
-                        <a:t>2. </a:t>
-                      </a:r>
-                      <a:r>
-                        <a:rPr lang="zh-TW" altLang="zh-TW" sz="1400" b="0" i="0" u="none" strike="noStrike" cap="none" baseline="0" dirty="0" smtClean="0">
-                          <a:solidFill>
-                            <a:srgbClr val="000000"/>
-                          </a:solidFill>
-                          <a:effectLst/>
-                          <a:latin typeface="Times New Roman" panose="02020603050405020304" pitchFamily="18" charset="0"/>
-                          <a:ea typeface="標楷體" panose="03000509000000000000" pitchFamily="65" charset="-120"/>
-                          <a:cs typeface="Arial"/>
-                          <a:sym typeface="Arial"/>
-                        </a:rPr>
-                        <a:t>修改與刪除至少一筆事件。</a:t>
-                      </a:r>
-                      <a:endParaRPr lang="zh-TW" sz="1200" baseline="0" dirty="0">
-                        <a:solidFill>
-                          <a:srgbClr val="00000A"/>
-                        </a:solidFill>
-                        <a:effectLst/>
-                        <a:latin typeface="Times New Roman" panose="02020603050405020304" pitchFamily="18" charset="0"/>
-                        <a:ea typeface="標楷體" panose="03000509000000000000" pitchFamily="65" charset="-120"/>
-                        <a:cs typeface="Calibri" panose="020F0502020204030204" pitchFamily="34" charset="0"/>
-                      </a:endParaRPr>
-                    </a:p>
-                  </a:txBody>
-                  <a:tcPr marL="65405" marR="68580" marT="0" marB="0" anchor="ctr"/>
-                </a:tc>
-                <a:extLst>
-                  <a:ext uri="{0D108BD9-81ED-4DB2-BD59-A6C34878D82A}">
-                    <a16:rowId xmlns:a16="http://schemas.microsoft.com/office/drawing/2014/main" val="699971411"/>
-                  </a:ext>
-                </a:extLst>
-              </a:tr>
-              <a:tr h="540766">
-                <a:tc>
-                  <a:txBody>
-                    <a:bodyPr/>
-                    <a:lstStyle/>
-                    <a:p>
-                      <a:pPr>
-                        <a:spcAft>
-                          <a:spcPts val="0"/>
-                        </a:spcAft>
-                      </a:pPr>
-                      <a:r>
-                        <a:rPr lang="en-US" sz="1200" baseline="0">
-                          <a:effectLst/>
-                          <a:latin typeface="Times New Roman" panose="02020603050405020304" pitchFamily="18" charset="0"/>
-                          <a:ea typeface="標楷體" panose="03000509000000000000" pitchFamily="65" charset="-120"/>
-                        </a:rPr>
-                        <a:t>Success Guarantee</a:t>
-                      </a:r>
-                      <a:endParaRPr lang="zh-TW" sz="1200" baseline="0">
-                        <a:solidFill>
-                          <a:srgbClr val="00000A"/>
-                        </a:solidFill>
-                        <a:effectLst/>
-                        <a:latin typeface="Times New Roman" panose="02020603050405020304" pitchFamily="18" charset="0"/>
-                        <a:ea typeface="標楷體" panose="03000509000000000000" pitchFamily="65" charset="-120"/>
-                        <a:cs typeface="Calibri" panose="020F0502020204030204" pitchFamily="34" charset="0"/>
-                      </a:endParaRPr>
-                    </a:p>
-                  </a:txBody>
-                  <a:tcPr marL="65405" marR="68580" marT="0" marB="0" anchor="ctr"/>
-                </a:tc>
-                <a:tc>
-                  <a:txBody>
-                    <a:bodyPr/>
-                    <a:lstStyle/>
-                    <a:p>
-                      <a:pPr>
-                        <a:spcAft>
-                          <a:spcPts val="0"/>
-                        </a:spcAft>
-                      </a:pPr>
-                      <a:r>
-                        <a:rPr lang="zh-TW" sz="1200" baseline="0" dirty="0">
-                          <a:effectLst/>
-                          <a:latin typeface="Times New Roman" panose="02020603050405020304" pitchFamily="18" charset="0"/>
-                          <a:ea typeface="標楷體" panose="03000509000000000000" pitchFamily="65" charset="-120"/>
-                        </a:rPr>
-                        <a:t>系統成功更新類別清單。</a:t>
-                      </a:r>
-                      <a:endParaRPr lang="zh-TW" sz="1200" baseline="0" dirty="0">
-                        <a:solidFill>
-                          <a:srgbClr val="00000A"/>
-                        </a:solidFill>
-                        <a:effectLst/>
-                        <a:latin typeface="Times New Roman" panose="02020603050405020304" pitchFamily="18" charset="0"/>
-                        <a:ea typeface="標楷體" panose="03000509000000000000" pitchFamily="65" charset="-120"/>
-                        <a:cs typeface="Calibri" panose="020F0502020204030204" pitchFamily="34" charset="0"/>
-                      </a:endParaRPr>
-                    </a:p>
-                  </a:txBody>
-                  <a:tcPr marL="65405" marR="68580" marT="0" marB="0" anchor="ctr"/>
-                </a:tc>
-                <a:extLst>
-                  <a:ext uri="{0D108BD9-81ED-4DB2-BD59-A6C34878D82A}">
-                    <a16:rowId xmlns:a16="http://schemas.microsoft.com/office/drawing/2014/main" val="286987430"/>
-                  </a:ext>
-                </a:extLst>
-              </a:tr>
-            </a:tbl>
-          </a:graphicData>
-        </a:graphic>
-      </p:graphicFrame>
       <p:sp>
         <p:nvSpPr>
           <p:cNvPr id="6" name="投影片編號版面配置區 5"/>
@@ -20695,6 +20027,620 @@
           </a:p>
         </p:txBody>
       </p:sp>
+      <p:graphicFrame>
+        <p:nvGraphicFramePr>
+          <p:cNvPr id="4" name="表格 3"/>
+          <p:cNvGraphicFramePr>
+            <a:graphicFrameLocks noGrp="1"/>
+          </p:cNvGraphicFramePr>
+          <p:nvPr>
+            <p:extLst>
+              <p:ext uri="{D42A27DB-BD31-4B8C-83A1-F6EECF244321}">
+                <p14:modId xmlns:p14="http://schemas.microsoft.com/office/powerpoint/2010/main" val="396248604"/>
+              </p:ext>
+            </p:extLst>
+          </p:nvPr>
+        </p:nvGraphicFramePr>
+        <p:xfrm>
+          <a:off x="616227" y="1928189"/>
+          <a:ext cx="8269356" cy="2166731"/>
+        </p:xfrm>
+        <a:graphic>
+          <a:graphicData uri="http://schemas.openxmlformats.org/drawingml/2006/table">
+            <a:tbl>
+              <a:tblPr firstRow="1" firstCol="1" bandRow="1">
+                <a:tableStyleId>{5BBF7210-B6BD-411A-9250-96871AA75DA7}</a:tableStyleId>
+              </a:tblPr>
+              <a:tblGrid>
+                <a:gridCol w="2112748">
+                  <a:extLst>
+                    <a:ext uri="{9D8B030D-6E8A-4147-A177-3AD203B41FA5}">
+                      <a16:colId xmlns:a16="http://schemas.microsoft.com/office/drawing/2014/main" val="3763191059"/>
+                    </a:ext>
+                  </a:extLst>
+                </a:gridCol>
+                <a:gridCol w="6156608">
+                  <a:extLst>
+                    <a:ext uri="{9D8B030D-6E8A-4147-A177-3AD203B41FA5}">
+                      <a16:colId xmlns:a16="http://schemas.microsoft.com/office/drawing/2014/main" val="2262190799"/>
+                    </a:ext>
+                  </a:extLst>
+                </a:gridCol>
+              </a:tblGrid>
+              <a:tr h="240748">
+                <a:tc>
+                  <a:txBody>
+                    <a:bodyPr/>
+                    <a:lstStyle/>
+                    <a:p>
+                      <a:pPr>
+                        <a:spcAft>
+                          <a:spcPts val="0"/>
+                        </a:spcAft>
+                      </a:pPr>
+                      <a:r>
+                        <a:rPr lang="en-US" sz="1400" baseline="0" dirty="0">
+                          <a:effectLst/>
+                          <a:latin typeface="Times New Roman" panose="02020603050405020304" pitchFamily="18" charset="0"/>
+                          <a:ea typeface="標楷體" panose="03000509000000000000" pitchFamily="65" charset="-120"/>
+                        </a:rPr>
+                        <a:t>Use Case ID</a:t>
+                      </a:r>
+                      <a:endParaRPr lang="zh-TW" sz="1400" baseline="0" dirty="0">
+                        <a:solidFill>
+                          <a:srgbClr val="00000A"/>
+                        </a:solidFill>
+                        <a:effectLst/>
+                        <a:latin typeface="Times New Roman" panose="02020603050405020304" pitchFamily="18" charset="0"/>
+                        <a:ea typeface="標楷體" panose="03000509000000000000" pitchFamily="65" charset="-120"/>
+                        <a:cs typeface="Calibri" panose="020F0502020204030204" pitchFamily="34" charset="0"/>
+                      </a:endParaRPr>
+                    </a:p>
+                  </a:txBody>
+                  <a:tcPr marL="41845" marR="43877" marT="0" marB="0"/>
+                </a:tc>
+                <a:tc>
+                  <a:txBody>
+                    <a:bodyPr/>
+                    <a:lstStyle/>
+                    <a:p>
+                      <a:pPr marL="0" lvl="0" indent="0">
+                        <a:spcAft>
+                          <a:spcPts val="0"/>
+                        </a:spcAft>
+                        <a:buFont typeface="+mj-lt"/>
+                        <a:buNone/>
+                      </a:pPr>
+                      <a:r>
+                        <a:rPr lang="en-US" sz="1400" baseline="0" dirty="0" smtClean="0">
+                          <a:effectLst/>
+                          <a:latin typeface="Times New Roman" panose="02020603050405020304" pitchFamily="18" charset="0"/>
+                          <a:ea typeface="標楷體" panose="03000509000000000000" pitchFamily="65" charset="-120"/>
+                        </a:rPr>
+                        <a:t>2.</a:t>
+                      </a:r>
+                      <a:r>
+                        <a:rPr lang="en-US" sz="1400" baseline="0" dirty="0">
+                          <a:effectLst/>
+                          <a:latin typeface="Times New Roman" panose="02020603050405020304" pitchFamily="18" charset="0"/>
+                          <a:ea typeface="標楷體" panose="03000509000000000000" pitchFamily="65" charset="-120"/>
+                        </a:rPr>
+                        <a:t> </a:t>
+                      </a:r>
+                      <a:endParaRPr lang="zh-TW" sz="1400" baseline="0" dirty="0">
+                        <a:solidFill>
+                          <a:srgbClr val="00000A"/>
+                        </a:solidFill>
+                        <a:effectLst/>
+                        <a:latin typeface="Times New Roman" panose="02020603050405020304" pitchFamily="18" charset="0"/>
+                        <a:ea typeface="標楷體" panose="03000509000000000000" pitchFamily="65" charset="-120"/>
+                        <a:cs typeface="Calibri" panose="020F0502020204030204" pitchFamily="34" charset="0"/>
+                      </a:endParaRPr>
+                    </a:p>
+                  </a:txBody>
+                  <a:tcPr marL="41845" marR="43877" marT="0" marB="0"/>
+                </a:tc>
+                <a:extLst>
+                  <a:ext uri="{0D108BD9-81ED-4DB2-BD59-A6C34878D82A}">
+                    <a16:rowId xmlns:a16="http://schemas.microsoft.com/office/drawing/2014/main" val="2753470445"/>
+                  </a:ext>
+                </a:extLst>
+              </a:tr>
+              <a:tr h="240748">
+                <a:tc>
+                  <a:txBody>
+                    <a:bodyPr/>
+                    <a:lstStyle/>
+                    <a:p>
+                      <a:pPr>
+                        <a:spcAft>
+                          <a:spcPts val="0"/>
+                        </a:spcAft>
+                      </a:pPr>
+                      <a:r>
+                        <a:rPr lang="en-US" sz="1400" baseline="0" dirty="0">
+                          <a:effectLst/>
+                          <a:latin typeface="Times New Roman" panose="02020603050405020304" pitchFamily="18" charset="0"/>
+                          <a:ea typeface="標楷體" panose="03000509000000000000" pitchFamily="65" charset="-120"/>
+                        </a:rPr>
+                        <a:t>Use Case Name</a:t>
+                      </a:r>
+                      <a:endParaRPr lang="zh-TW" sz="1400" baseline="0" dirty="0">
+                        <a:solidFill>
+                          <a:srgbClr val="00000A"/>
+                        </a:solidFill>
+                        <a:effectLst/>
+                        <a:latin typeface="Times New Roman" panose="02020603050405020304" pitchFamily="18" charset="0"/>
+                        <a:ea typeface="標楷體" panose="03000509000000000000" pitchFamily="65" charset="-120"/>
+                        <a:cs typeface="Calibri" panose="020F0502020204030204" pitchFamily="34" charset="0"/>
+                      </a:endParaRPr>
+                    </a:p>
+                  </a:txBody>
+                  <a:tcPr marL="41845" marR="43877" marT="0" marB="0"/>
+                </a:tc>
+                <a:tc>
+                  <a:txBody>
+                    <a:bodyPr/>
+                    <a:lstStyle/>
+                    <a:p>
+                      <a:pPr>
+                        <a:spcAft>
+                          <a:spcPts val="0"/>
+                        </a:spcAft>
+                      </a:pPr>
+                      <a:r>
+                        <a:rPr lang="zh-TW" sz="1400" baseline="0" dirty="0">
+                          <a:effectLst/>
+                          <a:latin typeface="Times New Roman" panose="02020603050405020304" pitchFamily="18" charset="0"/>
+                          <a:ea typeface="標楷體" panose="03000509000000000000" pitchFamily="65" charset="-120"/>
+                        </a:rPr>
+                        <a:t>管理類別。</a:t>
+                      </a:r>
+                      <a:endParaRPr lang="zh-TW" sz="1400" baseline="0" dirty="0">
+                        <a:solidFill>
+                          <a:srgbClr val="00000A"/>
+                        </a:solidFill>
+                        <a:effectLst/>
+                        <a:latin typeface="Times New Roman" panose="02020603050405020304" pitchFamily="18" charset="0"/>
+                        <a:ea typeface="標楷體" panose="03000509000000000000" pitchFamily="65" charset="-120"/>
+                        <a:cs typeface="Calibri" panose="020F0502020204030204" pitchFamily="34" charset="0"/>
+                      </a:endParaRPr>
+                    </a:p>
+                  </a:txBody>
+                  <a:tcPr marL="41845" marR="43877" marT="0" marB="0"/>
+                </a:tc>
+                <a:extLst>
+                  <a:ext uri="{0D108BD9-81ED-4DB2-BD59-A6C34878D82A}">
+                    <a16:rowId xmlns:a16="http://schemas.microsoft.com/office/drawing/2014/main" val="3237915888"/>
+                  </a:ext>
+                </a:extLst>
+              </a:tr>
+              <a:tr h="240748">
+                <a:tc>
+                  <a:txBody>
+                    <a:bodyPr/>
+                    <a:lstStyle/>
+                    <a:p>
+                      <a:pPr>
+                        <a:spcAft>
+                          <a:spcPts val="0"/>
+                        </a:spcAft>
+                      </a:pPr>
+                      <a:r>
+                        <a:rPr lang="en-US" sz="1400" baseline="0">
+                          <a:effectLst/>
+                          <a:latin typeface="Times New Roman" panose="02020603050405020304" pitchFamily="18" charset="0"/>
+                          <a:ea typeface="標楷體" panose="03000509000000000000" pitchFamily="65" charset="-120"/>
+                        </a:rPr>
+                        <a:t>Scope</a:t>
+                      </a:r>
+                      <a:endParaRPr lang="zh-TW" sz="1400" baseline="0">
+                        <a:solidFill>
+                          <a:srgbClr val="00000A"/>
+                        </a:solidFill>
+                        <a:effectLst/>
+                        <a:latin typeface="Times New Roman" panose="02020603050405020304" pitchFamily="18" charset="0"/>
+                        <a:ea typeface="標楷體" panose="03000509000000000000" pitchFamily="65" charset="-120"/>
+                        <a:cs typeface="Calibri" panose="020F0502020204030204" pitchFamily="34" charset="0"/>
+                      </a:endParaRPr>
+                    </a:p>
+                  </a:txBody>
+                  <a:tcPr marL="41845" marR="43877" marT="0" marB="0"/>
+                </a:tc>
+                <a:tc>
+                  <a:txBody>
+                    <a:bodyPr/>
+                    <a:lstStyle/>
+                    <a:p>
+                      <a:pPr>
+                        <a:spcAft>
+                          <a:spcPts val="0"/>
+                        </a:spcAft>
+                      </a:pPr>
+                      <a:r>
+                        <a:rPr lang="en-US" sz="1400" baseline="0">
+                          <a:effectLst/>
+                          <a:latin typeface="Times New Roman" panose="02020603050405020304" pitchFamily="18" charset="0"/>
+                          <a:ea typeface="標楷體" panose="03000509000000000000" pitchFamily="65" charset="-120"/>
+                        </a:rPr>
+                        <a:t>Timelog System.</a:t>
+                      </a:r>
+                      <a:endParaRPr lang="zh-TW" sz="1400" baseline="0">
+                        <a:solidFill>
+                          <a:srgbClr val="00000A"/>
+                        </a:solidFill>
+                        <a:effectLst/>
+                        <a:latin typeface="Times New Roman" panose="02020603050405020304" pitchFamily="18" charset="0"/>
+                        <a:ea typeface="標楷體" panose="03000509000000000000" pitchFamily="65" charset="-120"/>
+                        <a:cs typeface="Calibri" panose="020F0502020204030204" pitchFamily="34" charset="0"/>
+                      </a:endParaRPr>
+                    </a:p>
+                  </a:txBody>
+                  <a:tcPr marL="41845" marR="43877" marT="0" marB="0"/>
+                </a:tc>
+                <a:extLst>
+                  <a:ext uri="{0D108BD9-81ED-4DB2-BD59-A6C34878D82A}">
+                    <a16:rowId xmlns:a16="http://schemas.microsoft.com/office/drawing/2014/main" val="2253623215"/>
+                  </a:ext>
+                </a:extLst>
+              </a:tr>
+              <a:tr h="240748">
+                <a:tc>
+                  <a:txBody>
+                    <a:bodyPr/>
+                    <a:lstStyle/>
+                    <a:p>
+                      <a:pPr>
+                        <a:spcAft>
+                          <a:spcPts val="0"/>
+                        </a:spcAft>
+                      </a:pPr>
+                      <a:r>
+                        <a:rPr lang="en-US" sz="1400" baseline="0">
+                          <a:effectLst/>
+                          <a:latin typeface="Times New Roman" panose="02020603050405020304" pitchFamily="18" charset="0"/>
+                          <a:ea typeface="標楷體" panose="03000509000000000000" pitchFamily="65" charset="-120"/>
+                        </a:rPr>
+                        <a:t>Level</a:t>
+                      </a:r>
+                      <a:endParaRPr lang="zh-TW" sz="1400" baseline="0">
+                        <a:solidFill>
+                          <a:srgbClr val="00000A"/>
+                        </a:solidFill>
+                        <a:effectLst/>
+                        <a:latin typeface="Times New Roman" panose="02020603050405020304" pitchFamily="18" charset="0"/>
+                        <a:ea typeface="標楷體" panose="03000509000000000000" pitchFamily="65" charset="-120"/>
+                        <a:cs typeface="Calibri" panose="020F0502020204030204" pitchFamily="34" charset="0"/>
+                      </a:endParaRPr>
+                    </a:p>
+                  </a:txBody>
+                  <a:tcPr marL="41845" marR="43877" marT="0" marB="0"/>
+                </a:tc>
+                <a:tc>
+                  <a:txBody>
+                    <a:bodyPr/>
+                    <a:lstStyle/>
+                    <a:p>
+                      <a:pPr>
+                        <a:spcAft>
+                          <a:spcPts val="0"/>
+                        </a:spcAft>
+                      </a:pPr>
+                      <a:r>
+                        <a:rPr lang="en-US" sz="1400" baseline="0">
+                          <a:effectLst/>
+                          <a:latin typeface="Times New Roman" panose="02020603050405020304" pitchFamily="18" charset="0"/>
+                          <a:ea typeface="標楷體" panose="03000509000000000000" pitchFamily="65" charset="-120"/>
+                        </a:rPr>
+                        <a:t>User goal.</a:t>
+                      </a:r>
+                      <a:endParaRPr lang="zh-TW" sz="1400" baseline="0">
+                        <a:solidFill>
+                          <a:srgbClr val="00000A"/>
+                        </a:solidFill>
+                        <a:effectLst/>
+                        <a:latin typeface="Times New Roman" panose="02020603050405020304" pitchFamily="18" charset="0"/>
+                        <a:ea typeface="標楷體" panose="03000509000000000000" pitchFamily="65" charset="-120"/>
+                        <a:cs typeface="Calibri" panose="020F0502020204030204" pitchFamily="34" charset="0"/>
+                      </a:endParaRPr>
+                    </a:p>
+                  </a:txBody>
+                  <a:tcPr marL="41845" marR="43877" marT="0" marB="0"/>
+                </a:tc>
+                <a:extLst>
+                  <a:ext uri="{0D108BD9-81ED-4DB2-BD59-A6C34878D82A}">
+                    <a16:rowId xmlns:a16="http://schemas.microsoft.com/office/drawing/2014/main" val="901620735"/>
+                  </a:ext>
+                </a:extLst>
+              </a:tr>
+              <a:tr h="240748">
+                <a:tc>
+                  <a:txBody>
+                    <a:bodyPr/>
+                    <a:lstStyle/>
+                    <a:p>
+                      <a:pPr>
+                        <a:spcAft>
+                          <a:spcPts val="0"/>
+                        </a:spcAft>
+                      </a:pPr>
+                      <a:r>
+                        <a:rPr lang="en-US" sz="1400" baseline="0">
+                          <a:effectLst/>
+                          <a:latin typeface="Times New Roman" panose="02020603050405020304" pitchFamily="18" charset="0"/>
+                          <a:ea typeface="標楷體" panose="03000509000000000000" pitchFamily="65" charset="-120"/>
+                        </a:rPr>
+                        <a:t>Primary Actor</a:t>
+                      </a:r>
+                      <a:endParaRPr lang="zh-TW" sz="1400" baseline="0">
+                        <a:solidFill>
+                          <a:srgbClr val="00000A"/>
+                        </a:solidFill>
+                        <a:effectLst/>
+                        <a:latin typeface="Times New Roman" panose="02020603050405020304" pitchFamily="18" charset="0"/>
+                        <a:ea typeface="標楷體" panose="03000509000000000000" pitchFamily="65" charset="-120"/>
+                        <a:cs typeface="Calibri" panose="020F0502020204030204" pitchFamily="34" charset="0"/>
+                      </a:endParaRPr>
+                    </a:p>
+                  </a:txBody>
+                  <a:tcPr marL="41845" marR="43877" marT="0" marB="0"/>
+                </a:tc>
+                <a:tc>
+                  <a:txBody>
+                    <a:bodyPr/>
+                    <a:lstStyle/>
+                    <a:p>
+                      <a:pPr>
+                        <a:spcAft>
+                          <a:spcPts val="0"/>
+                        </a:spcAft>
+                      </a:pPr>
+                      <a:r>
+                        <a:rPr lang="en-US" sz="1400" baseline="0">
+                          <a:effectLst/>
+                          <a:latin typeface="Times New Roman" panose="02020603050405020304" pitchFamily="18" charset="0"/>
+                          <a:ea typeface="標楷體" panose="03000509000000000000" pitchFamily="65" charset="-120"/>
+                        </a:rPr>
+                        <a:t>User.</a:t>
+                      </a:r>
+                      <a:endParaRPr lang="zh-TW" sz="1400" baseline="0">
+                        <a:solidFill>
+                          <a:srgbClr val="00000A"/>
+                        </a:solidFill>
+                        <a:effectLst/>
+                        <a:latin typeface="Times New Roman" panose="02020603050405020304" pitchFamily="18" charset="0"/>
+                        <a:ea typeface="標楷體" panose="03000509000000000000" pitchFamily="65" charset="-120"/>
+                        <a:cs typeface="Calibri" panose="020F0502020204030204" pitchFamily="34" charset="0"/>
+                      </a:endParaRPr>
+                    </a:p>
+                  </a:txBody>
+                  <a:tcPr marL="41845" marR="43877" marT="0" marB="0"/>
+                </a:tc>
+                <a:extLst>
+                  <a:ext uri="{0D108BD9-81ED-4DB2-BD59-A6C34878D82A}">
+                    <a16:rowId xmlns:a16="http://schemas.microsoft.com/office/drawing/2014/main" val="3668019901"/>
+                  </a:ext>
+                </a:extLst>
+              </a:tr>
+              <a:tr h="481495">
+                <a:tc>
+                  <a:txBody>
+                    <a:bodyPr/>
+                    <a:lstStyle/>
+                    <a:p>
+                      <a:pPr>
+                        <a:spcAft>
+                          <a:spcPts val="0"/>
+                        </a:spcAft>
+                      </a:pPr>
+                      <a:r>
+                        <a:rPr lang="en-US" sz="1400" baseline="0">
+                          <a:effectLst/>
+                          <a:latin typeface="Times New Roman" panose="02020603050405020304" pitchFamily="18" charset="0"/>
+                          <a:ea typeface="標楷體" panose="03000509000000000000" pitchFamily="65" charset="-120"/>
+                        </a:rPr>
+                        <a:t>Stakeholders and Interests</a:t>
+                      </a:r>
+                      <a:endParaRPr lang="zh-TW" sz="1400" baseline="0">
+                        <a:solidFill>
+                          <a:srgbClr val="00000A"/>
+                        </a:solidFill>
+                        <a:effectLst/>
+                        <a:latin typeface="Times New Roman" panose="02020603050405020304" pitchFamily="18" charset="0"/>
+                        <a:ea typeface="標楷體" panose="03000509000000000000" pitchFamily="65" charset="-120"/>
+                        <a:cs typeface="Calibri" panose="020F0502020204030204" pitchFamily="34" charset="0"/>
+                      </a:endParaRPr>
+                    </a:p>
+                  </a:txBody>
+                  <a:tcPr marL="41845" marR="43877" marT="0" marB="0"/>
+                </a:tc>
+                <a:tc>
+                  <a:txBody>
+                    <a:bodyPr/>
+                    <a:lstStyle/>
+                    <a:p>
+                      <a:pPr>
+                        <a:spcAft>
+                          <a:spcPts val="0"/>
+                        </a:spcAft>
+                      </a:pPr>
+                      <a:r>
+                        <a:rPr lang="en-US" sz="1400" baseline="0">
+                          <a:effectLst/>
+                          <a:latin typeface="Times New Roman" panose="02020603050405020304" pitchFamily="18" charset="0"/>
+                          <a:ea typeface="標楷體" panose="03000509000000000000" pitchFamily="65" charset="-120"/>
+                        </a:rPr>
+                        <a:t>User</a:t>
+                      </a:r>
+                      <a:r>
+                        <a:rPr lang="zh-TW" sz="1400" baseline="0">
+                          <a:effectLst/>
+                          <a:latin typeface="Times New Roman" panose="02020603050405020304" pitchFamily="18" charset="0"/>
+                          <a:ea typeface="標楷體" panose="03000509000000000000" pitchFamily="65" charset="-120"/>
+                        </a:rPr>
+                        <a:t>：使用者想管理類別。</a:t>
+                      </a:r>
+                      <a:endParaRPr lang="zh-TW" sz="1400" baseline="0">
+                        <a:solidFill>
+                          <a:srgbClr val="00000A"/>
+                        </a:solidFill>
+                        <a:effectLst/>
+                        <a:latin typeface="Times New Roman" panose="02020603050405020304" pitchFamily="18" charset="0"/>
+                        <a:ea typeface="標楷體" panose="03000509000000000000" pitchFamily="65" charset="-120"/>
+                        <a:cs typeface="Calibri" panose="020F0502020204030204" pitchFamily="34" charset="0"/>
+                      </a:endParaRPr>
+                    </a:p>
+                  </a:txBody>
+                  <a:tcPr marL="41845" marR="43877" marT="0" marB="0"/>
+                </a:tc>
+                <a:extLst>
+                  <a:ext uri="{0D108BD9-81ED-4DB2-BD59-A6C34878D82A}">
+                    <a16:rowId xmlns:a16="http://schemas.microsoft.com/office/drawing/2014/main" val="1332442103"/>
+                  </a:ext>
+                </a:extLst>
+              </a:tr>
+              <a:tr h="240748">
+                <a:tc>
+                  <a:txBody>
+                    <a:bodyPr/>
+                    <a:lstStyle/>
+                    <a:p>
+                      <a:pPr>
+                        <a:spcAft>
+                          <a:spcPts val="0"/>
+                        </a:spcAft>
+                      </a:pPr>
+                      <a:r>
+                        <a:rPr lang="en-US" sz="1400" baseline="0">
+                          <a:effectLst/>
+                          <a:latin typeface="Times New Roman" panose="02020603050405020304" pitchFamily="18" charset="0"/>
+                          <a:ea typeface="標楷體" panose="03000509000000000000" pitchFamily="65" charset="-120"/>
+                        </a:rPr>
+                        <a:t>Preconditions</a:t>
+                      </a:r>
+                      <a:endParaRPr lang="zh-TW" sz="1400" baseline="0">
+                        <a:solidFill>
+                          <a:srgbClr val="00000A"/>
+                        </a:solidFill>
+                        <a:effectLst/>
+                        <a:latin typeface="Times New Roman" panose="02020603050405020304" pitchFamily="18" charset="0"/>
+                        <a:ea typeface="標楷體" panose="03000509000000000000" pitchFamily="65" charset="-120"/>
+                        <a:cs typeface="Calibri" panose="020F0502020204030204" pitchFamily="34" charset="0"/>
+                      </a:endParaRPr>
+                    </a:p>
+                  </a:txBody>
+                  <a:tcPr marL="41845" marR="43877" marT="0" marB="0"/>
+                </a:tc>
+                <a:tc>
+                  <a:txBody>
+                    <a:bodyPr/>
+                    <a:lstStyle/>
+                    <a:p>
+                      <a:pPr>
+                        <a:spcAft>
+                          <a:spcPts val="0"/>
+                        </a:spcAft>
+                      </a:pPr>
+                      <a:r>
+                        <a:rPr lang="en-US" sz="1400" baseline="0" dirty="0">
+                          <a:effectLst/>
+                          <a:latin typeface="Times New Roman" panose="02020603050405020304" pitchFamily="18" charset="0"/>
+                          <a:ea typeface="標楷體" panose="03000509000000000000" pitchFamily="65" charset="-120"/>
+                        </a:rPr>
+                        <a:t>None.</a:t>
+                      </a:r>
+                      <a:endParaRPr lang="zh-TW" sz="1400" baseline="0" dirty="0">
+                        <a:solidFill>
+                          <a:srgbClr val="00000A"/>
+                        </a:solidFill>
+                        <a:effectLst/>
+                        <a:latin typeface="Times New Roman" panose="02020603050405020304" pitchFamily="18" charset="0"/>
+                        <a:ea typeface="標楷體" panose="03000509000000000000" pitchFamily="65" charset="-120"/>
+                        <a:cs typeface="Calibri" panose="020F0502020204030204" pitchFamily="34" charset="0"/>
+                      </a:endParaRPr>
+                    </a:p>
+                  </a:txBody>
+                  <a:tcPr marL="41845" marR="43877" marT="0" marB="0"/>
+                </a:tc>
+                <a:extLst>
+                  <a:ext uri="{0D108BD9-81ED-4DB2-BD59-A6C34878D82A}">
+                    <a16:rowId xmlns:a16="http://schemas.microsoft.com/office/drawing/2014/main" val="1932751127"/>
+                  </a:ext>
+                </a:extLst>
+              </a:tr>
+              <a:tr h="240748">
+                <a:tc>
+                  <a:txBody>
+                    <a:bodyPr/>
+                    <a:lstStyle/>
+                    <a:p>
+                      <a:pPr>
+                        <a:spcAft>
+                          <a:spcPts val="0"/>
+                        </a:spcAft>
+                      </a:pPr>
+                      <a:r>
+                        <a:rPr lang="en-US" sz="1400" baseline="0">
+                          <a:effectLst/>
+                          <a:latin typeface="Times New Roman" panose="02020603050405020304" pitchFamily="18" charset="0"/>
+                          <a:ea typeface="標楷體" panose="03000509000000000000" pitchFamily="65" charset="-120"/>
+                        </a:rPr>
+                        <a:t>Success Guarantee</a:t>
+                      </a:r>
+                      <a:endParaRPr lang="zh-TW" sz="1400" baseline="0">
+                        <a:solidFill>
+                          <a:srgbClr val="00000A"/>
+                        </a:solidFill>
+                        <a:effectLst/>
+                        <a:latin typeface="Times New Roman" panose="02020603050405020304" pitchFamily="18" charset="0"/>
+                        <a:ea typeface="標楷體" panose="03000509000000000000" pitchFamily="65" charset="-120"/>
+                        <a:cs typeface="Calibri" panose="020F0502020204030204" pitchFamily="34" charset="0"/>
+                      </a:endParaRPr>
+                    </a:p>
+                  </a:txBody>
+                  <a:tcPr marL="41845" marR="43877" marT="0" marB="0"/>
+                </a:tc>
+                <a:tc>
+                  <a:txBody>
+                    <a:bodyPr/>
+                    <a:lstStyle/>
+                    <a:p>
+                      <a:pPr>
+                        <a:spcAft>
+                          <a:spcPts val="0"/>
+                        </a:spcAft>
+                      </a:pPr>
+                      <a:r>
+                        <a:rPr lang="zh-TW" sz="1400" baseline="0" dirty="0">
+                          <a:effectLst/>
+                          <a:latin typeface="Times New Roman" panose="02020603050405020304" pitchFamily="18" charset="0"/>
+                          <a:ea typeface="標楷體" panose="03000509000000000000" pitchFamily="65" charset="-120"/>
+                        </a:rPr>
+                        <a:t>系統成功更新類別清單。</a:t>
+                      </a:r>
+                      <a:endParaRPr lang="zh-TW" sz="1400" baseline="0" dirty="0">
+                        <a:solidFill>
+                          <a:srgbClr val="00000A"/>
+                        </a:solidFill>
+                        <a:effectLst/>
+                        <a:latin typeface="Times New Roman" panose="02020603050405020304" pitchFamily="18" charset="0"/>
+                        <a:ea typeface="標楷體" panose="03000509000000000000" pitchFamily="65" charset="-120"/>
+                        <a:cs typeface="Calibri" panose="020F0502020204030204" pitchFamily="34" charset="0"/>
+                      </a:endParaRPr>
+                    </a:p>
+                  </a:txBody>
+                  <a:tcPr marL="41845" marR="43877" marT="0" marB="0"/>
+                </a:tc>
+                <a:extLst>
+                  <a:ext uri="{0D108BD9-81ED-4DB2-BD59-A6C34878D82A}">
+                    <a16:rowId xmlns:a16="http://schemas.microsoft.com/office/drawing/2014/main" val="415646738"/>
+                  </a:ext>
+                </a:extLst>
+              </a:tr>
+            </a:tbl>
+          </a:graphicData>
+        </a:graphic>
+      </p:graphicFrame>
     </p:spTree>
     <p:extLst>
       <p:ext uri="{BB962C8B-B14F-4D97-AF65-F5344CB8AC3E}">

</xml_diff>